<commit_message>
Slideshow modified and grp resources added.
Signed-off-by: iconstudio <yoyofa2@hotmail.com>
</commit_message>
<xml_diff>
--- a/slides/Cosmos_20171105.pptx
+++ b/slides/Cosmos_20171105.pptx
@@ -1761,7 +1761,23 @@
                 <a:schemeClr val="tx1"/>
               </a:solidFill>
             </a:rPr>
-            <a:t>항상 새로운 무작위 인카운터</a:t>
+            <a:t>항상 새로운 무작위 </a:t>
+          </a:r>
+          <a:r>
+            <a:rPr lang="en-US" altLang="ko-KR" sz="2000" dirty="0" smtClean="0">
+              <a:solidFill>
+                <a:schemeClr val="tx1"/>
+              </a:solidFill>
+            </a:rPr>
+            <a:t>*</a:t>
+          </a:r>
+          <a:r>
+            <a:rPr lang="ko-KR" altLang="en-US" sz="2000" dirty="0" smtClean="0">
+              <a:solidFill>
+                <a:schemeClr val="tx1"/>
+              </a:solidFill>
+            </a:rPr>
+            <a:t>인카운터</a:t>
           </a:r>
           <a:r>
             <a:rPr lang="en-US" altLang="ko-KR" sz="2000" dirty="0" smtClean="0">
@@ -2808,7 +2824,23 @@
                 <a:schemeClr val="tx1"/>
               </a:solidFill>
             </a:rPr>
-            <a:t>항상 새로운 무작위 인카운터</a:t>
+            <a:t>항상 새로운 무작위 </a:t>
+          </a:r>
+          <a:r>
+            <a:rPr lang="en-US" altLang="ko-KR" sz="2000" kern="1200" dirty="0" smtClean="0">
+              <a:solidFill>
+                <a:schemeClr val="tx1"/>
+              </a:solidFill>
+            </a:rPr>
+            <a:t>*</a:t>
+          </a:r>
+          <a:r>
+            <a:rPr lang="ko-KR" altLang="en-US" sz="2000" kern="1200" dirty="0" smtClean="0">
+              <a:solidFill>
+                <a:schemeClr val="tx1"/>
+              </a:solidFill>
+            </a:rPr>
+            <a:t>인카운터</a:t>
           </a:r>
           <a:r>
             <a:rPr lang="en-US" altLang="ko-KR" sz="2000" kern="1200" dirty="0" smtClean="0">
@@ -9586,7 +9618,7 @@
           <p:nvPr>
             <p:extLst>
               <p:ext uri="{D42A27DB-BD31-4B8C-83A1-F6EECF244321}">
-                <p14:modId xmlns:p14="http://schemas.microsoft.com/office/powerpoint/2010/main" val="2333275351"/>
+                <p14:modId xmlns:p14="http://schemas.microsoft.com/office/powerpoint/2010/main" val="2788509245"/>
               </p:ext>
             </p:extLst>
           </p:nvPr>
@@ -9703,7 +9735,7 @@
                     </a:lnBlToTr>
                     <a:solidFill>
                       <a:srgbClr val="729CE0">
-                        <a:alpha val="40000"/>
+                        <a:alpha val="71000"/>
                       </a:srgbClr>
                     </a:solidFill>
                   </a:tcPr>
@@ -9782,7 +9814,7 @@
                     </a:lnBlToTr>
                     <a:solidFill>
                       <a:srgbClr val="729CE0">
-                        <a:alpha val="40000"/>
+                        <a:alpha val="71000"/>
                       </a:srgbClr>
                     </a:solidFill>
                   </a:tcPr>
@@ -9859,7 +9891,7 @@
                     </a:lnBlToTr>
                     <a:solidFill>
                       <a:srgbClr val="729CE0">
-                        <a:alpha val="40000"/>
+                        <a:alpha val="71000"/>
                       </a:srgbClr>
                     </a:solidFill>
                   </a:tcPr>
@@ -9936,7 +9968,7 @@
                     </a:lnBlToTr>
                     <a:solidFill>
                       <a:srgbClr val="729CE0">
-                        <a:alpha val="40000"/>
+                        <a:alpha val="71000"/>
                       </a:srgbClr>
                     </a:solidFill>
                   </a:tcPr>
@@ -10013,7 +10045,7 @@
                     </a:lnBlToTr>
                     <a:solidFill>
                       <a:srgbClr val="729CE0">
-                        <a:alpha val="40000"/>
+                        <a:alpha val="71000"/>
                       </a:srgbClr>
                     </a:solidFill>
                   </a:tcPr>
@@ -10090,7 +10122,7 @@
                     </a:lnBlToTr>
                     <a:solidFill>
                       <a:srgbClr val="729CE0">
-                        <a:alpha val="40000"/>
+                        <a:alpha val="71000"/>
                       </a:srgbClr>
                     </a:solidFill>
                   </a:tcPr>
@@ -10169,7 +10201,7 @@
                     </a:lnBlToTr>
                     <a:solidFill>
                       <a:srgbClr val="729CE0">
-                        <a:alpha val="40000"/>
+                        <a:alpha val="71000"/>
                       </a:srgbClr>
                     </a:solidFill>
                   </a:tcPr>
@@ -10275,7 +10307,7 @@
                     </a:lnBlToTr>
                     <a:solidFill>
                       <a:srgbClr val="729CE0">
-                        <a:alpha val="40000"/>
+                        <a:alpha val="71000"/>
                       </a:srgbClr>
                     </a:solidFill>
                   </a:tcPr>
@@ -10366,7 +10398,7 @@
                     </a:lnBlToTr>
                     <a:solidFill>
                       <a:srgbClr val="729CE0">
-                        <a:alpha val="40000"/>
+                        <a:alpha val="71000"/>
                       </a:srgbClr>
                     </a:solidFill>
                   </a:tcPr>
@@ -10457,7 +10489,7 @@
                     </a:lnBlToTr>
                     <a:solidFill>
                       <a:srgbClr val="729CE0">
-                        <a:alpha val="40000"/>
+                        <a:alpha val="71000"/>
                       </a:srgbClr>
                     </a:solidFill>
                   </a:tcPr>
@@ -10582,7 +10614,7 @@
                     </a:lnBlToTr>
                     <a:solidFill>
                       <a:srgbClr val="729CE0">
-                        <a:alpha val="40000"/>
+                        <a:alpha val="71000"/>
                       </a:srgbClr>
                     </a:solidFill>
                   </a:tcPr>
@@ -10673,7 +10705,7 @@
                     </a:lnBlToTr>
                     <a:solidFill>
                       <a:srgbClr val="729CE0">
-                        <a:alpha val="40000"/>
+                        <a:alpha val="71000"/>
                       </a:srgbClr>
                     </a:solidFill>
                   </a:tcPr>
@@ -10766,7 +10798,7 @@
                     </a:lnBlToTr>
                     <a:solidFill>
                       <a:srgbClr val="729CE0">
-                        <a:alpha val="40000"/>
+                        <a:alpha val="71000"/>
                       </a:srgbClr>
                     </a:solidFill>
                   </a:tcPr>
@@ -10776,39 +10808,6 @@
           </a:graphicData>
         </a:graphic>
       </p:graphicFrame>
-      <p:sp>
-        <p:nvSpPr>
-          <p:cNvPr id="2" name="TextBox 1"/>
-          <p:cNvSpPr txBox="1"/>
-          <p:nvPr/>
-        </p:nvSpPr>
-        <p:spPr>
-          <a:xfrm>
-            <a:off x="10534650" y="6067425"/>
-            <a:ext cx="1095375" cy="369332"/>
-          </a:xfrm>
-          <a:prstGeom prst="rect">
-            <a:avLst/>
-          </a:prstGeom>
-          <a:noFill/>
-        </p:spPr>
-        <p:txBody>
-          <a:bodyPr wrap="square" rtlCol="0">
-            <a:spAutoFit/>
-          </a:bodyPr>
-          <a:lstStyle/>
-          <a:p>
-            <a:r>
-              <a:rPr lang="en-US" altLang="ko-KR" dirty="0" smtClean="0">
-                <a:solidFill>
-                  <a:schemeClr val="bg1"/>
-                </a:solidFill>
-              </a:rPr>
-              <a:t>&lt;#&gt;</a:t>
-            </a:r>
-          </a:p>
-        </p:txBody>
-      </p:sp>
     </p:spTree>
     <p:extLst>
       <p:ext uri="{BB962C8B-B14F-4D97-AF65-F5344CB8AC3E}">
@@ -11973,6 +11972,10 @@
           </a:bodyPr>
           <a:lstStyle/>
           <a:p>
+            <a:pPr marL="457200" indent="-457200">
+              <a:buFont typeface="Arial" panose="020B0604020202020204" pitchFamily="34" charset="0"/>
+              <a:buChar char="•"/>
+            </a:pPr>
             <a:r>
               <a:rPr lang="ko-KR" altLang="en-US" sz="3200" dirty="0" smtClean="0">
                 <a:solidFill>
@@ -11988,7 +11991,24 @@
                 <a:latin typeface="-윤고딕310" panose="02030504000101010101" pitchFamily="18" charset="-127"/>
                 <a:ea typeface="-윤고딕310" panose="02030504000101010101" pitchFamily="18" charset="-127"/>
               </a:rPr>
-              <a:t>텍스트</a:t>
+              <a:t>항해 중 무작위로 전투 이벤트가 발생한다</a:t>
+            </a:r>
+            <a:r>
+              <a:rPr lang="en-US" altLang="ko-KR" sz="3200" dirty="0" smtClean="0">
+                <a:solidFill>
+                  <a:schemeClr val="bg1"/>
+                </a:solidFill>
+                <a:effectLst>
+                  <a:outerShdw blurRad="38100" dist="38100" dir="2700000" algn="tl">
+                    <a:srgbClr val="000000">
+                      <a:alpha val="43137"/>
+                    </a:srgbClr>
+                  </a:outerShdw>
+                </a:effectLst>
+                <a:latin typeface="-윤고딕310" panose="02030504000101010101" pitchFamily="18" charset="-127"/>
+                <a:ea typeface="-윤고딕310" panose="02030504000101010101" pitchFamily="18" charset="-127"/>
+              </a:rPr>
+              <a:t>.</a:t>
             </a:r>
             <a:endParaRPr lang="en-US" altLang="ko-KR" sz="3200" dirty="0">
               <a:solidFill>
@@ -12521,6 +12541,519 @@
           </a:p>
         </p:txBody>
       </p:sp>
+      <p:grpSp>
+        <p:nvGrpSpPr>
+          <p:cNvPr id="2" name="그룹 1"/>
+          <p:cNvGrpSpPr/>
+          <p:nvPr/>
+        </p:nvGrpSpPr>
+        <p:grpSpPr>
+          <a:xfrm>
+            <a:off x="197992" y="2128357"/>
+            <a:ext cx="12146408" cy="4490147"/>
+            <a:chOff x="197992" y="2128357"/>
+            <a:chExt cx="12146408" cy="4490147"/>
+          </a:xfrm>
+        </p:grpSpPr>
+        <p:sp>
+          <p:nvSpPr>
+            <p:cNvPr id="8" name="TextBox 7"/>
+            <p:cNvSpPr txBox="1"/>
+            <p:nvPr/>
+          </p:nvSpPr>
+          <p:spPr>
+            <a:xfrm>
+              <a:off x="4152900" y="6018341"/>
+              <a:ext cx="3886200" cy="276999"/>
+            </a:xfrm>
+            <a:prstGeom prst="rect">
+              <a:avLst/>
+            </a:prstGeom>
+            <a:noFill/>
+          </p:spPr>
+          <p:txBody>
+            <a:bodyPr wrap="square" rtlCol="0" anchor="ctr">
+              <a:spAutoFit/>
+            </a:bodyPr>
+            <a:lstStyle/>
+            <a:p>
+              <a:pPr algn="ctr"/>
+              <a:r>
+                <a:rPr lang="ko-KR" altLang="en-US" sz="1200" dirty="0" smtClean="0">
+                  <a:solidFill>
+                    <a:schemeClr val="bg1"/>
+                  </a:solidFill>
+                  <a:effectLst>
+                    <a:outerShdw blurRad="38100" dist="38100" dir="2700000" algn="tl">
+                      <a:srgbClr val="000000">
+                        <a:alpha val="43137"/>
+                      </a:srgbClr>
+                    </a:outerShdw>
+                  </a:effectLst>
+                  <a:latin typeface="+mn-ea"/>
+                </a:rPr>
+                <a:t>예시</a:t>
+              </a:r>
+              <a:r>
+                <a:rPr lang="en-US" altLang="ko-KR" sz="1200" dirty="0" smtClean="0">
+                  <a:solidFill>
+                    <a:schemeClr val="bg1"/>
+                  </a:solidFill>
+                  <a:effectLst>
+                    <a:outerShdw blurRad="38100" dist="38100" dir="2700000" algn="tl">
+                      <a:srgbClr val="000000">
+                        <a:alpha val="43137"/>
+                      </a:srgbClr>
+                    </a:outerShdw>
+                  </a:effectLst>
+                  <a:latin typeface="+mn-ea"/>
+                </a:rPr>
+                <a:t>: FTL</a:t>
+              </a:r>
+              <a:r>
+                <a:rPr lang="ko-KR" altLang="en-US" sz="1200" dirty="0" smtClean="0">
+                  <a:solidFill>
+                    <a:schemeClr val="bg1"/>
+                  </a:solidFill>
+                  <a:effectLst>
+                    <a:outerShdw blurRad="38100" dist="38100" dir="2700000" algn="tl">
+                      <a:srgbClr val="000000">
+                        <a:alpha val="43137"/>
+                      </a:srgbClr>
+                    </a:outerShdw>
+                  </a:effectLst>
+                  <a:latin typeface="+mn-ea"/>
+                </a:rPr>
+                <a:t>의 전투 사진</a:t>
+              </a:r>
+              <a:endParaRPr lang="ko-KR" altLang="en-US" sz="1200" dirty="0">
+                <a:solidFill>
+                  <a:schemeClr val="bg1"/>
+                </a:solidFill>
+                <a:effectLst>
+                  <a:outerShdw blurRad="38100" dist="38100" dir="2700000" algn="tl">
+                    <a:srgbClr val="000000">
+                      <a:alpha val="43137"/>
+                    </a:srgbClr>
+                  </a:outerShdw>
+                </a:effectLst>
+                <a:latin typeface="+mn-ea"/>
+              </a:endParaRPr>
+            </a:p>
+          </p:txBody>
+        </p:sp>
+        <p:pic>
+          <p:nvPicPr>
+            <p:cNvPr id="9" name="그림 8"/>
+            <p:cNvPicPr>
+              <a:picLocks noChangeAspect="1"/>
+            </p:cNvPicPr>
+            <p:nvPr/>
+          </p:nvPicPr>
+          <p:blipFill>
+            <a:blip r:embed="rId2">
+              <a:extLst>
+                <a:ext uri="{28A0092B-C50C-407E-A947-70E740481C1C}">
+                  <a14:useLocalDpi xmlns:a14="http://schemas.microsoft.com/office/drawing/2010/main" val="0"/>
+                </a:ext>
+              </a:extLst>
+            </a:blip>
+            <a:stretch>
+              <a:fillRect/>
+            </a:stretch>
+          </p:blipFill>
+          <p:spPr>
+            <a:xfrm>
+              <a:off x="3171825" y="2495550"/>
+              <a:ext cx="5848350" cy="3476625"/>
+            </a:xfrm>
+            <a:prstGeom prst="rect">
+              <a:avLst/>
+            </a:prstGeom>
+          </p:spPr>
+        </p:pic>
+        <p:sp>
+          <p:nvSpPr>
+            <p:cNvPr id="12" name="TextBox 11"/>
+            <p:cNvSpPr txBox="1"/>
+            <p:nvPr/>
+          </p:nvSpPr>
+          <p:spPr>
+            <a:xfrm>
+              <a:off x="7543800" y="2128357"/>
+              <a:ext cx="4800600" cy="369332"/>
+            </a:xfrm>
+            <a:prstGeom prst="rect">
+              <a:avLst/>
+            </a:prstGeom>
+            <a:noFill/>
+          </p:spPr>
+          <p:txBody>
+            <a:bodyPr wrap="square" rtlCol="0">
+              <a:spAutoFit/>
+            </a:bodyPr>
+            <a:lstStyle/>
+            <a:p>
+              <a:r>
+                <a:rPr lang="ko-KR" altLang="en-US" dirty="0" smtClean="0">
+                  <a:solidFill>
+                    <a:schemeClr val="bg1"/>
+                  </a:solidFill>
+                  <a:effectLst>
+                    <a:outerShdw blurRad="38100" dist="38100" dir="2700000" algn="tl">
+                      <a:srgbClr val="000000">
+                        <a:alpha val="43137"/>
+                      </a:srgbClr>
+                    </a:outerShdw>
+                  </a:effectLst>
+                </a:rPr>
+                <a:t>전투 이벤트 중에는 전투</a:t>
+              </a:r>
+              <a:r>
+                <a:rPr lang="en-US" altLang="ko-KR" dirty="0" smtClean="0">
+                  <a:solidFill>
+                    <a:schemeClr val="bg1"/>
+                  </a:solidFill>
+                  <a:effectLst>
+                    <a:outerShdw blurRad="38100" dist="38100" dir="2700000" algn="tl">
+                      <a:srgbClr val="000000">
+                        <a:alpha val="43137"/>
+                      </a:srgbClr>
+                    </a:outerShdw>
+                  </a:effectLst>
+                </a:rPr>
+                <a:t>, </a:t>
+              </a:r>
+              <a:r>
+                <a:rPr lang="ko-KR" altLang="en-US" dirty="0" smtClean="0">
+                  <a:solidFill>
+                    <a:schemeClr val="bg1"/>
+                  </a:solidFill>
+                  <a:effectLst>
+                    <a:outerShdw blurRad="38100" dist="38100" dir="2700000" algn="tl">
+                      <a:srgbClr val="000000">
+                        <a:alpha val="43137"/>
+                      </a:srgbClr>
+                    </a:outerShdw>
+                  </a:effectLst>
+                </a:rPr>
+                <a:t>도주만이 가능하다</a:t>
+              </a:r>
+              <a:r>
+                <a:rPr lang="en-US" altLang="ko-KR" dirty="0" smtClean="0">
+                  <a:solidFill>
+                    <a:schemeClr val="bg1"/>
+                  </a:solidFill>
+                  <a:effectLst>
+                    <a:outerShdw blurRad="38100" dist="38100" dir="2700000" algn="tl">
+                      <a:srgbClr val="000000">
+                        <a:alpha val="43137"/>
+                      </a:srgbClr>
+                    </a:outerShdw>
+                  </a:effectLst>
+                </a:rPr>
+                <a:t>.</a:t>
+              </a:r>
+              <a:endParaRPr lang="ko-KR" altLang="en-US" dirty="0">
+                <a:solidFill>
+                  <a:schemeClr val="bg1"/>
+                </a:solidFill>
+                <a:effectLst>
+                  <a:outerShdw blurRad="38100" dist="38100" dir="2700000" algn="tl">
+                    <a:srgbClr val="000000">
+                      <a:alpha val="43137"/>
+                    </a:srgbClr>
+                  </a:outerShdw>
+                </a:effectLst>
+              </a:endParaRPr>
+            </a:p>
+          </p:txBody>
+        </p:sp>
+        <p:sp>
+          <p:nvSpPr>
+            <p:cNvPr id="13" name="TextBox 12"/>
+            <p:cNvSpPr txBox="1"/>
+            <p:nvPr/>
+          </p:nvSpPr>
+          <p:spPr>
+            <a:xfrm>
+              <a:off x="7477124" y="5972174"/>
+              <a:ext cx="4562475" cy="369332"/>
+            </a:xfrm>
+            <a:prstGeom prst="rect">
+              <a:avLst/>
+            </a:prstGeom>
+            <a:noFill/>
+          </p:spPr>
+          <p:txBody>
+            <a:bodyPr wrap="square" rtlCol="0">
+              <a:spAutoFit/>
+            </a:bodyPr>
+            <a:lstStyle/>
+            <a:p>
+              <a:r>
+                <a:rPr lang="ko-KR" altLang="en-US" dirty="0" smtClean="0">
+                  <a:solidFill>
+                    <a:schemeClr val="bg1"/>
+                  </a:solidFill>
+                  <a:effectLst>
+                    <a:outerShdw blurRad="38100" dist="38100" dir="2700000" algn="tl">
+                      <a:srgbClr val="000000">
+                        <a:alpha val="43137"/>
+                      </a:srgbClr>
+                    </a:outerShdw>
+                  </a:effectLst>
+                </a:rPr>
+                <a:t>적에 대한</a:t>
+              </a:r>
+              <a:r>
+                <a:rPr lang="en-US" altLang="ko-KR" dirty="0" smtClean="0">
+                  <a:solidFill>
+                    <a:schemeClr val="bg1"/>
+                  </a:solidFill>
+                  <a:effectLst>
+                    <a:outerShdw blurRad="38100" dist="38100" dir="2700000" algn="tl">
+                      <a:srgbClr val="000000">
+                        <a:alpha val="43137"/>
+                      </a:srgbClr>
+                    </a:outerShdw>
+                  </a:effectLst>
+                </a:rPr>
+                <a:t>.</a:t>
+              </a:r>
+              <a:endParaRPr lang="ko-KR" altLang="en-US" dirty="0">
+                <a:solidFill>
+                  <a:schemeClr val="bg1"/>
+                </a:solidFill>
+                <a:effectLst>
+                  <a:outerShdw blurRad="38100" dist="38100" dir="2700000" algn="tl">
+                    <a:srgbClr val="000000">
+                      <a:alpha val="43137"/>
+                    </a:srgbClr>
+                  </a:outerShdw>
+                </a:effectLst>
+              </a:endParaRPr>
+            </a:p>
+          </p:txBody>
+        </p:sp>
+        <p:sp>
+          <p:nvSpPr>
+            <p:cNvPr id="14" name="TextBox 13"/>
+            <p:cNvSpPr txBox="1"/>
+            <p:nvPr/>
+          </p:nvSpPr>
+          <p:spPr>
+            <a:xfrm>
+              <a:off x="197992" y="5972173"/>
+              <a:ext cx="4288284" cy="646331"/>
+            </a:xfrm>
+            <a:prstGeom prst="rect">
+              <a:avLst/>
+            </a:prstGeom>
+            <a:noFill/>
+          </p:spPr>
+          <p:txBody>
+            <a:bodyPr wrap="square" rtlCol="0">
+              <a:spAutoFit/>
+            </a:bodyPr>
+            <a:lstStyle/>
+            <a:p>
+              <a:pPr algn="r"/>
+              <a:r>
+                <a:rPr lang="ko-KR" altLang="en-US" dirty="0" smtClean="0">
+                  <a:solidFill>
+                    <a:schemeClr val="bg1"/>
+                  </a:solidFill>
+                  <a:effectLst>
+                    <a:outerShdw blurRad="38100" dist="38100" dir="2700000" algn="tl">
+                      <a:srgbClr val="000000">
+                        <a:alpha val="43137"/>
+                      </a:srgbClr>
+                    </a:outerShdw>
+                  </a:effectLst>
+                </a:rPr>
+                <a:t>함선마다 다양한 기능을 달고 있다</a:t>
+              </a:r>
+              <a:r>
+                <a:rPr lang="en-US" altLang="ko-KR" dirty="0" smtClean="0">
+                  <a:solidFill>
+                    <a:schemeClr val="bg1"/>
+                  </a:solidFill>
+                  <a:effectLst>
+                    <a:outerShdw blurRad="38100" dist="38100" dir="2700000" algn="tl">
+                      <a:srgbClr val="000000">
+                        <a:alpha val="43137"/>
+                      </a:srgbClr>
+                    </a:outerShdw>
+                  </a:effectLst>
+                </a:rPr>
+                <a:t>.</a:t>
+              </a:r>
+            </a:p>
+            <a:p>
+              <a:pPr algn="r"/>
+              <a:r>
+                <a:rPr lang="ko-KR" altLang="en-US" dirty="0" smtClean="0">
+                  <a:solidFill>
+                    <a:schemeClr val="bg1"/>
+                  </a:solidFill>
+                  <a:effectLst>
+                    <a:outerShdw blurRad="38100" dist="38100" dir="2700000" algn="tl">
+                      <a:srgbClr val="000000">
+                        <a:alpha val="43137"/>
+                      </a:srgbClr>
+                    </a:outerShdw>
+                  </a:effectLst>
+                </a:rPr>
+                <a:t>각 기능들은 강화</a:t>
+              </a:r>
+              <a:r>
+                <a:rPr lang="en-US" altLang="ko-KR" dirty="0" smtClean="0">
+                  <a:solidFill>
+                    <a:schemeClr val="bg1"/>
+                  </a:solidFill>
+                  <a:effectLst>
+                    <a:outerShdw blurRad="38100" dist="38100" dir="2700000" algn="tl">
+                      <a:srgbClr val="000000">
+                        <a:alpha val="43137"/>
+                      </a:srgbClr>
+                    </a:outerShdw>
+                  </a:effectLst>
+                </a:rPr>
+                <a:t>, </a:t>
+              </a:r>
+              <a:r>
+                <a:rPr lang="ko-KR" altLang="en-US" dirty="0" smtClean="0">
+                  <a:solidFill>
+                    <a:schemeClr val="bg1"/>
+                  </a:solidFill>
+                  <a:effectLst>
+                    <a:outerShdw blurRad="38100" dist="38100" dir="2700000" algn="tl">
+                      <a:srgbClr val="000000">
+                        <a:alpha val="43137"/>
+                      </a:srgbClr>
+                    </a:outerShdw>
+                  </a:effectLst>
+                </a:rPr>
+                <a:t>추가가 가능하다</a:t>
+              </a:r>
+              <a:r>
+                <a:rPr lang="en-US" altLang="ko-KR" dirty="0" smtClean="0">
+                  <a:solidFill>
+                    <a:schemeClr val="bg1"/>
+                  </a:solidFill>
+                  <a:effectLst>
+                    <a:outerShdw blurRad="38100" dist="38100" dir="2700000" algn="tl">
+                      <a:srgbClr val="000000">
+                        <a:alpha val="43137"/>
+                      </a:srgbClr>
+                    </a:outerShdw>
+                  </a:effectLst>
+                </a:rPr>
+                <a:t>.</a:t>
+              </a:r>
+            </a:p>
+          </p:txBody>
+        </p:sp>
+        <p:sp>
+          <p:nvSpPr>
+            <p:cNvPr id="15" name="TextBox 14"/>
+            <p:cNvSpPr txBox="1"/>
+            <p:nvPr/>
+          </p:nvSpPr>
+          <p:spPr>
+            <a:xfrm>
+              <a:off x="578992" y="2132639"/>
+              <a:ext cx="3907284" cy="369332"/>
+            </a:xfrm>
+            <a:prstGeom prst="rect">
+              <a:avLst/>
+            </a:prstGeom>
+            <a:noFill/>
+          </p:spPr>
+          <p:txBody>
+            <a:bodyPr wrap="square" rtlCol="0">
+              <a:spAutoFit/>
+            </a:bodyPr>
+            <a:lstStyle/>
+            <a:p>
+              <a:pPr algn="r"/>
+              <a:r>
+                <a:rPr lang="ko-KR" altLang="en-US" dirty="0" smtClean="0">
+                  <a:solidFill>
+                    <a:schemeClr val="bg1"/>
+                  </a:solidFill>
+                  <a:effectLst>
+                    <a:outerShdw blurRad="38100" dist="38100" dir="2700000" algn="tl">
+                      <a:srgbClr val="000000">
+                        <a:alpha val="43137"/>
+                      </a:srgbClr>
+                    </a:outerShdw>
+                  </a:effectLst>
+                </a:rPr>
+                <a:t>선체 내구도가 </a:t>
+              </a:r>
+              <a:r>
+                <a:rPr lang="en-US" altLang="ko-KR" dirty="0" smtClean="0">
+                  <a:solidFill>
+                    <a:schemeClr val="bg1"/>
+                  </a:solidFill>
+                  <a:effectLst>
+                    <a:outerShdw blurRad="38100" dist="38100" dir="2700000" algn="tl">
+                      <a:srgbClr val="000000">
+                        <a:alpha val="43137"/>
+                      </a:srgbClr>
+                    </a:outerShdw>
+                  </a:effectLst>
+                </a:rPr>
+                <a:t>0</a:t>
+              </a:r>
+              <a:r>
+                <a:rPr lang="ko-KR" altLang="en-US" dirty="0" smtClean="0">
+                  <a:solidFill>
+                    <a:schemeClr val="bg1"/>
+                  </a:solidFill>
+                  <a:effectLst>
+                    <a:outerShdw blurRad="38100" dist="38100" dir="2700000" algn="tl">
+                      <a:srgbClr val="000000">
+                        <a:alpha val="43137"/>
+                      </a:srgbClr>
+                    </a:outerShdw>
+                  </a:effectLst>
+                </a:rPr>
+                <a:t>이 되면 패배한다</a:t>
+              </a:r>
+              <a:r>
+                <a:rPr lang="en-US" altLang="ko-KR" dirty="0" smtClean="0">
+                  <a:solidFill>
+                    <a:schemeClr val="bg1"/>
+                  </a:solidFill>
+                  <a:effectLst>
+                    <a:outerShdw blurRad="38100" dist="38100" dir="2700000" algn="tl">
+                      <a:srgbClr val="000000">
+                        <a:alpha val="43137"/>
+                      </a:srgbClr>
+                    </a:outerShdw>
+                  </a:effectLst>
+                </a:rPr>
+                <a:t>.</a:t>
+              </a:r>
+              <a:endParaRPr lang="ko-KR" altLang="en-US" dirty="0">
+                <a:solidFill>
+                  <a:schemeClr val="bg1"/>
+                </a:solidFill>
+                <a:effectLst>
+                  <a:outerShdw blurRad="38100" dist="38100" dir="2700000" algn="tl">
+                    <a:srgbClr val="000000">
+                      <a:alpha val="43137"/>
+                    </a:srgbClr>
+                  </a:outerShdw>
+                </a:effectLst>
+              </a:endParaRPr>
+            </a:p>
+          </p:txBody>
+        </p:sp>
+      </p:grpSp>
     </p:spTree>
     <p:extLst>
       <p:ext uri="{BB962C8B-B14F-4D97-AF65-F5344CB8AC3E}">
@@ -16225,6 +16758,29 @@
               <a:buFont typeface="+mj-lt"/>
               <a:buAutoNum type="arabicPeriod"/>
             </a:pPr>
+            <a:r>
+              <a:rPr lang="en-US" altLang="ko-KR" sz="1600" dirty="0">
+                <a:ln>
+                  <a:solidFill>
+                    <a:schemeClr val="accent1">
+                      <a:alpha val="57000"/>
+                    </a:schemeClr>
+                  </a:solidFill>
+                </a:ln>
+                <a:solidFill>
+                  <a:schemeClr val="bg1"/>
+                </a:solidFill>
+                <a:effectLst>
+                  <a:outerShdw blurRad="38100" dist="38100" dir="2700000" algn="tl">
+                    <a:srgbClr val="000000">
+                      <a:alpha val="43137"/>
+                    </a:srgbClr>
+                  </a:outerShdw>
+                </a:effectLst>
+                <a:latin typeface="Continuum Light" panose="00000400000000000000" pitchFamily="2" charset="0"/>
+              </a:rPr>
+              <a:t>https://octopusoverlords.com/forum/viewtopic.php?f=2&amp;t=80866</a:t>
+            </a:r>
             <a:endParaRPr lang="en-US" altLang="ko-KR" sz="1600" dirty="0" smtClean="0">
               <a:ln>
                 <a:solidFill>
@@ -19176,7 +19732,7 @@
         <p:spPr>
           <a:xfrm>
             <a:off x="117687" y="1363131"/>
-            <a:ext cx="11617113" cy="3785652"/>
+            <a:ext cx="11617113" cy="3323987"/>
           </a:xfrm>
           <a:prstGeom prst="rect">
             <a:avLst/>
@@ -19228,7 +19784,7 @@
                 <a:latin typeface="-윤고딕310" panose="02030504000101010101" pitchFamily="18" charset="-127"/>
                 <a:ea typeface="-윤고딕310" panose="02030504000101010101" pitchFamily="18" charset="-127"/>
               </a:rPr>
-              <a:t>플레이어는 우주 최고로 성공하겠다는 일념으로</a:t>
+              <a:t>플레이어는</a:t>
             </a:r>
             <a:r>
               <a:rPr lang="en-US" altLang="ko-KR" sz="3000" dirty="0" smtClean="0">
@@ -19245,7 +19801,7 @@
                 <a:latin typeface="-윤고딕310" panose="02030504000101010101" pitchFamily="18" charset="-127"/>
                 <a:ea typeface="-윤고딕310" panose="02030504000101010101" pitchFamily="18" charset="-127"/>
               </a:rPr>
-              <a:t>, </a:t>
+              <a:t> </a:t>
             </a:r>
             <a:r>
               <a:rPr lang="ko-KR" altLang="en-US" sz="3000" dirty="0" smtClean="0">
@@ -20009,7 +20565,7 @@
           <p:nvPr>
             <p:extLst>
               <p:ext uri="{D42A27DB-BD31-4B8C-83A1-F6EECF244321}">
-                <p14:modId xmlns:p14="http://schemas.microsoft.com/office/powerpoint/2010/main" val="892070917"/>
+                <p14:modId xmlns:p14="http://schemas.microsoft.com/office/powerpoint/2010/main" val="2128096772"/>
               </p:ext>
             </p:extLst>
           </p:nvPr>
@@ -21842,7 +22398,7 @@
         <p:spPr>
           <a:xfrm>
             <a:off x="117687" y="1363131"/>
-            <a:ext cx="11617113" cy="5170646"/>
+            <a:ext cx="11617113" cy="4247317"/>
           </a:xfrm>
           <a:prstGeom prst="rect">
             <a:avLst/>
@@ -21855,30 +22411,6 @@
           </a:bodyPr>
           <a:lstStyle/>
           <a:p>
-            <a:pPr marL="457200" indent="-457200">
-              <a:buFont typeface="Arial" panose="020B0604020202020204" pitchFamily="34" charset="0"/>
-              <a:buChar char="•"/>
-            </a:pPr>
-            <a:endParaRPr lang="en-US" altLang="ko-KR" sz="3000" dirty="0" smtClean="0">
-              <a:solidFill>
-                <a:schemeClr val="bg1"/>
-              </a:solidFill>
-              <a:effectLst>
-                <a:outerShdw blurRad="38100" dist="38100" dir="2700000" algn="tl">
-                  <a:srgbClr val="000000">
-                    <a:alpha val="43137"/>
-                  </a:srgbClr>
-                </a:outerShdw>
-              </a:effectLst>
-              <a:latin typeface="-윤고딕310" panose="02030504000101010101" pitchFamily="18" charset="-127"/>
-              <a:ea typeface="-윤고딕310" panose="02030504000101010101" pitchFamily="18" charset="-127"/>
-            </a:endParaRPr>
-          </a:p>
-          <a:p>
-            <a:pPr marL="457200" indent="-457200">
-              <a:buFont typeface="Arial" panose="020B0604020202020204" pitchFamily="34" charset="0"/>
-              <a:buChar char="•"/>
-            </a:pPr>
             <a:endParaRPr lang="en-US" altLang="ko-KR" sz="3000" dirty="0">
               <a:solidFill>
                 <a:schemeClr val="bg1"/>
@@ -22066,41 +22598,7 @@
                 <a:latin typeface="-윤고딕310" panose="02030504000101010101" pitchFamily="18" charset="-127"/>
                 <a:ea typeface="-윤고딕310" panose="02030504000101010101" pitchFamily="18" charset="-127"/>
               </a:rPr>
-              <a:t>그러나 여전히 빈부의 격차는 남아있다</a:t>
-            </a:r>
-            <a:r>
-              <a:rPr lang="en-US" altLang="ko-KR" sz="3000" dirty="0" smtClean="0">
-                <a:solidFill>
-                  <a:schemeClr val="bg1"/>
-                </a:solidFill>
-                <a:effectLst>
-                  <a:outerShdw blurRad="38100" dist="38100" dir="2700000" algn="tl">
-                    <a:srgbClr val="000000">
-                      <a:alpha val="43137"/>
-                    </a:srgbClr>
-                  </a:outerShdw>
-                </a:effectLst>
-                <a:latin typeface="-윤고딕310" panose="02030504000101010101" pitchFamily="18" charset="-127"/>
-                <a:ea typeface="-윤고딕310" panose="02030504000101010101" pitchFamily="18" charset="-127"/>
-              </a:rPr>
-              <a:t>. </a:t>
-            </a:r>
-            <a:r>
-              <a:rPr lang="ko-KR" altLang="en-US" sz="3000" dirty="0" smtClean="0">
-                <a:solidFill>
-                  <a:schemeClr val="bg1"/>
-                </a:solidFill>
-                <a:effectLst>
-                  <a:outerShdw blurRad="38100" dist="38100" dir="2700000" algn="tl">
-                    <a:srgbClr val="000000">
-                      <a:alpha val="43137"/>
-                    </a:srgbClr>
-                  </a:outerShdw>
-                </a:effectLst>
-                <a:latin typeface="-윤고딕310" panose="02030504000101010101" pitchFamily="18" charset="-127"/>
-                <a:ea typeface="-윤고딕310" panose="02030504000101010101" pitchFamily="18" charset="-127"/>
-              </a:rPr>
-              <a:t>수많은 외계 종족들도 비슷한 연유로 빈곤한 처지에 있다</a:t>
+              <a:t>수많은 외계 종족들은 빈부의 격차로 빈곤한 처지에 있다</a:t>
             </a:r>
             <a:r>
               <a:rPr lang="en-US" altLang="ko-KR" sz="3000" dirty="0" smtClean="0">
@@ -24933,31 +25431,122 @@
           </a:p>
         </p:txBody>
       </p:sp>
-      <p:sp>
-        <p:nvSpPr>
-          <p:cNvPr id="28" name="TextBox 27"/>
-          <p:cNvSpPr txBox="1"/>
+      <p:grpSp>
+        <p:nvGrpSpPr>
+          <p:cNvPr id="16" name="그룹 15"/>
+          <p:cNvGrpSpPr/>
           <p:nvPr/>
-        </p:nvSpPr>
-        <p:spPr>
+        </p:nvGrpSpPr>
+        <p:grpSpPr>
           <a:xfrm>
-            <a:off x="4152900" y="5972175"/>
-            <a:ext cx="3886200" cy="369332"/>
+            <a:off x="197992" y="2128357"/>
+            <a:ext cx="11841607" cy="4490148"/>
+            <a:chOff x="197992" y="2128357"/>
+            <a:chExt cx="11841607" cy="4490148"/>
           </a:xfrm>
-          <a:prstGeom prst="rect">
-            <a:avLst/>
-          </a:prstGeom>
-          <a:noFill/>
-        </p:spPr>
-        <p:txBody>
-          <a:bodyPr wrap="square" rtlCol="0" anchor="ctr">
-            <a:spAutoFit/>
-          </a:bodyPr>
-          <a:lstStyle/>
-          <a:p>
-            <a:pPr algn="ctr"/>
-            <a:r>
-              <a:rPr lang="ko-KR" altLang="en-US" dirty="0" smtClean="0">
+        </p:grpSpPr>
+        <p:pic>
+          <p:nvPicPr>
+            <p:cNvPr id="15" name="그림 14"/>
+            <p:cNvPicPr>
+              <a:picLocks noChangeAspect="1"/>
+            </p:cNvPicPr>
+            <p:nvPr/>
+          </p:nvPicPr>
+          <p:blipFill>
+            <a:blip r:embed="rId3">
+              <a:extLst>
+                <a:ext uri="{28A0092B-C50C-407E-A947-70E740481C1C}">
+                  <a14:useLocalDpi xmlns:a14="http://schemas.microsoft.com/office/drawing/2010/main" val="0"/>
+                </a:ext>
+              </a:extLst>
+            </a:blip>
+            <a:stretch>
+              <a:fillRect/>
+            </a:stretch>
+          </p:blipFill>
+          <p:spPr>
+            <a:xfrm>
+              <a:off x="2994215" y="2497689"/>
+              <a:ext cx="6182401" cy="3477600"/>
+            </a:xfrm>
+            <a:prstGeom prst="rect">
+              <a:avLst/>
+            </a:prstGeom>
+          </p:spPr>
+        </p:pic>
+        <p:sp>
+          <p:nvSpPr>
+            <p:cNvPr id="28" name="TextBox 27"/>
+            <p:cNvSpPr txBox="1"/>
+            <p:nvPr/>
+          </p:nvSpPr>
+          <p:spPr>
+            <a:xfrm>
+              <a:off x="4152900" y="6018341"/>
+              <a:ext cx="3886200" cy="276999"/>
+            </a:xfrm>
+            <a:prstGeom prst="rect">
+              <a:avLst/>
+            </a:prstGeom>
+            <a:noFill/>
+          </p:spPr>
+          <p:txBody>
+            <a:bodyPr wrap="square" rtlCol="0" anchor="ctr">
+              <a:spAutoFit/>
+            </a:bodyPr>
+            <a:lstStyle/>
+            <a:p>
+              <a:pPr algn="ctr"/>
+              <a:r>
+                <a:rPr lang="ko-KR" altLang="en-US" sz="1200" dirty="0" smtClean="0">
+                  <a:solidFill>
+                    <a:schemeClr val="bg1"/>
+                  </a:solidFill>
+                  <a:effectLst>
+                    <a:outerShdw blurRad="38100" dist="38100" dir="2700000" algn="tl">
+                      <a:srgbClr val="000000">
+                        <a:alpha val="43137"/>
+                      </a:srgbClr>
+                    </a:outerShdw>
+                  </a:effectLst>
+                  <a:latin typeface="+mn-ea"/>
+                </a:rPr>
+                <a:t>예시</a:t>
+              </a:r>
+              <a:r>
+                <a:rPr lang="en-US" altLang="ko-KR" sz="1200" dirty="0" smtClean="0">
+                  <a:solidFill>
+                    <a:schemeClr val="bg1"/>
+                  </a:solidFill>
+                  <a:effectLst>
+                    <a:outerShdw blurRad="38100" dist="38100" dir="2700000" algn="tl">
+                      <a:srgbClr val="000000">
+                        <a:alpha val="43137"/>
+                      </a:srgbClr>
+                    </a:outerShdw>
+                  </a:effectLst>
+                  <a:latin typeface="+mn-ea"/>
+                </a:rPr>
+                <a:t>: FTL</a:t>
+              </a:r>
+              <a:r>
+                <a:rPr lang="ko-KR" altLang="en-US" sz="1200" dirty="0" smtClean="0">
+                  <a:solidFill>
+                    <a:schemeClr val="bg1"/>
+                  </a:solidFill>
+                  <a:effectLst>
+                    <a:outerShdw blurRad="38100" dist="38100" dir="2700000" algn="tl">
+                      <a:srgbClr val="000000">
+                        <a:alpha val="43137"/>
+                      </a:srgbClr>
+                    </a:outerShdw>
+                  </a:effectLst>
+                  <a:latin typeface="+mn-ea"/>
+                </a:rPr>
+                <a:t>의 전투 사진</a:t>
+              </a:r>
+              <a:endParaRPr lang="ko-KR" altLang="en-US" sz="1200" dirty="0">
                 <a:solidFill>
                   <a:schemeClr val="bg1"/>
                 </a:solidFill>
@@ -24969,149 +25558,424 @@
                   </a:outerShdw>
                 </a:effectLst>
                 <a:latin typeface="+mn-ea"/>
-              </a:rPr>
-              <a:t>예시</a:t>
-            </a:r>
-            <a:r>
-              <a:rPr lang="en-US" altLang="ko-KR" dirty="0" smtClean="0">
-                <a:solidFill>
-                  <a:schemeClr val="bg1"/>
-                </a:solidFill>
-                <a:effectLst>
-                  <a:outerShdw blurRad="38100" dist="38100" dir="2700000" algn="tl">
-                    <a:srgbClr val="000000">
-                      <a:alpha val="43137"/>
-                    </a:srgbClr>
-                  </a:outerShdw>
-                </a:effectLst>
-                <a:latin typeface="+mn-ea"/>
-              </a:rPr>
-              <a:t>: FTL</a:t>
-            </a:r>
-            <a:r>
-              <a:rPr lang="ko-KR" altLang="en-US" dirty="0" smtClean="0">
-                <a:solidFill>
-                  <a:schemeClr val="bg1"/>
-                </a:solidFill>
-                <a:effectLst>
-                  <a:outerShdw blurRad="38100" dist="38100" dir="2700000" algn="tl">
-                    <a:srgbClr val="000000">
-                      <a:alpha val="43137"/>
-                    </a:srgbClr>
-                  </a:outerShdw>
-                </a:effectLst>
-                <a:latin typeface="+mn-ea"/>
-              </a:rPr>
-              <a:t>의 전투 사진</a:t>
-            </a:r>
-            <a:endParaRPr lang="ko-KR" altLang="en-US" dirty="0">
-              <a:solidFill>
-                <a:schemeClr val="bg1"/>
-              </a:solidFill>
-              <a:effectLst>
-                <a:outerShdw blurRad="38100" dist="38100" dir="2700000" algn="tl">
-                  <a:srgbClr val="000000">
-                    <a:alpha val="43137"/>
-                  </a:srgbClr>
-                </a:outerShdw>
-              </a:effectLst>
-              <a:latin typeface="+mn-ea"/>
-            </a:endParaRPr>
-          </a:p>
-        </p:txBody>
-      </p:sp>
-      <p:pic>
-        <p:nvPicPr>
-          <p:cNvPr id="5" name="그림 4"/>
-          <p:cNvPicPr>
-            <a:picLocks noChangeAspect="1"/>
-          </p:cNvPicPr>
-          <p:nvPr/>
-        </p:nvPicPr>
-        <p:blipFill>
-          <a:blip r:embed="rId3">
-            <a:extLst>
-              <a:ext uri="{28A0092B-C50C-407E-A947-70E740481C1C}">
-                <a14:useLocalDpi xmlns:a14="http://schemas.microsoft.com/office/drawing/2010/main" val="0"/>
-              </a:ext>
-            </a:extLst>
-          </a:blip>
-          <a:stretch>
-            <a:fillRect/>
-          </a:stretch>
-        </p:blipFill>
-        <p:spPr>
-          <a:xfrm>
-            <a:off x="3171825" y="2495550"/>
-            <a:ext cx="5848350" cy="3476625"/>
-          </a:xfrm>
-          <a:prstGeom prst="rect">
-            <a:avLst/>
-          </a:prstGeom>
-        </p:spPr>
-      </p:pic>
-      <p:sp>
-        <p:nvSpPr>
-          <p:cNvPr id="29" name="TextBox 28"/>
-          <p:cNvSpPr txBox="1"/>
-          <p:nvPr/>
-        </p:nvSpPr>
-        <p:spPr>
-          <a:xfrm>
-            <a:off x="6265416" y="2128357"/>
-            <a:ext cx="4069209" cy="369332"/>
-          </a:xfrm>
-          <a:prstGeom prst="rect">
-            <a:avLst/>
-          </a:prstGeom>
-          <a:noFill/>
-        </p:spPr>
-        <p:txBody>
-          <a:bodyPr wrap="square" rtlCol="0">
-            <a:spAutoFit/>
-          </a:bodyPr>
-          <a:lstStyle/>
-          <a:p>
-            <a:r>
-              <a:rPr lang="en-US" altLang="ko-KR" dirty="0" smtClean="0">
-                <a:solidFill>
-                  <a:schemeClr val="bg1"/>
-                </a:solidFill>
-              </a:rPr>
-              <a:t>(</a:t>
-            </a:r>
-            <a:r>
-              <a:rPr lang="ko-KR" altLang="en-US" dirty="0" smtClean="0">
-                <a:solidFill>
-                  <a:schemeClr val="bg1"/>
-                </a:solidFill>
-              </a:rPr>
-              <a:t>분리된</a:t>
-            </a:r>
-            <a:r>
-              <a:rPr lang="en-US" altLang="ko-KR" dirty="0" smtClean="0">
-                <a:solidFill>
-                  <a:schemeClr val="bg1"/>
-                </a:solidFill>
-              </a:rPr>
-              <a:t>) </a:t>
-            </a:r>
-            <a:r>
-              <a:rPr lang="ko-KR" altLang="en-US" dirty="0" smtClean="0">
-                <a:solidFill>
-                  <a:schemeClr val="bg1"/>
-                </a:solidFill>
-              </a:rPr>
-              <a:t>전지적 시점에서 게임이 진행</a:t>
-            </a:r>
-            <a:endParaRPr lang="ko-KR" altLang="en-US" dirty="0">
-              <a:solidFill>
-                <a:schemeClr val="bg1"/>
-              </a:solidFill>
-            </a:endParaRPr>
-          </a:p>
-        </p:txBody>
-      </p:sp>
+              </a:endParaRPr>
+            </a:p>
+          </p:txBody>
+        </p:sp>
+        <p:sp>
+          <p:nvSpPr>
+            <p:cNvPr id="29" name="TextBox 28"/>
+            <p:cNvSpPr txBox="1"/>
+            <p:nvPr/>
+          </p:nvSpPr>
+          <p:spPr>
+            <a:xfrm>
+              <a:off x="7543800" y="2128357"/>
+              <a:ext cx="4069209" cy="369332"/>
+            </a:xfrm>
+            <a:prstGeom prst="rect">
+              <a:avLst/>
+            </a:prstGeom>
+            <a:noFill/>
+          </p:spPr>
+          <p:txBody>
+            <a:bodyPr wrap="square" rtlCol="0">
+              <a:spAutoFit/>
+            </a:bodyPr>
+            <a:lstStyle/>
+            <a:p>
+              <a:r>
+                <a:rPr lang="en-US" altLang="ko-KR" dirty="0" smtClean="0">
+                  <a:solidFill>
+                    <a:schemeClr val="bg1"/>
+                  </a:solidFill>
+                  <a:effectLst>
+                    <a:outerShdw blurRad="38100" dist="38100" dir="2700000" algn="tl">
+                      <a:srgbClr val="000000">
+                        <a:alpha val="43137"/>
+                      </a:srgbClr>
+                    </a:outerShdw>
+                  </a:effectLst>
+                </a:rPr>
+                <a:t>(</a:t>
+              </a:r>
+              <a:r>
+                <a:rPr lang="ko-KR" altLang="en-US" dirty="0" smtClean="0">
+                  <a:solidFill>
+                    <a:schemeClr val="bg1"/>
+                  </a:solidFill>
+                  <a:effectLst>
+                    <a:outerShdw blurRad="38100" dist="38100" dir="2700000" algn="tl">
+                      <a:srgbClr val="000000">
+                        <a:alpha val="43137"/>
+                      </a:srgbClr>
+                    </a:outerShdw>
+                  </a:effectLst>
+                </a:rPr>
+                <a:t>분리된</a:t>
+              </a:r>
+              <a:r>
+                <a:rPr lang="en-US" altLang="ko-KR" dirty="0" smtClean="0">
+                  <a:solidFill>
+                    <a:schemeClr val="bg1"/>
+                  </a:solidFill>
+                  <a:effectLst>
+                    <a:outerShdw blurRad="38100" dist="38100" dir="2700000" algn="tl">
+                      <a:srgbClr val="000000">
+                        <a:alpha val="43137"/>
+                      </a:srgbClr>
+                    </a:outerShdw>
+                  </a:effectLst>
+                </a:rPr>
+                <a:t>) </a:t>
+              </a:r>
+              <a:r>
+                <a:rPr lang="ko-KR" altLang="en-US" dirty="0" smtClean="0">
+                  <a:solidFill>
+                    <a:schemeClr val="bg1"/>
+                  </a:solidFill>
+                  <a:effectLst>
+                    <a:outerShdw blurRad="38100" dist="38100" dir="2700000" algn="tl">
+                      <a:srgbClr val="000000">
+                        <a:alpha val="43137"/>
+                      </a:srgbClr>
+                    </a:outerShdw>
+                  </a:effectLst>
+                </a:rPr>
+                <a:t>전지적 시점에서 게임이 진행</a:t>
+              </a:r>
+              <a:r>
+                <a:rPr lang="en-US" altLang="ko-KR" dirty="0" smtClean="0">
+                  <a:solidFill>
+                    <a:schemeClr val="bg1"/>
+                  </a:solidFill>
+                  <a:effectLst>
+                    <a:outerShdw blurRad="38100" dist="38100" dir="2700000" algn="tl">
+                      <a:srgbClr val="000000">
+                        <a:alpha val="43137"/>
+                      </a:srgbClr>
+                    </a:outerShdw>
+                  </a:effectLst>
+                </a:rPr>
+                <a:t>.</a:t>
+              </a:r>
+              <a:endParaRPr lang="ko-KR" altLang="en-US" dirty="0">
+                <a:solidFill>
+                  <a:schemeClr val="bg1"/>
+                </a:solidFill>
+                <a:effectLst>
+                  <a:outerShdw blurRad="38100" dist="38100" dir="2700000" algn="tl">
+                    <a:srgbClr val="000000">
+                      <a:alpha val="43137"/>
+                    </a:srgbClr>
+                  </a:outerShdw>
+                </a:effectLst>
+              </a:endParaRPr>
+            </a:p>
+          </p:txBody>
+        </p:sp>
+        <p:sp>
+          <p:nvSpPr>
+            <p:cNvPr id="35" name="TextBox 34"/>
+            <p:cNvSpPr txBox="1"/>
+            <p:nvPr/>
+          </p:nvSpPr>
+          <p:spPr>
+            <a:xfrm>
+              <a:off x="7477124" y="5972174"/>
+              <a:ext cx="4562475" cy="646331"/>
+            </a:xfrm>
+            <a:prstGeom prst="rect">
+              <a:avLst/>
+            </a:prstGeom>
+            <a:noFill/>
+          </p:spPr>
+          <p:txBody>
+            <a:bodyPr wrap="square" rtlCol="0">
+              <a:spAutoFit/>
+            </a:bodyPr>
+            <a:lstStyle/>
+            <a:p>
+              <a:r>
+                <a:rPr lang="ko-KR" altLang="en-US" dirty="0" smtClean="0">
+                  <a:solidFill>
+                    <a:schemeClr val="bg1"/>
+                  </a:solidFill>
+                  <a:effectLst>
+                    <a:outerShdw blurRad="38100" dist="38100" dir="2700000" algn="tl">
+                      <a:srgbClr val="000000">
+                        <a:alpha val="43137"/>
+                      </a:srgbClr>
+                    </a:outerShdw>
+                  </a:effectLst>
+                </a:rPr>
+                <a:t>적과 자기 함선이 분리된 영역에 표시된다</a:t>
+              </a:r>
+              <a:r>
+                <a:rPr lang="en-US" altLang="ko-KR" dirty="0" smtClean="0">
+                  <a:solidFill>
+                    <a:schemeClr val="bg1"/>
+                  </a:solidFill>
+                  <a:effectLst>
+                    <a:outerShdw blurRad="38100" dist="38100" dir="2700000" algn="tl">
+                      <a:srgbClr val="000000">
+                        <a:alpha val="43137"/>
+                      </a:srgbClr>
+                    </a:outerShdw>
+                  </a:effectLst>
+                </a:rPr>
+                <a:t>.</a:t>
+              </a:r>
+            </a:p>
+            <a:p>
+              <a:r>
+                <a:rPr lang="ko-KR" altLang="en-US" smtClean="0">
+                  <a:solidFill>
+                    <a:schemeClr val="bg1"/>
+                  </a:solidFill>
+                  <a:effectLst>
+                    <a:outerShdw blurRad="38100" dist="38100" dir="2700000" algn="tl">
+                      <a:srgbClr val="000000">
+                        <a:alpha val="43137"/>
+                      </a:srgbClr>
+                    </a:outerShdw>
+                  </a:effectLst>
+                </a:rPr>
+                <a:t>추가 메뉴 </a:t>
+              </a:r>
+              <a:r>
+                <a:rPr lang="ko-KR" altLang="en-US" dirty="0" smtClean="0">
+                  <a:solidFill>
+                    <a:schemeClr val="bg1"/>
+                  </a:solidFill>
+                  <a:effectLst>
+                    <a:outerShdw blurRad="38100" dist="38100" dir="2700000" algn="tl">
+                      <a:srgbClr val="000000">
+                        <a:alpha val="43137"/>
+                      </a:srgbClr>
+                    </a:outerShdw>
+                  </a:effectLst>
+                </a:rPr>
+                <a:t>역시 함선의 우측에 표시된다</a:t>
+              </a:r>
+              <a:r>
+                <a:rPr lang="en-US" altLang="ko-KR" dirty="0" smtClean="0">
+                  <a:solidFill>
+                    <a:schemeClr val="bg1"/>
+                  </a:solidFill>
+                  <a:effectLst>
+                    <a:outerShdw blurRad="38100" dist="38100" dir="2700000" algn="tl">
+                      <a:srgbClr val="000000">
+                        <a:alpha val="43137"/>
+                      </a:srgbClr>
+                    </a:outerShdw>
+                  </a:effectLst>
+                </a:rPr>
+                <a:t>.</a:t>
+              </a:r>
+              <a:endParaRPr lang="ko-KR" altLang="en-US" dirty="0">
+                <a:solidFill>
+                  <a:schemeClr val="bg1"/>
+                </a:solidFill>
+                <a:effectLst>
+                  <a:outerShdw blurRad="38100" dist="38100" dir="2700000" algn="tl">
+                    <a:srgbClr val="000000">
+                      <a:alpha val="43137"/>
+                    </a:srgbClr>
+                  </a:outerShdw>
+                </a:effectLst>
+              </a:endParaRPr>
+            </a:p>
+          </p:txBody>
+        </p:sp>
+        <p:sp>
+          <p:nvSpPr>
+            <p:cNvPr id="38" name="TextBox 37"/>
+            <p:cNvSpPr txBox="1"/>
+            <p:nvPr/>
+          </p:nvSpPr>
+          <p:spPr>
+            <a:xfrm>
+              <a:off x="197992" y="5972173"/>
+              <a:ext cx="4288284" cy="646331"/>
+            </a:xfrm>
+            <a:prstGeom prst="rect">
+              <a:avLst/>
+            </a:prstGeom>
+            <a:noFill/>
+          </p:spPr>
+          <p:txBody>
+            <a:bodyPr wrap="square" rtlCol="0">
+              <a:spAutoFit/>
+            </a:bodyPr>
+            <a:lstStyle/>
+            <a:p>
+              <a:pPr algn="r"/>
+              <a:r>
+                <a:rPr lang="ko-KR" altLang="en-US" dirty="0" smtClean="0">
+                  <a:solidFill>
+                    <a:schemeClr val="bg1"/>
+                  </a:solidFill>
+                  <a:effectLst>
+                    <a:outerShdw blurRad="38100" dist="38100" dir="2700000" algn="tl">
+                      <a:srgbClr val="000000">
+                        <a:alpha val="43137"/>
+                      </a:srgbClr>
+                    </a:outerShdw>
+                  </a:effectLst>
+                </a:rPr>
+                <a:t>함선마다 다양한 기능을 달고 있다</a:t>
+              </a:r>
+              <a:r>
+                <a:rPr lang="en-US" altLang="ko-KR" dirty="0" smtClean="0">
+                  <a:solidFill>
+                    <a:schemeClr val="bg1"/>
+                  </a:solidFill>
+                  <a:effectLst>
+                    <a:outerShdw blurRad="38100" dist="38100" dir="2700000" algn="tl">
+                      <a:srgbClr val="000000">
+                        <a:alpha val="43137"/>
+                      </a:srgbClr>
+                    </a:outerShdw>
+                  </a:effectLst>
+                </a:rPr>
+                <a:t>.</a:t>
+              </a:r>
+            </a:p>
+            <a:p>
+              <a:pPr algn="r"/>
+              <a:r>
+                <a:rPr lang="ko-KR" altLang="en-US" dirty="0" smtClean="0">
+                  <a:solidFill>
+                    <a:schemeClr val="bg1"/>
+                  </a:solidFill>
+                  <a:effectLst>
+                    <a:outerShdw blurRad="38100" dist="38100" dir="2700000" algn="tl">
+                      <a:srgbClr val="000000">
+                        <a:alpha val="43137"/>
+                      </a:srgbClr>
+                    </a:outerShdw>
+                  </a:effectLst>
+                </a:rPr>
+                <a:t>각 기능들은 강화</a:t>
+              </a:r>
+              <a:r>
+                <a:rPr lang="en-US" altLang="ko-KR" dirty="0" smtClean="0">
+                  <a:solidFill>
+                    <a:schemeClr val="bg1"/>
+                  </a:solidFill>
+                  <a:effectLst>
+                    <a:outerShdw blurRad="38100" dist="38100" dir="2700000" algn="tl">
+                      <a:srgbClr val="000000">
+                        <a:alpha val="43137"/>
+                      </a:srgbClr>
+                    </a:outerShdw>
+                  </a:effectLst>
+                </a:rPr>
+                <a:t>, </a:t>
+              </a:r>
+              <a:r>
+                <a:rPr lang="ko-KR" altLang="en-US" dirty="0" smtClean="0">
+                  <a:solidFill>
+                    <a:schemeClr val="bg1"/>
+                  </a:solidFill>
+                  <a:effectLst>
+                    <a:outerShdw blurRad="38100" dist="38100" dir="2700000" algn="tl">
+                      <a:srgbClr val="000000">
+                        <a:alpha val="43137"/>
+                      </a:srgbClr>
+                    </a:outerShdw>
+                  </a:effectLst>
+                </a:rPr>
+                <a:t>추가가 가능하다</a:t>
+              </a:r>
+              <a:r>
+                <a:rPr lang="en-US" altLang="ko-KR" dirty="0" smtClean="0">
+                  <a:solidFill>
+                    <a:schemeClr val="bg1"/>
+                  </a:solidFill>
+                  <a:effectLst>
+                    <a:outerShdw blurRad="38100" dist="38100" dir="2700000" algn="tl">
+                      <a:srgbClr val="000000">
+                        <a:alpha val="43137"/>
+                      </a:srgbClr>
+                    </a:outerShdw>
+                  </a:effectLst>
+                </a:rPr>
+                <a:t>.</a:t>
+              </a:r>
+            </a:p>
+          </p:txBody>
+        </p:sp>
+        <p:sp>
+          <p:nvSpPr>
+            <p:cNvPr id="39" name="TextBox 38"/>
+            <p:cNvSpPr txBox="1"/>
+            <p:nvPr/>
+          </p:nvSpPr>
+          <p:spPr>
+            <a:xfrm>
+              <a:off x="578992" y="2132639"/>
+              <a:ext cx="3907284" cy="369332"/>
+            </a:xfrm>
+            <a:prstGeom prst="rect">
+              <a:avLst/>
+            </a:prstGeom>
+            <a:noFill/>
+          </p:spPr>
+          <p:txBody>
+            <a:bodyPr wrap="square" rtlCol="0">
+              <a:spAutoFit/>
+            </a:bodyPr>
+            <a:lstStyle/>
+            <a:p>
+              <a:pPr algn="r"/>
+              <a:r>
+                <a:rPr lang="ko-KR" altLang="en-US" dirty="0" smtClean="0">
+                  <a:solidFill>
+                    <a:schemeClr val="bg1"/>
+                  </a:solidFill>
+                  <a:effectLst>
+                    <a:outerShdw blurRad="38100" dist="38100" dir="2700000" algn="tl">
+                      <a:srgbClr val="000000">
+                        <a:alpha val="43137"/>
+                      </a:srgbClr>
+                    </a:outerShdw>
+                  </a:effectLst>
+                </a:rPr>
+                <a:t>함선들은 방과 문으로 분리되어 있다</a:t>
+              </a:r>
+              <a:r>
+                <a:rPr lang="en-US" altLang="ko-KR" dirty="0" smtClean="0">
+                  <a:solidFill>
+                    <a:schemeClr val="bg1"/>
+                  </a:solidFill>
+                  <a:effectLst>
+                    <a:outerShdw blurRad="38100" dist="38100" dir="2700000" algn="tl">
+                      <a:srgbClr val="000000">
+                        <a:alpha val="43137"/>
+                      </a:srgbClr>
+                    </a:outerShdw>
+                  </a:effectLst>
+                </a:rPr>
+                <a:t>.</a:t>
+              </a:r>
+              <a:endParaRPr lang="ko-KR" altLang="en-US" dirty="0">
+                <a:solidFill>
+                  <a:schemeClr val="bg1"/>
+                </a:solidFill>
+                <a:effectLst>
+                  <a:outerShdw blurRad="38100" dist="38100" dir="2700000" algn="tl">
+                    <a:srgbClr val="000000">
+                      <a:alpha val="43137"/>
+                    </a:srgbClr>
+                  </a:outerShdw>
+                </a:effectLst>
+              </a:endParaRPr>
+            </a:p>
+          </p:txBody>
+        </p:sp>
+      </p:grpSp>
     </p:spTree>
     <p:extLst>
       <p:ext uri="{BB962C8B-B14F-4D97-AF65-F5344CB8AC3E}">
@@ -25444,7 +26308,24 @@
                 <a:latin typeface="-윤고딕310" panose="02030504000101010101" pitchFamily="18" charset="-127"/>
                 <a:ea typeface="-윤고딕310" panose="02030504000101010101" pitchFamily="18" charset="-127"/>
               </a:rPr>
-              <a:t>그러나 시점과 </a:t>
+              <a:t>그러나 시점에서는 스타바운드를 닮았으며 전투 의외의 시스템은 둘 다와 판이하다 </a:t>
+            </a:r>
+            <a:r>
+              <a:rPr lang="en-US" altLang="ko-KR" sz="2000" dirty="0" smtClean="0">
+                <a:solidFill>
+                  <a:schemeClr val="bg1"/>
+                </a:solidFill>
+                <a:effectLst>
+                  <a:outerShdw blurRad="38100" dist="38100" dir="2700000" algn="tl">
+                    <a:srgbClr val="000000">
+                      <a:alpha val="43137"/>
+                    </a:srgbClr>
+                  </a:outerShdw>
+                </a:effectLst>
+                <a:latin typeface="-윤고딕310" panose="02030504000101010101" pitchFamily="18" charset="-127"/>
+                <a:ea typeface="-윤고딕310" panose="02030504000101010101" pitchFamily="18" charset="-127"/>
+              </a:rPr>
+              <a:t>.</a:t>
             </a:r>
             <a:endParaRPr lang="en-US" altLang="ko-KR" sz="2000" dirty="0">
               <a:solidFill>
@@ -25973,16 +26854,16 @@
       </p:sp>
       <p:grpSp>
         <p:nvGrpSpPr>
-          <p:cNvPr id="39" name="그룹 38"/>
+          <p:cNvPr id="41" name="그룹 40"/>
           <p:cNvGrpSpPr/>
           <p:nvPr/>
         </p:nvGrpSpPr>
         <p:grpSpPr>
           <a:xfrm>
-            <a:off x="2561166" y="1917129"/>
-            <a:ext cx="8116359" cy="4424378"/>
-            <a:chOff x="2561166" y="1917129"/>
-            <a:chExt cx="8116359" cy="4424378"/>
+            <a:off x="2561166" y="2141665"/>
+            <a:ext cx="8116359" cy="4153675"/>
+            <a:chOff x="2561166" y="2141665"/>
+            <a:chExt cx="8116359" cy="4153675"/>
           </a:xfrm>
         </p:grpSpPr>
         <p:sp>
@@ -25993,8 +26874,8 @@
           </p:nvSpPr>
           <p:spPr>
             <a:xfrm>
-              <a:off x="4152900" y="5972175"/>
-              <a:ext cx="3886200" cy="369332"/>
+              <a:off x="4152900" y="6018341"/>
+              <a:ext cx="3886200" cy="276999"/>
             </a:xfrm>
             <a:prstGeom prst="rect">
               <a:avLst/>
@@ -26009,7 +26890,7 @@
             <a:p>
               <a:pPr algn="ctr"/>
               <a:r>
-                <a:rPr lang="ko-KR" altLang="en-US" dirty="0" smtClean="0">
+                <a:rPr lang="ko-KR" altLang="en-US" sz="1200" dirty="0" smtClean="0">
                   <a:solidFill>
                     <a:schemeClr val="bg1"/>
                   </a:solidFill>
@@ -26025,7 +26906,7 @@
                 <a:t>예시</a:t>
               </a:r>
               <a:r>
-                <a:rPr lang="en-US" altLang="ko-KR" dirty="0" smtClean="0">
+                <a:rPr lang="en-US" altLang="ko-KR" sz="1200" dirty="0" smtClean="0">
                   <a:solidFill>
                     <a:schemeClr val="bg1"/>
                   </a:solidFill>
@@ -26041,7 +26922,7 @@
                 <a:t>: </a:t>
               </a:r>
               <a:r>
-                <a:rPr lang="ko-KR" altLang="en-US" dirty="0" smtClean="0">
+                <a:rPr lang="ko-KR" altLang="en-US" sz="1200" dirty="0" smtClean="0">
                   <a:solidFill>
                     <a:schemeClr val="bg1"/>
                   </a:solidFill>
@@ -26056,7 +26937,7 @@
                 </a:rPr>
                 <a:t>스타바운드의 우주선 사진</a:t>
               </a:r>
-              <a:endParaRPr lang="ko-KR" altLang="en-US" dirty="0">
+              <a:endParaRPr lang="ko-KR" altLang="en-US" sz="1200" dirty="0">
                 <a:solidFill>
                   <a:schemeClr val="bg1"/>
                 </a:solidFill>
@@ -26080,9 +26961,9 @@
           </p:nvGrpSpPr>
           <p:grpSpPr>
             <a:xfrm>
-              <a:off x="2561166" y="1917129"/>
+              <a:off x="2561166" y="2141665"/>
               <a:ext cx="8116359" cy="3876676"/>
-              <a:chOff x="2561166" y="1917129"/>
+              <a:chOff x="2561166" y="2046642"/>
               <a:chExt cx="8116359" cy="3876676"/>
             </a:xfrm>
           </p:grpSpPr>
@@ -26094,9 +26975,9 @@
             </p:nvGrpSpPr>
             <p:grpSpPr>
               <a:xfrm>
-                <a:off x="2561166" y="1917129"/>
+                <a:off x="2561166" y="2046642"/>
                 <a:ext cx="7048500" cy="3876676"/>
-                <a:chOff x="2561166" y="1917129"/>
+                <a:chOff x="2561166" y="2046642"/>
                 <a:chExt cx="7048500" cy="3876676"/>
               </a:xfrm>
             </p:grpSpPr>
@@ -26108,9 +26989,9 @@
               </p:nvGrpSpPr>
               <p:grpSpPr>
                 <a:xfrm>
-                  <a:off x="2561166" y="1917129"/>
+                  <a:off x="2561166" y="2046642"/>
                   <a:ext cx="7048500" cy="3876676"/>
-                  <a:chOff x="2561166" y="1917129"/>
+                  <a:chOff x="2561166" y="2046642"/>
                   <a:chExt cx="7048500" cy="3876676"/>
                 </a:xfrm>
               </p:grpSpPr>
@@ -26122,9 +27003,9 @@
                 </p:nvGrpSpPr>
                 <p:grpSpPr>
                   <a:xfrm>
-                    <a:off x="2561166" y="1917129"/>
+                    <a:off x="2561166" y="2046642"/>
                     <a:ext cx="7048500" cy="3876676"/>
-                    <a:chOff x="2561166" y="2031429"/>
+                    <a:chOff x="2561166" y="2160942"/>
                     <a:chExt cx="7048500" cy="3876676"/>
                   </a:xfrm>
                 </p:grpSpPr>
@@ -26151,7 +27032,7 @@
                   </p:blipFill>
                   <p:spPr bwMode="auto">
                     <a:xfrm>
-                      <a:off x="2561166" y="2031429"/>
+                      <a:off x="2561166" y="2160942"/>
                       <a:ext cx="7048500" cy="3876676"/>
                     </a:xfrm>
                     <a:prstGeom prst="rect">
@@ -26271,7 +27152,15 @@
                             <a:lstStyle/>
                             <a:p>
                               <a:pPr algn="ctr"/>
-                              <a:endParaRPr lang="ko-KR" altLang="en-US"/>
+                              <a:endParaRPr lang="ko-KR" altLang="en-US">
+                                <a:effectLst>
+                                  <a:outerShdw blurRad="38100" dist="38100" dir="2700000" algn="tl">
+                                    <a:srgbClr val="000000">
+                                      <a:alpha val="43137"/>
+                                    </a:srgbClr>
+                                  </a:outerShdw>
+                                </a:effectLst>
+                              </a:endParaRPr>
                             </a:p>
                           </p:txBody>
                         </p:sp>
@@ -26321,7 +27210,15 @@
                             <a:lstStyle/>
                             <a:p>
                               <a:pPr algn="ctr"/>
-                              <a:endParaRPr lang="ko-KR" altLang="en-US"/>
+                              <a:endParaRPr lang="ko-KR" altLang="en-US">
+                                <a:effectLst>
+                                  <a:outerShdw blurRad="38100" dist="38100" dir="2700000" algn="tl">
+                                    <a:srgbClr val="000000">
+                                      <a:alpha val="43137"/>
+                                    </a:srgbClr>
+                                  </a:outerShdw>
+                                </a:effectLst>
+                              </a:endParaRPr>
                             </a:p>
                           </p:txBody>
                         </p:sp>
@@ -26372,7 +27269,15 @@
                           <a:lstStyle/>
                           <a:p>
                             <a:pPr algn="ctr"/>
-                            <a:endParaRPr lang="ko-KR" altLang="en-US"/>
+                            <a:endParaRPr lang="ko-KR" altLang="en-US">
+                              <a:effectLst>
+                                <a:outerShdw blurRad="38100" dist="38100" dir="2700000" algn="tl">
+                                  <a:srgbClr val="000000">
+                                    <a:alpha val="43137"/>
+                                  </a:srgbClr>
+                                </a:outerShdw>
+                              </a:effectLst>
+                            </a:endParaRPr>
                           </a:p>
                         </p:txBody>
                       </p:sp>
@@ -26495,7 +27400,15 @@
                   <a:lstStyle/>
                   <a:p>
                     <a:pPr algn="ctr"/>
-                    <a:endParaRPr lang="ko-KR" altLang="en-US"/>
+                    <a:endParaRPr lang="ko-KR" altLang="en-US">
+                      <a:effectLst>
+                        <a:outerShdw blurRad="38100" dist="38100" dir="2700000" algn="tl">
+                          <a:srgbClr val="000000">
+                            <a:alpha val="43137"/>
+                          </a:srgbClr>
+                        </a:outerShdw>
+                      </a:effectLst>
+                    </a:endParaRPr>
                   </a:p>
                 </p:txBody>
               </p:sp>
@@ -26540,7 +27453,15 @@
                   <a:lstStyle/>
                   <a:p>
                     <a:pPr algn="ctr"/>
-                    <a:endParaRPr lang="ko-KR" altLang="en-US"/>
+                    <a:endParaRPr lang="ko-KR" altLang="en-US">
+                      <a:effectLst>
+                        <a:outerShdw blurRad="38100" dist="38100" dir="2700000" algn="tl">
+                          <a:srgbClr val="000000">
+                            <a:alpha val="43137"/>
+                          </a:srgbClr>
+                        </a:outerShdw>
+                      </a:effectLst>
+                    </a:endParaRPr>
                   </a:p>
                 </p:txBody>
               </p:sp>
@@ -26585,7 +27506,15 @@
                   <a:lstStyle/>
                   <a:p>
                     <a:pPr algn="ctr"/>
-                    <a:endParaRPr lang="ko-KR" altLang="en-US"/>
+                    <a:endParaRPr lang="ko-KR" altLang="en-US">
+                      <a:effectLst>
+                        <a:outerShdw blurRad="38100" dist="38100" dir="2700000" algn="tl">
+                          <a:srgbClr val="000000">
+                            <a:alpha val="43137"/>
+                          </a:srgbClr>
+                        </a:outerShdw>
+                      </a:effectLst>
+                    </a:endParaRPr>
                   </a:p>
                 </p:txBody>
               </p:sp>
@@ -26630,7 +27559,15 @@
                   <a:lstStyle/>
                   <a:p>
                     <a:pPr algn="ctr"/>
-                    <a:endParaRPr lang="ko-KR" altLang="en-US"/>
+                    <a:endParaRPr lang="ko-KR" altLang="en-US">
+                      <a:effectLst>
+                        <a:outerShdw blurRad="38100" dist="38100" dir="2700000" algn="tl">
+                          <a:srgbClr val="000000">
+                            <a:alpha val="43137"/>
+                          </a:srgbClr>
+                        </a:outerShdw>
+                      </a:effectLst>
+                    </a:endParaRPr>
                   </a:p>
                 </p:txBody>
               </p:sp>
@@ -26676,7 +27613,15 @@
                 <a:lstStyle/>
                 <a:p>
                   <a:pPr algn="ctr"/>
-                  <a:endParaRPr lang="ko-KR" altLang="en-US"/>
+                  <a:endParaRPr lang="ko-KR" altLang="en-US">
+                    <a:effectLst>
+                      <a:outerShdw blurRad="38100" dist="38100" dir="2700000" algn="tl">
+                        <a:srgbClr val="000000">
+                          <a:alpha val="43137"/>
+                        </a:srgbClr>
+                      </a:outerShdw>
+                    </a:effectLst>
+                  </a:endParaRPr>
                 </a:p>
               </p:txBody>
             </p:sp>
@@ -26689,7 +27634,7 @@
             </p:nvSpPr>
             <p:spPr>
               <a:xfrm>
-                <a:off x="7458074" y="3240639"/>
+                <a:off x="7458074" y="3370152"/>
                 <a:ext cx="3219451" cy="369332"/>
               </a:xfrm>
               <a:prstGeom prst="rect">
@@ -26708,6 +27653,13 @@
                     <a:solidFill>
                       <a:schemeClr val="bg1"/>
                     </a:solidFill>
+                    <a:effectLst>
+                      <a:outerShdw blurRad="38100" dist="38100" dir="2700000" algn="tl">
+                        <a:srgbClr val="000000">
+                          <a:alpha val="43137"/>
+                        </a:srgbClr>
+                      </a:outerShdw>
+                    </a:effectLst>
                   </a:rPr>
                   <a:t>측면 시점에서 게임이 진행</a:t>
                 </a:r>
@@ -26715,6 +27667,13 @@
                   <a:solidFill>
                     <a:schemeClr val="bg1"/>
                   </a:solidFill>
+                  <a:effectLst>
+                    <a:outerShdw blurRad="38100" dist="38100" dir="2700000" algn="tl">
+                      <a:srgbClr val="000000">
+                        <a:alpha val="43137"/>
+                      </a:srgbClr>
+                    </a:outerShdw>
+                  </a:effectLst>
                 </a:endParaRPr>
               </a:p>
             </p:txBody>
@@ -26729,7 +27688,7 @@
         </p:nvSpPr>
         <p:spPr>
           <a:xfrm>
-            <a:off x="2561166" y="2298581"/>
+            <a:off x="2561166" y="2393604"/>
             <a:ext cx="6201834" cy="646331"/>
           </a:xfrm>
           <a:prstGeom prst="rect">
@@ -26752,6 +27711,13 @@
                 <a:solidFill>
                   <a:schemeClr val="bg1"/>
                 </a:solidFill>
+                <a:effectLst>
+                  <a:outerShdw blurRad="38100" dist="38100" dir="2700000" algn="tl">
+                    <a:srgbClr val="000000">
+                      <a:alpha val="43137"/>
+                    </a:srgbClr>
+                  </a:outerShdw>
+                </a:effectLst>
               </a:rPr>
               <a:t>작은 방의 경우 플레이어의 </a:t>
             </a:r>
@@ -26760,6 +27726,13 @@
                 <a:solidFill>
                   <a:schemeClr val="bg1"/>
                 </a:solidFill>
+                <a:effectLst>
+                  <a:outerShdw blurRad="38100" dist="38100" dir="2700000" algn="tl">
+                    <a:srgbClr val="000000">
+                      <a:alpha val="43137"/>
+                    </a:srgbClr>
+                  </a:outerShdw>
+                </a:effectLst>
               </a:rPr>
               <a:t>4x4 </a:t>
             </a:r>
@@ -26768,6 +27741,13 @@
                 <a:solidFill>
                   <a:schemeClr val="bg1"/>
                 </a:solidFill>
+                <a:effectLst>
+                  <a:outerShdw blurRad="38100" dist="38100" dir="2700000" algn="tl">
+                    <a:srgbClr val="000000">
+                      <a:alpha val="43137"/>
+                    </a:srgbClr>
+                  </a:outerShdw>
+                </a:effectLst>
               </a:rPr>
               <a:t>크기</a:t>
             </a:r>
@@ -26775,6 +27755,13 @@
               <a:solidFill>
                 <a:schemeClr val="bg1"/>
               </a:solidFill>
+              <a:effectLst>
+                <a:outerShdw blurRad="38100" dist="38100" dir="2700000" algn="tl">
+                  <a:srgbClr val="000000">
+                    <a:alpha val="43137"/>
+                  </a:srgbClr>
+                </a:outerShdw>
+              </a:effectLst>
             </a:endParaRPr>
           </a:p>
           <a:p>
@@ -26787,6 +27774,13 @@
                 <a:solidFill>
                   <a:schemeClr val="bg1"/>
                 </a:solidFill>
+                <a:effectLst>
+                  <a:outerShdw blurRad="38100" dist="38100" dir="2700000" algn="tl">
+                    <a:srgbClr val="000000">
+                      <a:alpha val="43137"/>
+                    </a:srgbClr>
+                  </a:outerShdw>
+                </a:effectLst>
               </a:rPr>
               <a:t>플레이어의 활동 영역은 우주선에 한정되어 있다</a:t>
             </a:r>
@@ -26795,6 +27789,13 @@
                 <a:solidFill>
                   <a:schemeClr val="bg1"/>
                 </a:solidFill>
+                <a:effectLst>
+                  <a:outerShdw blurRad="38100" dist="38100" dir="2700000" algn="tl">
+                    <a:srgbClr val="000000">
+                      <a:alpha val="43137"/>
+                    </a:srgbClr>
+                  </a:outerShdw>
+                </a:effectLst>
               </a:rPr>
               <a:t>. </a:t>
             </a:r>
@@ -26802,6 +27803,13 @@
               <a:solidFill>
                 <a:schemeClr val="bg1"/>
               </a:solidFill>
+              <a:effectLst>
+                <a:outerShdw blurRad="38100" dist="38100" dir="2700000" algn="tl">
+                  <a:srgbClr val="000000">
+                    <a:alpha val="43137"/>
+                  </a:srgbClr>
+                </a:outerShdw>
+              </a:effectLst>
             </a:endParaRPr>
           </a:p>
         </p:txBody>

</xml_diff>

<commit_message>
Constant separated. font added.
Signed-off-by: iconstudio <yoyofa2@hotmail.com>
</commit_message>
<xml_diff>
--- a/slides/Cosmos_20171105.pptx
+++ b/slides/Cosmos_20171105.pptx
@@ -9,10 +9,10 @@
     <p:sldMasterId id="2147483662" r:id="rId5"/>
   </p:sldMasterIdLst>
   <p:notesMasterIdLst>
-    <p:notesMasterId r:id="rId29"/>
+    <p:notesMasterId r:id="rId30"/>
   </p:notesMasterIdLst>
   <p:handoutMasterIdLst>
-    <p:handoutMasterId r:id="rId30"/>
+    <p:handoutMasterId r:id="rId31"/>
   </p:handoutMasterIdLst>
   <p:sldIdLst>
     <p:sldId id="257" r:id="rId6"/>
@@ -30,34 +30,35 @@
     <p:sldId id="279" r:id="rId18"/>
     <p:sldId id="280" r:id="rId19"/>
     <p:sldId id="268" r:id="rId20"/>
-    <p:sldId id="260" r:id="rId21"/>
-    <p:sldId id="281" r:id="rId22"/>
-    <p:sldId id="261" r:id="rId23"/>
-    <p:sldId id="269" r:id="rId24"/>
-    <p:sldId id="271" r:id="rId25"/>
-    <p:sldId id="272" r:id="rId26"/>
-    <p:sldId id="273" r:id="rId27"/>
-    <p:sldId id="263" r:id="rId28"/>
+    <p:sldId id="282" r:id="rId21"/>
+    <p:sldId id="260" r:id="rId22"/>
+    <p:sldId id="281" r:id="rId23"/>
+    <p:sldId id="261" r:id="rId24"/>
+    <p:sldId id="269" r:id="rId25"/>
+    <p:sldId id="271" r:id="rId26"/>
+    <p:sldId id="272" r:id="rId27"/>
+    <p:sldId id="273" r:id="rId28"/>
+    <p:sldId id="263" r:id="rId29"/>
   </p:sldIdLst>
   <p:sldSz cx="12192000" cy="6858000"/>
   <p:notesSz cx="9144000" cy="6858000"/>
   <p:embeddedFontLst>
     <p:embeddedFont>
-      <p:font typeface="-윤고딕310" panose="02030504000101010101" pitchFamily="18" charset="-127"/>
-      <p:regular r:id="rId31"/>
-    </p:embeddedFont>
-    <p:embeddedFont>
-      <p:font typeface="Continuum Light" panose="00000400000000000000" pitchFamily="2" charset="0"/>
+      <p:font typeface="-윤고딕320" panose="02030504000101010101" pitchFamily="18" charset="-127"/>
       <p:regular r:id="rId32"/>
     </p:embeddedFont>
     <p:embeddedFont>
-      <p:font typeface="-윤고딕320" panose="02030504000101010101" pitchFamily="18" charset="-127"/>
+      <p:font typeface="-윤고딕310" panose="02030504000101010101" pitchFamily="18" charset="-127"/>
       <p:regular r:id="rId33"/>
     </p:embeddedFont>
     <p:embeddedFont>
       <p:font typeface="맑은 고딕" panose="020B0503020000020004" pitchFamily="50" charset="-127"/>
       <p:regular r:id="rId34"/>
       <p:bold r:id="rId35"/>
+    </p:embeddedFont>
+    <p:embeddedFont>
+      <p:font typeface="Continuum Light" panose="00000400000000000000" pitchFamily="2" charset="0"/>
+      <p:regular r:id="rId36"/>
     </p:embeddedFont>
   </p:embeddedFontLst>
   <p:defaultTextStyle>
@@ -157,7 +158,7 @@
   </p:defaultTextStyle>
   <p:extLst>
     <p:ext uri="{EFAFB233-063F-42B5-8137-9DF3F51BA10A}">
-      <p15:sldGuideLst xmlns="" xmlns:p15="http://schemas.microsoft.com/office/powerpoint/2012/main"/>
+      <p15:sldGuideLst xmlns:p15="http://schemas.microsoft.com/office/powerpoint/2012/main" xmlns=""/>
     </p:ext>
   </p:extLst>
 </p:presentation>
@@ -9671,7 +9672,7 @@
           <a:p>
             <a:fld id="{6FEFB717-BC87-41D7-8B7A-E83E84006AAC}" type="datetimeFigureOut">
               <a:rPr lang="ko-KR" altLang="en-US" smtClean="0"/>
-              <a:t>2017-10-31</a:t>
+              <a:t>2017-11-02</a:t>
             </a:fld>
             <a:endParaRPr lang="ko-KR" altLang="en-US" dirty="0"/>
           </a:p>
@@ -9841,7 +9842,7 @@
           <a:p>
             <a:fld id="{FCC96FB9-AE3A-49E9-BBEB-ACB7ABCC87C1}" type="datetimeFigureOut">
               <a:rPr lang="ko-KR" altLang="en-US" smtClean="0"/>
-              <a:t>2017-10-31</a:t>
+              <a:t>2017-11-02</a:t>
             </a:fld>
             <a:endParaRPr lang="ko-KR" altLang="en-US" dirty="0"/>
           </a:p>
@@ -27628,6 +27629,1201 @@
         </p:nvSpPr>
         <p:spPr>
           <a:xfrm>
+            <a:off x="117687" y="446707"/>
+            <a:ext cx="5453380" cy="523220"/>
+          </a:xfrm>
+          <a:prstGeom prst="rect">
+            <a:avLst/>
+          </a:prstGeom>
+          <a:noFill/>
+        </p:spPr>
+        <p:txBody>
+          <a:bodyPr wrap="square" rtlCol="0">
+            <a:spAutoFit/>
+          </a:bodyPr>
+          <a:lstStyle/>
+          <a:p>
+            <a:r>
+              <a:rPr lang="en-US" altLang="ko-KR" sz="2800" dirty="0">
+                <a:solidFill>
+                  <a:schemeClr val="bg1"/>
+                </a:solidFill>
+                <a:effectLst>
+                  <a:outerShdw blurRad="38100" dist="38100" dir="2700000" algn="tl">
+                    <a:srgbClr val="000000">
+                      <a:alpha val="43137"/>
+                    </a:srgbClr>
+                  </a:outerShdw>
+                </a:effectLst>
+                <a:latin typeface="-윤고딕320" panose="02030504000101010101" pitchFamily="18" charset="-127"/>
+                <a:ea typeface="-윤고딕320" panose="02030504000101010101" pitchFamily="18" charset="-127"/>
+              </a:rPr>
+              <a:t> </a:t>
+            </a:r>
+            <a:r>
+              <a:rPr lang="en-US" altLang="ko-KR" sz="2800" dirty="0" smtClean="0">
+                <a:solidFill>
+                  <a:schemeClr val="bg1"/>
+                </a:solidFill>
+                <a:effectLst>
+                  <a:outerShdw blurRad="38100" dist="38100" dir="2700000" algn="tl">
+                    <a:srgbClr val="000000">
+                      <a:alpha val="43137"/>
+                    </a:srgbClr>
+                  </a:outerShdw>
+                </a:effectLst>
+                <a:latin typeface="-윤고딕320" panose="02030504000101010101" pitchFamily="18" charset="-127"/>
+                <a:ea typeface="-윤고딕320" panose="02030504000101010101" pitchFamily="18" charset="-127"/>
+              </a:rPr>
+              <a:t> </a:t>
+            </a:r>
+            <a:r>
+              <a:rPr lang="ko-KR" altLang="en-US" sz="2800" dirty="0" smtClean="0">
+                <a:solidFill>
+                  <a:schemeClr val="bg1"/>
+                </a:solidFill>
+                <a:effectLst>
+                  <a:outerShdw blurRad="38100" dist="38100" dir="2700000" algn="tl">
+                    <a:srgbClr val="000000">
+                      <a:alpha val="43137"/>
+                    </a:srgbClr>
+                  </a:outerShdw>
+                </a:effectLst>
+                <a:latin typeface="-윤고딕320" panose="02030504000101010101" pitchFamily="18" charset="-127"/>
+                <a:ea typeface="-윤고딕320" panose="02030504000101010101" pitchFamily="18" charset="-127"/>
+              </a:rPr>
+              <a:t>게임 소개 </a:t>
+            </a:r>
+            <a:r>
+              <a:rPr lang="en-US" altLang="ko-KR" sz="2800" dirty="0" smtClean="0">
+                <a:solidFill>
+                  <a:schemeClr val="bg1"/>
+                </a:solidFill>
+                <a:effectLst>
+                  <a:outerShdw blurRad="38100" dist="38100" dir="2700000" algn="tl">
+                    <a:srgbClr val="000000">
+                      <a:alpha val="43137"/>
+                    </a:srgbClr>
+                  </a:outerShdw>
+                </a:effectLst>
+                <a:latin typeface="-윤고딕320" panose="02030504000101010101" pitchFamily="18" charset="-127"/>
+                <a:ea typeface="-윤고딕320" panose="02030504000101010101" pitchFamily="18" charset="-127"/>
+              </a:rPr>
+              <a:t>– </a:t>
+            </a:r>
+            <a:r>
+              <a:rPr lang="ko-KR" altLang="en-US" sz="2800" dirty="0" smtClean="0">
+                <a:solidFill>
+                  <a:schemeClr val="bg1"/>
+                </a:solidFill>
+                <a:effectLst>
+                  <a:outerShdw blurRad="38100" dist="38100" dir="2700000" algn="tl">
+                    <a:srgbClr val="000000">
+                      <a:alpha val="43137"/>
+                    </a:srgbClr>
+                  </a:outerShdw>
+                </a:effectLst>
+                <a:latin typeface="-윤고딕320" panose="02030504000101010101" pitchFamily="18" charset="-127"/>
+                <a:ea typeface="-윤고딕320" panose="02030504000101010101" pitchFamily="18" charset="-127"/>
+              </a:rPr>
+              <a:t>전투</a:t>
+            </a:r>
+            <a:endParaRPr lang="ko-KR" altLang="en-US" sz="2800" dirty="0">
+              <a:solidFill>
+                <a:schemeClr val="bg1"/>
+              </a:solidFill>
+              <a:effectLst>
+                <a:outerShdw blurRad="38100" dist="38100" dir="2700000" algn="tl">
+                  <a:srgbClr val="000000">
+                    <a:alpha val="43137"/>
+                  </a:srgbClr>
+                </a:outerShdw>
+              </a:effectLst>
+              <a:latin typeface="-윤고딕320" panose="02030504000101010101" pitchFamily="18" charset="-127"/>
+              <a:ea typeface="-윤고딕320" panose="02030504000101010101" pitchFamily="18" charset="-127"/>
+            </a:endParaRPr>
+          </a:p>
+        </p:txBody>
+      </p:sp>
+      <p:cxnSp>
+        <p:nvCxnSpPr>
+          <p:cNvPr id="22" name="직선 연결선 21"/>
+          <p:cNvCxnSpPr/>
+          <p:nvPr/>
+        </p:nvCxnSpPr>
+        <p:spPr>
+          <a:xfrm>
+            <a:off x="5499100" y="6680199"/>
+            <a:ext cx="360000" cy="0"/>
+          </a:xfrm>
+          <a:prstGeom prst="line">
+            <a:avLst/>
+          </a:prstGeom>
+          <a:ln w="44450" cap="rnd">
+            <a:solidFill>
+              <a:schemeClr val="accent1"/>
+            </a:solidFill>
+          </a:ln>
+          <a:effectLst>
+            <a:outerShdw blurRad="50800" dist="38100" dir="2700000" algn="tl" rotWithShape="0">
+              <a:prstClr val="black">
+                <a:alpha val="40000"/>
+              </a:prstClr>
+            </a:outerShdw>
+          </a:effectLst>
+        </p:spPr>
+        <p:style>
+          <a:lnRef idx="1">
+            <a:schemeClr val="accent1"/>
+          </a:lnRef>
+          <a:fillRef idx="0">
+            <a:schemeClr val="accent1"/>
+          </a:fillRef>
+          <a:effectRef idx="0">
+            <a:schemeClr val="accent1"/>
+          </a:effectRef>
+          <a:fontRef idx="minor">
+            <a:schemeClr val="tx1"/>
+          </a:fontRef>
+        </p:style>
+      </p:cxnSp>
+      <p:cxnSp>
+        <p:nvCxnSpPr>
+          <p:cNvPr id="23" name="직선 연결선 22"/>
+          <p:cNvCxnSpPr/>
+          <p:nvPr/>
+        </p:nvCxnSpPr>
+        <p:spPr>
+          <a:xfrm>
+            <a:off x="5905416" y="6680199"/>
+            <a:ext cx="360000" cy="0"/>
+          </a:xfrm>
+          <a:prstGeom prst="line">
+            <a:avLst/>
+          </a:prstGeom>
+          <a:ln w="44450" cap="rnd">
+            <a:solidFill>
+              <a:schemeClr val="accent1">
+                <a:lumMod val="50000"/>
+              </a:schemeClr>
+            </a:solidFill>
+          </a:ln>
+          <a:effectLst>
+            <a:outerShdw blurRad="50800" dist="38100" dir="2700000" algn="tl" rotWithShape="0">
+              <a:prstClr val="black">
+                <a:alpha val="40000"/>
+              </a:prstClr>
+            </a:outerShdw>
+          </a:effectLst>
+        </p:spPr>
+        <p:style>
+          <a:lnRef idx="1">
+            <a:schemeClr val="accent1"/>
+          </a:lnRef>
+          <a:fillRef idx="0">
+            <a:schemeClr val="accent1"/>
+          </a:fillRef>
+          <a:effectRef idx="0">
+            <a:schemeClr val="accent1"/>
+          </a:effectRef>
+          <a:fontRef idx="minor">
+            <a:schemeClr val="tx1"/>
+          </a:fontRef>
+        </p:style>
+      </p:cxnSp>
+      <p:cxnSp>
+        <p:nvCxnSpPr>
+          <p:cNvPr id="24" name="직선 연결선 23"/>
+          <p:cNvCxnSpPr/>
+          <p:nvPr/>
+        </p:nvCxnSpPr>
+        <p:spPr>
+          <a:xfrm>
+            <a:off x="6310622" y="6680199"/>
+            <a:ext cx="360000" cy="0"/>
+          </a:xfrm>
+          <a:prstGeom prst="line">
+            <a:avLst/>
+          </a:prstGeom>
+          <a:ln w="44450" cap="rnd">
+            <a:solidFill>
+              <a:schemeClr val="accent1">
+                <a:lumMod val="50000"/>
+              </a:schemeClr>
+            </a:solidFill>
+          </a:ln>
+          <a:effectLst>
+            <a:outerShdw blurRad="50800" dist="38100" dir="2700000" algn="tl" rotWithShape="0">
+              <a:prstClr val="black">
+                <a:alpha val="40000"/>
+              </a:prstClr>
+            </a:outerShdw>
+          </a:effectLst>
+        </p:spPr>
+        <p:style>
+          <a:lnRef idx="1">
+            <a:schemeClr val="accent1"/>
+          </a:lnRef>
+          <a:fillRef idx="0">
+            <a:schemeClr val="accent1"/>
+          </a:fillRef>
+          <a:effectRef idx="0">
+            <a:schemeClr val="accent1"/>
+          </a:effectRef>
+          <a:fontRef idx="minor">
+            <a:schemeClr val="tx1"/>
+          </a:fontRef>
+        </p:style>
+      </p:cxnSp>
+      <p:sp>
+        <p:nvSpPr>
+          <p:cNvPr id="7" name="TextBox 6"/>
+          <p:cNvSpPr txBox="1"/>
+          <p:nvPr/>
+        </p:nvSpPr>
+        <p:spPr>
+          <a:xfrm>
+            <a:off x="117687" y="1363131"/>
+            <a:ext cx="11617113" cy="4524315"/>
+          </a:xfrm>
+          <a:prstGeom prst="rect">
+            <a:avLst/>
+          </a:prstGeom>
+          <a:noFill/>
+        </p:spPr>
+        <p:txBody>
+          <a:bodyPr wrap="square" rtlCol="0" anchor="t">
+            <a:spAutoFit/>
+          </a:bodyPr>
+          <a:lstStyle/>
+          <a:p>
+            <a:pPr marL="514350" indent="-514350">
+              <a:buFont typeface="+mj-lt"/>
+              <a:buAutoNum type="arabicPeriod"/>
+            </a:pPr>
+            <a:r>
+              <a:rPr lang="ko-KR" altLang="en-US" sz="3200" dirty="0" smtClean="0">
+                <a:solidFill>
+                  <a:schemeClr val="bg1"/>
+                </a:solidFill>
+                <a:effectLst>
+                  <a:outerShdw blurRad="38100" dist="38100" dir="2700000" algn="tl">
+                    <a:srgbClr val="000000">
+                      <a:alpha val="43137"/>
+                    </a:srgbClr>
+                  </a:outerShdw>
+                </a:effectLst>
+                <a:latin typeface="-윤고딕310" panose="02030504000101010101" pitchFamily="18" charset="-127"/>
+                <a:ea typeface="-윤고딕310" panose="02030504000101010101" pitchFamily="18" charset="-127"/>
+              </a:rPr>
+              <a:t>전투는 실시간으로 진행된다</a:t>
+            </a:r>
+            <a:r>
+              <a:rPr lang="en-US" altLang="ko-KR" sz="3200" dirty="0" smtClean="0">
+                <a:solidFill>
+                  <a:schemeClr val="bg1"/>
+                </a:solidFill>
+                <a:effectLst>
+                  <a:outerShdw blurRad="38100" dist="38100" dir="2700000" algn="tl">
+                    <a:srgbClr val="000000">
+                      <a:alpha val="43137"/>
+                    </a:srgbClr>
+                  </a:outerShdw>
+                </a:effectLst>
+                <a:latin typeface="-윤고딕310" panose="02030504000101010101" pitchFamily="18" charset="-127"/>
+                <a:ea typeface="-윤고딕310" panose="02030504000101010101" pitchFamily="18" charset="-127"/>
+              </a:rPr>
+              <a:t>.</a:t>
+            </a:r>
+            <a:endParaRPr lang="en-US" altLang="ko-KR" sz="3200" dirty="0">
+              <a:solidFill>
+                <a:schemeClr val="bg1"/>
+              </a:solidFill>
+              <a:effectLst>
+                <a:outerShdw blurRad="38100" dist="38100" dir="2700000" algn="tl">
+                  <a:srgbClr val="000000">
+                    <a:alpha val="43137"/>
+                  </a:srgbClr>
+                </a:outerShdw>
+              </a:effectLst>
+              <a:latin typeface="-윤고딕310" panose="02030504000101010101" pitchFamily="18" charset="-127"/>
+              <a:ea typeface="-윤고딕310" panose="02030504000101010101" pitchFamily="18" charset="-127"/>
+            </a:endParaRPr>
+          </a:p>
+          <a:p>
+            <a:pPr marL="514350" indent="-514350">
+              <a:buFont typeface="+mj-lt"/>
+              <a:buAutoNum type="arabicPeriod"/>
+            </a:pPr>
+            <a:r>
+              <a:rPr lang="ko-KR" altLang="en-US" sz="3200" dirty="0" smtClean="0">
+                <a:solidFill>
+                  <a:schemeClr val="bg1"/>
+                </a:solidFill>
+                <a:effectLst>
+                  <a:outerShdw blurRad="38100" dist="38100" dir="2700000" algn="tl">
+                    <a:srgbClr val="000000">
+                      <a:alpha val="43137"/>
+                    </a:srgbClr>
+                  </a:outerShdw>
+                </a:effectLst>
+                <a:latin typeface="-윤고딕310" panose="02030504000101010101" pitchFamily="18" charset="-127"/>
+                <a:ea typeface="-윤고딕310" panose="02030504000101010101" pitchFamily="18" charset="-127"/>
+              </a:rPr>
+              <a:t>플레이어는 언제든지 전투 중에 일시 정지 하여 턴 제 게임처럼 진행할 수도 있다</a:t>
+            </a:r>
+            <a:r>
+              <a:rPr lang="en-US" altLang="ko-KR" sz="3200" dirty="0" smtClean="0">
+                <a:solidFill>
+                  <a:schemeClr val="bg1"/>
+                </a:solidFill>
+                <a:effectLst>
+                  <a:outerShdw blurRad="38100" dist="38100" dir="2700000" algn="tl">
+                    <a:srgbClr val="000000">
+                      <a:alpha val="43137"/>
+                    </a:srgbClr>
+                  </a:outerShdw>
+                </a:effectLst>
+                <a:latin typeface="-윤고딕310" panose="02030504000101010101" pitchFamily="18" charset="-127"/>
+                <a:ea typeface="-윤고딕310" panose="02030504000101010101" pitchFamily="18" charset="-127"/>
+              </a:rPr>
+              <a:t>.</a:t>
+            </a:r>
+          </a:p>
+          <a:p>
+            <a:pPr marL="514350" indent="-514350">
+              <a:buFont typeface="+mj-lt"/>
+              <a:buAutoNum type="arabicPeriod"/>
+            </a:pPr>
+            <a:endParaRPr lang="en-US" altLang="ko-KR" sz="3200" dirty="0">
+              <a:solidFill>
+                <a:schemeClr val="bg1"/>
+              </a:solidFill>
+              <a:effectLst>
+                <a:outerShdw blurRad="38100" dist="38100" dir="2700000" algn="tl">
+                  <a:srgbClr val="000000">
+                    <a:alpha val="43137"/>
+                  </a:srgbClr>
+                </a:outerShdw>
+              </a:effectLst>
+              <a:latin typeface="-윤고딕310" panose="02030504000101010101" pitchFamily="18" charset="-127"/>
+              <a:ea typeface="-윤고딕310" panose="02030504000101010101" pitchFamily="18" charset="-127"/>
+            </a:endParaRPr>
+          </a:p>
+          <a:p>
+            <a:pPr marL="514350" indent="-514350">
+              <a:buFont typeface="+mj-lt"/>
+              <a:buAutoNum type="arabicPeriod"/>
+            </a:pPr>
+            <a:r>
+              <a:rPr lang="ko-KR" altLang="en-US" sz="3200" dirty="0" smtClean="0">
+                <a:solidFill>
+                  <a:schemeClr val="bg1"/>
+                </a:solidFill>
+                <a:effectLst>
+                  <a:outerShdw blurRad="38100" dist="38100" dir="2700000" algn="tl">
+                    <a:srgbClr val="000000">
+                      <a:alpha val="43137"/>
+                    </a:srgbClr>
+                  </a:outerShdw>
+                </a:effectLst>
+                <a:latin typeface="-윤고딕310" panose="02030504000101010101" pitchFamily="18" charset="-127"/>
+                <a:ea typeface="-윤고딕310" panose="02030504000101010101" pitchFamily="18" charset="-127"/>
+              </a:rPr>
+              <a:t>플레이어와 적의 무기는 메커니즘이 동일하다</a:t>
+            </a:r>
+            <a:r>
+              <a:rPr lang="en-US" altLang="ko-KR" sz="3200" dirty="0" smtClean="0">
+                <a:solidFill>
+                  <a:schemeClr val="bg1"/>
+                </a:solidFill>
+                <a:effectLst>
+                  <a:outerShdw blurRad="38100" dist="38100" dir="2700000" algn="tl">
+                    <a:srgbClr val="000000">
+                      <a:alpha val="43137"/>
+                    </a:srgbClr>
+                  </a:outerShdw>
+                </a:effectLst>
+                <a:latin typeface="-윤고딕310" panose="02030504000101010101" pitchFamily="18" charset="-127"/>
+                <a:ea typeface="-윤고딕310" panose="02030504000101010101" pitchFamily="18" charset="-127"/>
+              </a:rPr>
+              <a:t>. </a:t>
+            </a:r>
+            <a:r>
+              <a:rPr lang="ko-KR" altLang="en-US" sz="3200" dirty="0" smtClean="0">
+                <a:solidFill>
+                  <a:schemeClr val="bg1"/>
+                </a:solidFill>
+                <a:effectLst>
+                  <a:outerShdw blurRad="38100" dist="38100" dir="2700000" algn="tl">
+                    <a:srgbClr val="000000">
+                      <a:alpha val="43137"/>
+                    </a:srgbClr>
+                  </a:outerShdw>
+                </a:effectLst>
+                <a:latin typeface="-윤고딕310" panose="02030504000101010101" pitchFamily="18" charset="-127"/>
+                <a:ea typeface="-윤고딕310" panose="02030504000101010101" pitchFamily="18" charset="-127"/>
+              </a:rPr>
+              <a:t>무기의 종류 역시 거의 동일하다</a:t>
+            </a:r>
+            <a:r>
+              <a:rPr lang="en-US" altLang="ko-KR" sz="3200" dirty="0" smtClean="0">
+                <a:solidFill>
+                  <a:schemeClr val="bg1"/>
+                </a:solidFill>
+                <a:effectLst>
+                  <a:outerShdw blurRad="38100" dist="38100" dir="2700000" algn="tl">
+                    <a:srgbClr val="000000">
+                      <a:alpha val="43137"/>
+                    </a:srgbClr>
+                  </a:outerShdw>
+                </a:effectLst>
+                <a:latin typeface="-윤고딕310" panose="02030504000101010101" pitchFamily="18" charset="-127"/>
+                <a:ea typeface="-윤고딕310" panose="02030504000101010101" pitchFamily="18" charset="-127"/>
+              </a:rPr>
+              <a:t>.</a:t>
+            </a:r>
+          </a:p>
+          <a:p>
+            <a:pPr marL="514350" indent="-514350">
+              <a:buFont typeface="+mj-lt"/>
+              <a:buAutoNum type="arabicPeriod"/>
+            </a:pPr>
+            <a:endParaRPr lang="en-US" altLang="ko-KR" sz="3200" dirty="0">
+              <a:solidFill>
+                <a:schemeClr val="bg1"/>
+              </a:solidFill>
+              <a:effectLst>
+                <a:outerShdw blurRad="38100" dist="38100" dir="2700000" algn="tl">
+                  <a:srgbClr val="000000">
+                    <a:alpha val="43137"/>
+                  </a:srgbClr>
+                </a:outerShdw>
+              </a:effectLst>
+              <a:latin typeface="-윤고딕310" panose="02030504000101010101" pitchFamily="18" charset="-127"/>
+              <a:ea typeface="-윤고딕310" panose="02030504000101010101" pitchFamily="18" charset="-127"/>
+            </a:endParaRPr>
+          </a:p>
+          <a:p>
+            <a:pPr marL="514350" indent="-514350">
+              <a:buFont typeface="+mj-lt"/>
+              <a:buAutoNum type="arabicPeriod"/>
+            </a:pPr>
+            <a:r>
+              <a:rPr lang="ko-KR" altLang="en-US" sz="3200" dirty="0" smtClean="0">
+                <a:solidFill>
+                  <a:schemeClr val="bg1"/>
+                </a:solidFill>
+                <a:effectLst>
+                  <a:outerShdw blurRad="38100" dist="38100" dir="2700000" algn="tl">
+                    <a:srgbClr val="000000">
+                      <a:alpha val="43137"/>
+                    </a:srgbClr>
+                  </a:outerShdw>
+                </a:effectLst>
+                <a:latin typeface="-윤고딕310" panose="02030504000101010101" pitchFamily="18" charset="-127"/>
+                <a:ea typeface="-윤고딕310" panose="02030504000101010101" pitchFamily="18" charset="-127"/>
+              </a:rPr>
+              <a:t>적 </a:t>
+            </a:r>
+            <a:r>
+              <a:rPr lang="en-US" altLang="ko-KR" sz="3200" dirty="0" smtClean="0">
+                <a:solidFill>
+                  <a:schemeClr val="bg1"/>
+                </a:solidFill>
+                <a:effectLst>
+                  <a:outerShdw blurRad="38100" dist="38100" dir="2700000" algn="tl">
+                    <a:srgbClr val="000000">
+                      <a:alpha val="43137"/>
+                    </a:srgbClr>
+                  </a:outerShdw>
+                </a:effectLst>
+                <a:latin typeface="-윤고딕310" panose="02030504000101010101" pitchFamily="18" charset="-127"/>
+                <a:ea typeface="-윤고딕310" panose="02030504000101010101" pitchFamily="18" charset="-127"/>
+              </a:rPr>
+              <a:t>NPC </a:t>
+            </a:r>
+            <a:r>
+              <a:rPr lang="ko-KR" altLang="en-US" sz="3200" dirty="0" smtClean="0">
+                <a:solidFill>
+                  <a:schemeClr val="bg1"/>
+                </a:solidFill>
+                <a:effectLst>
+                  <a:outerShdw blurRad="38100" dist="38100" dir="2700000" algn="tl">
+                    <a:srgbClr val="000000">
+                      <a:alpha val="43137"/>
+                    </a:srgbClr>
+                  </a:outerShdw>
+                </a:effectLst>
+                <a:latin typeface="-윤고딕310" panose="02030504000101010101" pitchFamily="18" charset="-127"/>
+                <a:ea typeface="-윤고딕310" panose="02030504000101010101" pitchFamily="18" charset="-127"/>
+              </a:rPr>
+              <a:t>와 플레이어는 함선의 디자인과 종족 별 특수 시설 </a:t>
+            </a:r>
+            <a:r>
+              <a:rPr lang="en-US" altLang="ko-KR" sz="3200" dirty="0" smtClean="0">
+                <a:solidFill>
+                  <a:schemeClr val="bg1"/>
+                </a:solidFill>
+                <a:effectLst>
+                  <a:outerShdw blurRad="38100" dist="38100" dir="2700000" algn="tl">
+                    <a:srgbClr val="000000">
+                      <a:alpha val="43137"/>
+                    </a:srgbClr>
+                  </a:outerShdw>
+                </a:effectLst>
+                <a:latin typeface="-윤고딕310" panose="02030504000101010101" pitchFamily="18" charset="-127"/>
+                <a:ea typeface="-윤고딕310" panose="02030504000101010101" pitchFamily="18" charset="-127"/>
+              </a:rPr>
+              <a:t>/ </a:t>
+            </a:r>
+            <a:r>
+              <a:rPr lang="ko-KR" altLang="en-US" sz="3200" dirty="0" smtClean="0">
+                <a:solidFill>
+                  <a:schemeClr val="bg1"/>
+                </a:solidFill>
+                <a:effectLst>
+                  <a:outerShdw blurRad="38100" dist="38100" dir="2700000" algn="tl">
+                    <a:srgbClr val="000000">
+                      <a:alpha val="43137"/>
+                    </a:srgbClr>
+                  </a:outerShdw>
+                </a:effectLst>
+                <a:latin typeface="-윤고딕310" panose="02030504000101010101" pitchFamily="18" charset="-127"/>
+                <a:ea typeface="-윤고딕310" panose="02030504000101010101" pitchFamily="18" charset="-127"/>
+              </a:rPr>
+              <a:t>장비 </a:t>
+            </a:r>
+            <a:r>
+              <a:rPr lang="en-US" altLang="ko-KR" sz="3200" dirty="0" smtClean="0">
+                <a:solidFill>
+                  <a:schemeClr val="bg1"/>
+                </a:solidFill>
+                <a:effectLst>
+                  <a:outerShdw blurRad="38100" dist="38100" dir="2700000" algn="tl">
+                    <a:srgbClr val="000000">
+                      <a:alpha val="43137"/>
+                    </a:srgbClr>
+                  </a:outerShdw>
+                </a:effectLst>
+                <a:latin typeface="-윤고딕310" panose="02030504000101010101" pitchFamily="18" charset="-127"/>
+                <a:ea typeface="-윤고딕310" panose="02030504000101010101" pitchFamily="18" charset="-127"/>
+              </a:rPr>
+              <a:t>/ </a:t>
+            </a:r>
+            <a:r>
+              <a:rPr lang="ko-KR" altLang="en-US" sz="3200" dirty="0" smtClean="0">
+                <a:solidFill>
+                  <a:schemeClr val="bg1"/>
+                </a:solidFill>
+                <a:effectLst>
+                  <a:outerShdw blurRad="38100" dist="38100" dir="2700000" algn="tl">
+                    <a:srgbClr val="000000">
+                      <a:alpha val="43137"/>
+                    </a:srgbClr>
+                  </a:outerShdw>
+                </a:effectLst>
+                <a:latin typeface="-윤고딕310" panose="02030504000101010101" pitchFamily="18" charset="-127"/>
+                <a:ea typeface="-윤고딕310" panose="02030504000101010101" pitchFamily="18" charset="-127"/>
+              </a:rPr>
+              <a:t>무기를 제외하면 모두 </a:t>
+            </a:r>
+            <a:r>
+              <a:rPr lang="ko-KR" altLang="en-US" sz="3200" dirty="0" smtClean="0">
+                <a:solidFill>
+                  <a:schemeClr val="bg1"/>
+                </a:solidFill>
+                <a:effectLst>
+                  <a:outerShdw blurRad="38100" dist="38100" dir="2700000" algn="tl">
+                    <a:srgbClr val="000000">
+                      <a:alpha val="43137"/>
+                    </a:srgbClr>
+                  </a:outerShdw>
+                </a:effectLst>
+                <a:latin typeface="-윤고딕310" panose="02030504000101010101" pitchFamily="18" charset="-127"/>
+                <a:ea typeface="-윤고딕310" panose="02030504000101010101" pitchFamily="18" charset="-127"/>
+              </a:rPr>
+              <a:t>똑같은 시스템을 사용한다</a:t>
+            </a:r>
+            <a:r>
+              <a:rPr lang="en-US" altLang="ko-KR" sz="3200" dirty="0" smtClean="0">
+                <a:solidFill>
+                  <a:schemeClr val="bg1"/>
+                </a:solidFill>
+                <a:effectLst>
+                  <a:outerShdw blurRad="38100" dist="38100" dir="2700000" algn="tl">
+                    <a:srgbClr val="000000">
+                      <a:alpha val="43137"/>
+                    </a:srgbClr>
+                  </a:outerShdw>
+                </a:effectLst>
+                <a:latin typeface="-윤고딕310" panose="02030504000101010101" pitchFamily="18" charset="-127"/>
+                <a:ea typeface="-윤고딕310" panose="02030504000101010101" pitchFamily="18" charset="-127"/>
+              </a:rPr>
+              <a:t>.</a:t>
+            </a:r>
+            <a:endParaRPr lang="en-US" altLang="ko-KR" sz="3200" dirty="0">
+              <a:solidFill>
+                <a:schemeClr val="bg1"/>
+              </a:solidFill>
+              <a:effectLst>
+                <a:outerShdw blurRad="38100" dist="38100" dir="2700000" algn="tl">
+                  <a:srgbClr val="000000">
+                    <a:alpha val="43137"/>
+                  </a:srgbClr>
+                </a:outerShdw>
+              </a:effectLst>
+              <a:latin typeface="-윤고딕310" panose="02030504000101010101" pitchFamily="18" charset="-127"/>
+              <a:ea typeface="-윤고딕310" panose="02030504000101010101" pitchFamily="18" charset="-127"/>
+            </a:endParaRPr>
+          </a:p>
+        </p:txBody>
+      </p:sp>
+      <p:sp>
+        <p:nvSpPr>
+          <p:cNvPr id="10" name="TextBox 9"/>
+          <p:cNvSpPr txBox="1"/>
+          <p:nvPr/>
+        </p:nvSpPr>
+        <p:spPr>
+          <a:xfrm>
+            <a:off x="9795933" y="446707"/>
+            <a:ext cx="2159000" cy="1384995"/>
+          </a:xfrm>
+          <a:prstGeom prst="rect">
+            <a:avLst/>
+          </a:prstGeom>
+          <a:solidFill>
+            <a:schemeClr val="accent2">
+              <a:lumMod val="40000"/>
+              <a:lumOff val="60000"/>
+              <a:alpha val="18000"/>
+            </a:schemeClr>
+          </a:solidFill>
+          <a:scene3d>
+            <a:camera prst="orthographicFront"/>
+            <a:lightRig rig="threePt" dir="t"/>
+          </a:scene3d>
+          <a:sp3d extrusionH="31750">
+            <a:bevelT w="25400" h="38100"/>
+          </a:sp3d>
+        </p:spPr>
+        <p:txBody>
+          <a:bodyPr wrap="square" rtlCol="0" anchor="t">
+            <a:spAutoFit/>
+          </a:bodyPr>
+          <a:lstStyle/>
+          <a:p>
+            <a:pPr algn="ctr"/>
+            <a:r>
+              <a:rPr lang="en-US" altLang="ko-KR" sz="1400" dirty="0" smtClean="0">
+                <a:solidFill>
+                  <a:schemeClr val="bg1"/>
+                </a:solidFill>
+                <a:effectLst>
+                  <a:outerShdw blurRad="38100" dist="38100" dir="2700000" algn="tl">
+                    <a:srgbClr val="000000">
+                      <a:alpha val="43137"/>
+                    </a:srgbClr>
+                  </a:outerShdw>
+                </a:effectLst>
+                <a:latin typeface="Continuum Light" panose="00000400000000000000" pitchFamily="2" charset="0"/>
+                <a:ea typeface="-윤고딕320" panose="02030504000101010101" pitchFamily="18" charset="-127"/>
+              </a:rPr>
+              <a:t>01 </a:t>
+            </a:r>
+            <a:r>
+              <a:rPr lang="ko-KR" altLang="en-US" sz="1400" dirty="0" smtClean="0">
+                <a:solidFill>
+                  <a:schemeClr val="bg1"/>
+                </a:solidFill>
+                <a:effectLst>
+                  <a:outerShdw blurRad="38100" dist="38100" dir="2700000" algn="tl">
+                    <a:srgbClr val="000000">
+                      <a:alpha val="43137"/>
+                    </a:srgbClr>
+                  </a:outerShdw>
+                </a:effectLst>
+                <a:latin typeface="Continuum Light" panose="00000400000000000000" pitchFamily="2" charset="0"/>
+                <a:ea typeface="-윤고딕320" panose="02030504000101010101" pitchFamily="18" charset="-127"/>
+              </a:rPr>
+              <a:t>기획</a:t>
+            </a:r>
+            <a:endParaRPr lang="en-US" altLang="ko-KR" sz="1400" dirty="0" smtClean="0">
+              <a:solidFill>
+                <a:schemeClr val="bg1"/>
+              </a:solidFill>
+              <a:effectLst>
+                <a:outerShdw blurRad="38100" dist="38100" dir="2700000" algn="tl">
+                  <a:srgbClr val="000000">
+                    <a:alpha val="43137"/>
+                  </a:srgbClr>
+                </a:outerShdw>
+              </a:effectLst>
+              <a:latin typeface="Continuum Light" panose="00000400000000000000" pitchFamily="2" charset="0"/>
+              <a:ea typeface="-윤고딕320" panose="02030504000101010101" pitchFamily="18" charset="-127"/>
+            </a:endParaRPr>
+          </a:p>
+          <a:p>
+            <a:pPr algn="ctr"/>
+            <a:r>
+              <a:rPr lang="ko-KR" altLang="en-US" sz="1400" dirty="0" smtClean="0">
+                <a:solidFill>
+                  <a:schemeClr val="bg1"/>
+                </a:solidFill>
+                <a:effectLst>
+                  <a:outerShdw blurRad="38100" dist="38100" dir="2700000" algn="tl">
+                    <a:srgbClr val="000000">
+                      <a:alpha val="43137"/>
+                    </a:srgbClr>
+                  </a:outerShdw>
+                </a:effectLst>
+                <a:latin typeface="-윤고딕310" panose="02030504000101010101" pitchFamily="18" charset="-127"/>
+                <a:ea typeface="-윤고딕310" panose="02030504000101010101" pitchFamily="18" charset="-127"/>
+              </a:rPr>
+              <a:t>게임 컨셉트</a:t>
+            </a:r>
+            <a:endParaRPr lang="en-US" altLang="ko-KR" sz="1400" dirty="0" smtClean="0">
+              <a:solidFill>
+                <a:schemeClr val="bg1"/>
+              </a:solidFill>
+              <a:effectLst>
+                <a:outerShdw blurRad="38100" dist="38100" dir="2700000" algn="tl">
+                  <a:srgbClr val="000000">
+                    <a:alpha val="43137"/>
+                  </a:srgbClr>
+                </a:outerShdw>
+              </a:effectLst>
+              <a:latin typeface="-윤고딕310" panose="02030504000101010101" pitchFamily="18" charset="-127"/>
+              <a:ea typeface="-윤고딕310" panose="02030504000101010101" pitchFamily="18" charset="-127"/>
+            </a:endParaRPr>
+          </a:p>
+          <a:p>
+            <a:pPr algn="ctr"/>
+            <a:r>
+              <a:rPr lang="ko-KR" altLang="en-US" sz="1400" dirty="0" smtClean="0">
+                <a:solidFill>
+                  <a:schemeClr val="bg1"/>
+                </a:solidFill>
+                <a:effectLst>
+                  <a:outerShdw blurRad="38100" dist="38100" dir="2700000" algn="tl">
+                    <a:srgbClr val="000000">
+                      <a:alpha val="43137"/>
+                    </a:srgbClr>
+                  </a:outerShdw>
+                </a:effectLst>
+                <a:latin typeface="-윤고딕310" panose="02030504000101010101" pitchFamily="18" charset="-127"/>
+                <a:ea typeface="-윤고딕310" panose="02030504000101010101" pitchFamily="18" charset="-127"/>
+              </a:rPr>
+              <a:t>게임 소개 </a:t>
+            </a:r>
+            <a:r>
+              <a:rPr lang="en-US" altLang="ko-KR" sz="1400" dirty="0" smtClean="0">
+                <a:solidFill>
+                  <a:schemeClr val="bg1"/>
+                </a:solidFill>
+                <a:effectLst>
+                  <a:outerShdw blurRad="38100" dist="38100" dir="2700000" algn="tl">
+                    <a:srgbClr val="000000">
+                      <a:alpha val="43137"/>
+                    </a:srgbClr>
+                  </a:outerShdw>
+                </a:effectLst>
+                <a:latin typeface="-윤고딕310" panose="02030504000101010101" pitchFamily="18" charset="-127"/>
+                <a:ea typeface="-윤고딕310" panose="02030504000101010101" pitchFamily="18" charset="-127"/>
+              </a:rPr>
+              <a:t>(</a:t>
+            </a:r>
+            <a:r>
+              <a:rPr lang="ko-KR" altLang="en-US" sz="1400" dirty="0">
+                <a:solidFill>
+                  <a:schemeClr val="bg1"/>
+                </a:solidFill>
+                <a:effectLst>
+                  <a:outerShdw blurRad="38100" dist="38100" dir="2700000" algn="tl">
+                    <a:srgbClr val="000000">
+                      <a:alpha val="43137"/>
+                    </a:srgbClr>
+                  </a:outerShdw>
+                </a:effectLst>
+                <a:latin typeface="-윤고딕310" panose="02030504000101010101" pitchFamily="18" charset="-127"/>
+                <a:ea typeface="-윤고딕310" panose="02030504000101010101" pitchFamily="18" charset="-127"/>
+              </a:rPr>
+              <a:t>세계관</a:t>
+            </a:r>
+            <a:r>
+              <a:rPr lang="en-US" altLang="ko-KR" sz="1400" dirty="0" smtClean="0">
+                <a:solidFill>
+                  <a:schemeClr val="bg1"/>
+                </a:solidFill>
+                <a:effectLst>
+                  <a:outerShdw blurRad="38100" dist="38100" dir="2700000" algn="tl">
+                    <a:srgbClr val="000000">
+                      <a:alpha val="43137"/>
+                    </a:srgbClr>
+                  </a:outerShdw>
+                </a:effectLst>
+                <a:latin typeface="-윤고딕310" panose="02030504000101010101" pitchFamily="18" charset="-127"/>
+                <a:ea typeface="-윤고딕310" panose="02030504000101010101" pitchFamily="18" charset="-127"/>
+              </a:rPr>
+              <a:t>)</a:t>
+            </a:r>
+          </a:p>
+          <a:p>
+            <a:pPr algn="ctr"/>
+            <a:r>
+              <a:rPr lang="ko-KR" altLang="en-US" sz="1400" dirty="0" smtClean="0">
+                <a:solidFill>
+                  <a:schemeClr val="bg1"/>
+                </a:solidFill>
+                <a:effectLst>
+                  <a:outerShdw blurRad="38100" dist="38100" dir="2700000" algn="tl">
+                    <a:srgbClr val="000000">
+                      <a:alpha val="43137"/>
+                    </a:srgbClr>
+                  </a:outerShdw>
+                </a:effectLst>
+                <a:latin typeface="-윤고딕310" panose="02030504000101010101" pitchFamily="18" charset="-127"/>
+                <a:ea typeface="-윤고딕310" panose="02030504000101010101" pitchFamily="18" charset="-127"/>
+              </a:rPr>
+              <a:t>게임 소개 </a:t>
+            </a:r>
+            <a:r>
+              <a:rPr lang="en-US" altLang="ko-KR" sz="1400" dirty="0" smtClean="0">
+                <a:solidFill>
+                  <a:schemeClr val="bg1"/>
+                </a:solidFill>
+                <a:effectLst>
+                  <a:outerShdw blurRad="38100" dist="38100" dir="2700000" algn="tl">
+                    <a:srgbClr val="000000">
+                      <a:alpha val="43137"/>
+                    </a:srgbClr>
+                  </a:outerShdw>
+                </a:effectLst>
+                <a:latin typeface="-윤고딕310" panose="02030504000101010101" pitchFamily="18" charset="-127"/>
+                <a:ea typeface="-윤고딕310" panose="02030504000101010101" pitchFamily="18" charset="-127"/>
+              </a:rPr>
+              <a:t>(</a:t>
+            </a:r>
+            <a:r>
+              <a:rPr lang="ko-KR" altLang="en-US" sz="1400" dirty="0" smtClean="0">
+                <a:solidFill>
+                  <a:schemeClr val="bg1"/>
+                </a:solidFill>
+                <a:effectLst>
+                  <a:outerShdw blurRad="38100" dist="38100" dir="2700000" algn="tl">
+                    <a:srgbClr val="000000">
+                      <a:alpha val="43137"/>
+                    </a:srgbClr>
+                  </a:outerShdw>
+                </a:effectLst>
+                <a:latin typeface="-윤고딕310" panose="02030504000101010101" pitchFamily="18" charset="-127"/>
+                <a:ea typeface="-윤고딕310" panose="02030504000101010101" pitchFamily="18" charset="-127"/>
+              </a:rPr>
+              <a:t>기본 시스템</a:t>
+            </a:r>
+            <a:r>
+              <a:rPr lang="en-US" altLang="ko-KR" sz="1400" dirty="0" smtClean="0">
+                <a:solidFill>
+                  <a:schemeClr val="bg1"/>
+                </a:solidFill>
+                <a:effectLst>
+                  <a:outerShdw blurRad="38100" dist="38100" dir="2700000" algn="tl">
+                    <a:srgbClr val="000000">
+                      <a:alpha val="43137"/>
+                    </a:srgbClr>
+                  </a:outerShdw>
+                </a:effectLst>
+                <a:latin typeface="-윤고딕310" panose="02030504000101010101" pitchFamily="18" charset="-127"/>
+                <a:ea typeface="-윤고딕310" panose="02030504000101010101" pitchFamily="18" charset="-127"/>
+              </a:rPr>
+              <a:t>)</a:t>
+            </a:r>
+          </a:p>
+          <a:p>
+            <a:pPr algn="ctr"/>
+            <a:r>
+              <a:rPr lang="ko-KR" altLang="en-US" sz="1400" dirty="0">
+                <a:solidFill>
+                  <a:schemeClr val="bg1"/>
+                </a:solidFill>
+                <a:effectLst>
+                  <a:outerShdw blurRad="38100" dist="38100" dir="2700000" algn="tl">
+                    <a:srgbClr val="000000">
+                      <a:alpha val="43137"/>
+                    </a:srgbClr>
+                  </a:outerShdw>
+                </a:effectLst>
+                <a:latin typeface="-윤고딕310" panose="02030504000101010101" pitchFamily="18" charset="-127"/>
+                <a:ea typeface="-윤고딕310" panose="02030504000101010101" pitchFamily="18" charset="-127"/>
+              </a:rPr>
+              <a:t>게임 </a:t>
+            </a:r>
+            <a:r>
+              <a:rPr lang="ko-KR" altLang="en-US" sz="1400" dirty="0" smtClean="0">
+                <a:solidFill>
+                  <a:schemeClr val="bg1"/>
+                </a:solidFill>
+                <a:effectLst>
+                  <a:outerShdw blurRad="38100" dist="38100" dir="2700000" algn="tl">
+                    <a:srgbClr val="000000">
+                      <a:alpha val="43137"/>
+                    </a:srgbClr>
+                  </a:outerShdw>
+                </a:effectLst>
+                <a:latin typeface="-윤고딕310" panose="02030504000101010101" pitchFamily="18" charset="-127"/>
+                <a:ea typeface="-윤고딕310" panose="02030504000101010101" pitchFamily="18" charset="-127"/>
+              </a:rPr>
+              <a:t>소개</a:t>
+            </a:r>
+            <a:r>
+              <a:rPr lang="ko-KR" altLang="en-US" sz="1400" dirty="0">
+                <a:solidFill>
+                  <a:schemeClr val="bg1"/>
+                </a:solidFill>
+                <a:effectLst>
+                  <a:outerShdw blurRad="38100" dist="38100" dir="2700000" algn="tl">
+                    <a:srgbClr val="000000">
+                      <a:alpha val="43137"/>
+                    </a:srgbClr>
+                  </a:outerShdw>
+                </a:effectLst>
+                <a:latin typeface="-윤고딕310" panose="02030504000101010101" pitchFamily="18" charset="-127"/>
+                <a:ea typeface="-윤고딕310" panose="02030504000101010101" pitchFamily="18" charset="-127"/>
+              </a:rPr>
+              <a:t> </a:t>
+            </a:r>
+            <a:r>
+              <a:rPr lang="en-US" altLang="ko-KR" sz="1400" dirty="0" smtClean="0">
+                <a:solidFill>
+                  <a:schemeClr val="bg1"/>
+                </a:solidFill>
+                <a:effectLst>
+                  <a:outerShdw blurRad="38100" dist="38100" dir="2700000" algn="tl">
+                    <a:srgbClr val="000000">
+                      <a:alpha val="43137"/>
+                    </a:srgbClr>
+                  </a:outerShdw>
+                </a:effectLst>
+                <a:latin typeface="-윤고딕310" panose="02030504000101010101" pitchFamily="18" charset="-127"/>
+                <a:ea typeface="-윤고딕310" panose="02030504000101010101" pitchFamily="18" charset="-127"/>
+              </a:rPr>
+              <a:t>(</a:t>
+            </a:r>
+            <a:r>
+              <a:rPr lang="ko-KR" altLang="en-US" sz="1400" dirty="0" smtClean="0">
+                <a:solidFill>
+                  <a:schemeClr val="bg1"/>
+                </a:solidFill>
+                <a:effectLst>
+                  <a:outerShdw blurRad="38100" dist="38100" dir="2700000" algn="tl">
+                    <a:srgbClr val="000000">
+                      <a:alpha val="43137"/>
+                    </a:srgbClr>
+                  </a:outerShdw>
+                </a:effectLst>
+                <a:latin typeface="-윤고딕310" panose="02030504000101010101" pitchFamily="18" charset="-127"/>
+                <a:ea typeface="-윤고딕310" panose="02030504000101010101" pitchFamily="18" charset="-127"/>
+              </a:rPr>
+              <a:t>진행 </a:t>
+            </a:r>
+            <a:r>
+              <a:rPr lang="ko-KR" altLang="en-US" sz="1400" dirty="0">
+                <a:solidFill>
+                  <a:schemeClr val="bg1"/>
+                </a:solidFill>
+                <a:effectLst>
+                  <a:outerShdw blurRad="38100" dist="38100" dir="2700000" algn="tl">
+                    <a:srgbClr val="000000">
+                      <a:alpha val="43137"/>
+                    </a:srgbClr>
+                  </a:outerShdw>
+                </a:effectLst>
+                <a:latin typeface="-윤고딕310" panose="02030504000101010101" pitchFamily="18" charset="-127"/>
+                <a:ea typeface="-윤고딕310" panose="02030504000101010101" pitchFamily="18" charset="-127"/>
+              </a:rPr>
+              <a:t>및 조작</a:t>
+            </a:r>
+            <a:r>
+              <a:rPr lang="en-US" altLang="ko-KR" sz="1400" dirty="0" smtClean="0">
+                <a:solidFill>
+                  <a:schemeClr val="bg1"/>
+                </a:solidFill>
+                <a:effectLst>
+                  <a:outerShdw blurRad="38100" dist="38100" dir="2700000" algn="tl">
+                    <a:srgbClr val="000000">
+                      <a:alpha val="43137"/>
+                    </a:srgbClr>
+                  </a:outerShdw>
+                </a:effectLst>
+                <a:latin typeface="-윤고딕310" panose="02030504000101010101" pitchFamily="18" charset="-127"/>
+                <a:ea typeface="-윤고딕310" panose="02030504000101010101" pitchFamily="18" charset="-127"/>
+              </a:rPr>
+              <a:t>)</a:t>
+            </a:r>
+          </a:p>
+          <a:p>
+            <a:pPr algn="ctr"/>
+            <a:r>
+              <a:rPr lang="ko-KR" altLang="en-US" sz="1400" dirty="0" smtClean="0">
+                <a:solidFill>
+                  <a:schemeClr val="bg1"/>
+                </a:solidFill>
+                <a:effectLst>
+                  <a:glow rad="101600">
+                    <a:schemeClr val="accent2">
+                      <a:satMod val="175000"/>
+                      <a:alpha val="40000"/>
+                    </a:schemeClr>
+                  </a:glow>
+                  <a:outerShdw blurRad="38100" dist="38100" dir="2700000" algn="tl">
+                    <a:srgbClr val="000000">
+                      <a:alpha val="43137"/>
+                    </a:srgbClr>
+                  </a:outerShdw>
+                </a:effectLst>
+                <a:latin typeface="-윤고딕310" panose="02030504000101010101" pitchFamily="18" charset="-127"/>
+                <a:ea typeface="-윤고딕310" panose="02030504000101010101" pitchFamily="18" charset="-127"/>
+              </a:rPr>
+              <a:t>게임 소개 </a:t>
+            </a:r>
+            <a:r>
+              <a:rPr lang="en-US" altLang="ko-KR" sz="1400" dirty="0" smtClean="0">
+                <a:solidFill>
+                  <a:schemeClr val="bg1"/>
+                </a:solidFill>
+                <a:effectLst>
+                  <a:glow rad="101600">
+                    <a:schemeClr val="accent2">
+                      <a:satMod val="175000"/>
+                      <a:alpha val="40000"/>
+                    </a:schemeClr>
+                  </a:glow>
+                  <a:outerShdw blurRad="38100" dist="38100" dir="2700000" algn="tl">
+                    <a:srgbClr val="000000">
+                      <a:alpha val="43137"/>
+                    </a:srgbClr>
+                  </a:outerShdw>
+                </a:effectLst>
+                <a:latin typeface="-윤고딕310" panose="02030504000101010101" pitchFamily="18" charset="-127"/>
+                <a:ea typeface="-윤고딕310" panose="02030504000101010101" pitchFamily="18" charset="-127"/>
+              </a:rPr>
+              <a:t>(</a:t>
+            </a:r>
+            <a:r>
+              <a:rPr lang="ko-KR" altLang="en-US" sz="1400" dirty="0" smtClean="0">
+                <a:solidFill>
+                  <a:schemeClr val="bg1"/>
+                </a:solidFill>
+                <a:effectLst>
+                  <a:glow rad="101600">
+                    <a:schemeClr val="accent2">
+                      <a:satMod val="175000"/>
+                      <a:alpha val="40000"/>
+                    </a:schemeClr>
+                  </a:glow>
+                  <a:outerShdw blurRad="38100" dist="38100" dir="2700000" algn="tl">
+                    <a:srgbClr val="000000">
+                      <a:alpha val="43137"/>
+                    </a:srgbClr>
+                  </a:outerShdw>
+                </a:effectLst>
+                <a:latin typeface="-윤고딕310" panose="02030504000101010101" pitchFamily="18" charset="-127"/>
+                <a:ea typeface="-윤고딕310" panose="02030504000101010101" pitchFamily="18" charset="-127"/>
+              </a:rPr>
+              <a:t>전투</a:t>
+            </a:r>
+            <a:r>
+              <a:rPr lang="en-US" altLang="ko-KR" sz="1400" dirty="0" smtClean="0">
+                <a:solidFill>
+                  <a:schemeClr val="bg1"/>
+                </a:solidFill>
+                <a:effectLst>
+                  <a:glow rad="101600">
+                    <a:schemeClr val="accent2">
+                      <a:satMod val="175000"/>
+                      <a:alpha val="40000"/>
+                    </a:schemeClr>
+                  </a:glow>
+                  <a:outerShdw blurRad="38100" dist="38100" dir="2700000" algn="tl">
+                    <a:srgbClr val="000000">
+                      <a:alpha val="43137"/>
+                    </a:srgbClr>
+                  </a:outerShdw>
+                </a:effectLst>
+                <a:latin typeface="-윤고딕310" panose="02030504000101010101" pitchFamily="18" charset="-127"/>
+                <a:ea typeface="-윤고딕310" panose="02030504000101010101" pitchFamily="18" charset="-127"/>
+              </a:rPr>
+              <a:t>)</a:t>
+            </a:r>
+            <a:endParaRPr lang="en-US" altLang="ko-KR" sz="1400" dirty="0">
+              <a:solidFill>
+                <a:schemeClr val="bg1"/>
+              </a:solidFill>
+              <a:effectLst>
+                <a:glow rad="101600">
+                  <a:schemeClr val="accent2">
+                    <a:satMod val="175000"/>
+                    <a:alpha val="40000"/>
+                  </a:schemeClr>
+                </a:glow>
+                <a:outerShdw blurRad="38100" dist="38100" dir="2700000" algn="tl">
+                  <a:srgbClr val="000000">
+                    <a:alpha val="43137"/>
+                  </a:srgbClr>
+                </a:outerShdw>
+              </a:effectLst>
+              <a:latin typeface="-윤고딕310" panose="02030504000101010101" pitchFamily="18" charset="-127"/>
+              <a:ea typeface="-윤고딕310" panose="02030504000101010101" pitchFamily="18" charset="-127"/>
+            </a:endParaRPr>
+          </a:p>
+        </p:txBody>
+      </p:sp>
+    </p:spTree>
+    <p:extLst>
+      <p:ext uri="{BB962C8B-B14F-4D97-AF65-F5344CB8AC3E}">
+        <p14:creationId xmlns:p14="http://schemas.microsoft.com/office/powerpoint/2010/main" val="3640744807"/>
+      </p:ext>
+    </p:extLst>
+  </p:cSld>
+  <p:clrMapOvr>
+    <a:masterClrMapping/>
+  </p:clrMapOvr>
+  <p:timing>
+    <p:tnLst>
+      <p:par>
+        <p:cTn id="1" dur="indefinite" restart="never" nodeType="tmRoot"/>
+      </p:par>
+    </p:tnLst>
+  </p:timing>
+</p:sld>
+</file>
+
+<file path=ppt/slides/slide17.xml><?xml version="1.0" encoding="utf-8"?>
+<p:sld xmlns:a="http://schemas.openxmlformats.org/drawingml/2006/main" xmlns:r="http://schemas.openxmlformats.org/officeDocument/2006/relationships" xmlns:p="http://schemas.openxmlformats.org/presentationml/2006/main">
+  <p:cSld>
+    <p:spTree>
+      <p:nvGrpSpPr>
+        <p:cNvPr id="1" name=""/>
+        <p:cNvGrpSpPr/>
+        <p:nvPr/>
+      </p:nvGrpSpPr>
+      <p:grpSpPr>
+        <a:xfrm>
+          <a:off x="0" y="0"/>
+          <a:ext cx="0" cy="0"/>
+          <a:chOff x="0" y="0"/>
+          <a:chExt cx="0" cy="0"/>
+        </a:xfrm>
+      </p:grpSpPr>
+      <p:sp>
+        <p:nvSpPr>
+          <p:cNvPr id="4" name="TextBox 3"/>
+          <p:cNvSpPr txBox="1"/>
+          <p:nvPr/>
+        </p:nvSpPr>
+        <p:spPr>
+          <a:xfrm>
             <a:off x="829565" y="816039"/>
             <a:ext cx="1181734" cy="1015663"/>
           </a:xfrm>
@@ -27959,6 +29155,20 @@
               </a:rPr>
               <a:t>요소</a:t>
             </a:r>
+            <a:endParaRPr lang="en-US" altLang="ko-KR" sz="3200" dirty="0" smtClean="0">
+              <a:solidFill>
+                <a:schemeClr val="bg1"/>
+              </a:solidFill>
+              <a:effectLst>
+                <a:outerShdw blurRad="38100" dist="38100" dir="2700000" algn="tl">
+                  <a:srgbClr val="000000">
+                    <a:alpha val="43137"/>
+                  </a:srgbClr>
+                </a:outerShdw>
+              </a:effectLst>
+              <a:latin typeface="-윤고딕310" panose="02030504000101010101" pitchFamily="18" charset="-127"/>
+              <a:ea typeface="-윤고딕310" panose="02030504000101010101" pitchFamily="18" charset="-127"/>
+            </a:endParaRPr>
           </a:p>
         </p:txBody>
       </p:sp>
@@ -27982,7 +29192,7 @@
 </p:sld>
 </file>
 
-<file path=ppt/slides/slide17.xml><?xml version="1.0" encoding="utf-8"?>
+<file path=ppt/slides/slide18.xml><?xml version="1.0" encoding="utf-8"?>
 <p:sld xmlns:a="http://schemas.openxmlformats.org/drawingml/2006/main" xmlns:r="http://schemas.openxmlformats.org/officeDocument/2006/relationships" xmlns:p="http://schemas.openxmlformats.org/presentationml/2006/main">
   <p:cSld>
     <p:spTree>
@@ -28241,44 +29451,6 @@
           </a:bodyPr>
           <a:lstStyle/>
           <a:p>
-            <a:pPr marL="457200" indent="-457200">
-              <a:buFont typeface="Arial" panose="020B0604020202020204" pitchFamily="34" charset="0"/>
-              <a:buChar char="•"/>
-            </a:pPr>
-            <a:r>
-              <a:rPr lang="ko-KR" altLang="en-US" sz="3200" dirty="0" smtClean="0">
-                <a:solidFill>
-                  <a:schemeClr val="bg1"/>
-                </a:solidFill>
-                <a:effectLst>
-                  <a:outerShdw blurRad="38100" dist="38100" dir="2700000" algn="tl">
-                    <a:srgbClr val="000000">
-                      <a:alpha val="43137"/>
-                    </a:srgbClr>
-                  </a:outerShdw>
-                </a:effectLst>
-                <a:latin typeface="-윤고딕310" panose="02030504000101010101" pitchFamily="18" charset="-127"/>
-                <a:ea typeface="-윤고딕310" panose="02030504000101010101" pitchFamily="18" charset="-127"/>
-              </a:rPr>
-              <a:t>무엇이 필요한가</a:t>
-            </a:r>
-            <a:r>
-              <a:rPr lang="en-US" altLang="ko-KR" sz="3200" smtClean="0">
-                <a:solidFill>
-                  <a:schemeClr val="bg1"/>
-                </a:solidFill>
-                <a:effectLst>
-                  <a:outerShdw blurRad="38100" dist="38100" dir="2700000" algn="tl">
-                    <a:srgbClr val="000000">
-                      <a:alpha val="43137"/>
-                    </a:srgbClr>
-                  </a:outerShdw>
-                </a:effectLst>
-                <a:latin typeface="-윤고딕310" panose="02030504000101010101" pitchFamily="18" charset="-127"/>
-                <a:ea typeface="-윤고딕310" panose="02030504000101010101" pitchFamily="18" charset="-127"/>
-              </a:rPr>
-              <a:t>.</a:t>
-            </a:r>
             <a:endParaRPr lang="en-US" altLang="ko-KR" sz="3200" dirty="0">
               <a:solidFill>
                 <a:schemeClr val="bg1"/>
@@ -28429,6 +29601,1169 @@
           </a:p>
         </p:txBody>
       </p:sp>
+      <p:graphicFrame>
+        <p:nvGraphicFramePr>
+          <p:cNvPr id="2" name="표 1"/>
+          <p:cNvGraphicFramePr>
+            <a:graphicFrameLocks noGrp="1"/>
+          </p:cNvGraphicFramePr>
+          <p:nvPr>
+            <p:extLst>
+              <p:ext uri="{D42A27DB-BD31-4B8C-83A1-F6EECF244321}">
+                <p14:modId xmlns:p14="http://schemas.microsoft.com/office/powerpoint/2010/main" val="1469648829"/>
+              </p:ext>
+            </p:extLst>
+          </p:nvPr>
+        </p:nvGraphicFramePr>
+        <p:xfrm>
+          <a:off x="438152" y="1209668"/>
+          <a:ext cx="11296647" cy="5013960"/>
+        </p:xfrm>
+        <a:graphic>
+          <a:graphicData uri="http://schemas.openxmlformats.org/drawingml/2006/table">
+            <a:tbl>
+              <a:tblPr firstRow="1" bandRow="1">
+                <a:tableStyleId>{073A0DAA-6AF3-43AB-8588-CEC1D06C72B9}</a:tableStyleId>
+              </a:tblPr>
+              <a:tblGrid>
+                <a:gridCol w="1733548"/>
+                <a:gridCol w="7715250"/>
+                <a:gridCol w="1847849"/>
+              </a:tblGrid>
+              <a:tr h="804864">
+                <a:tc>
+                  <a:txBody>
+                    <a:bodyPr/>
+                    <a:lstStyle/>
+                    <a:p>
+                      <a:pPr algn="ctr" latinLnBrk="1"/>
+                      <a:r>
+                        <a:rPr lang="ko-KR" altLang="en-US" dirty="0" smtClean="0"/>
+                        <a:t>항목</a:t>
+                      </a:r>
+                      <a:endParaRPr lang="ko-KR" altLang="en-US" dirty="0"/>
+                    </a:p>
+                  </a:txBody>
+                  <a:tcPr anchor="ctr">
+                    <a:lnL w="12700" cmpd="sng">
+                      <a:noFill/>
+                    </a:lnL>
+                    <a:lnR w="12700" cmpd="sng">
+                      <a:noFill/>
+                    </a:lnR>
+                    <a:lnT w="12700" cmpd="sng">
+                      <a:noFill/>
+                    </a:lnT>
+                    <a:lnB w="38100" cmpd="sng">
+                      <a:noFill/>
+                    </a:lnB>
+                    <a:lnTlToBr w="12700" cmpd="sng">
+                      <a:noFill/>
+                      <a:prstDash val="solid"/>
+                    </a:lnTlToBr>
+                    <a:lnBlToTr w="12700" cmpd="sng">
+                      <a:noFill/>
+                      <a:prstDash val="solid"/>
+                    </a:lnBlToTr>
+                    <a:solidFill>
+                      <a:schemeClr val="tx1"/>
+                    </a:solidFill>
+                  </a:tcPr>
+                </a:tc>
+                <a:tc>
+                  <a:txBody>
+                    <a:bodyPr/>
+                    <a:lstStyle/>
+                    <a:p>
+                      <a:pPr algn="ctr" latinLnBrk="1"/>
+                      <a:r>
+                        <a:rPr lang="ko-KR" altLang="en-US" dirty="0" smtClean="0"/>
+                        <a:t>설명</a:t>
+                      </a:r>
+                      <a:endParaRPr lang="ko-KR" altLang="en-US" dirty="0"/>
+                    </a:p>
+                  </a:txBody>
+                  <a:tcPr anchor="ctr">
+                    <a:lnL w="12700" cmpd="sng">
+                      <a:noFill/>
+                    </a:lnL>
+                    <a:lnR w="12700" cmpd="sng">
+                      <a:noFill/>
+                    </a:lnR>
+                    <a:lnT w="12700" cmpd="sng">
+                      <a:noFill/>
+                    </a:lnT>
+                    <a:lnB w="38100" cmpd="sng">
+                      <a:noFill/>
+                    </a:lnB>
+                    <a:lnTlToBr w="12700" cmpd="sng">
+                      <a:noFill/>
+                      <a:prstDash val="solid"/>
+                    </a:lnTlToBr>
+                    <a:lnBlToTr w="12700" cmpd="sng">
+                      <a:noFill/>
+                      <a:prstDash val="solid"/>
+                    </a:lnBlToTr>
+                  </a:tcPr>
+                </a:tc>
+                <a:tc>
+                  <a:txBody>
+                    <a:bodyPr/>
+                    <a:lstStyle/>
+                    <a:p>
+                      <a:pPr algn="ctr" latinLnBrk="1"/>
+                      <a:r>
+                        <a:rPr lang="ko-KR" altLang="en-US" dirty="0" smtClean="0"/>
+                        <a:t>비고</a:t>
+                      </a:r>
+                      <a:endParaRPr lang="ko-KR" altLang="en-US" dirty="0"/>
+                    </a:p>
+                  </a:txBody>
+                  <a:tcPr anchor="ctr">
+                    <a:lnL w="12700" cmpd="sng">
+                      <a:noFill/>
+                    </a:lnL>
+                    <a:lnR w="12700" cmpd="sng">
+                      <a:noFill/>
+                    </a:lnR>
+                    <a:lnT w="12700" cmpd="sng">
+                      <a:noFill/>
+                    </a:lnT>
+                    <a:lnB w="38100" cmpd="sng">
+                      <a:noFill/>
+                    </a:lnB>
+                    <a:lnTlToBr w="12700" cmpd="sng">
+                      <a:noFill/>
+                      <a:prstDash val="solid"/>
+                    </a:lnTlToBr>
+                    <a:lnBlToTr w="12700" cmpd="sng">
+                      <a:noFill/>
+                      <a:prstDash val="solid"/>
+                    </a:lnBlToTr>
+                  </a:tcPr>
+                </a:tc>
+              </a:tr>
+              <a:tr h="757243">
+                <a:tc>
+                  <a:txBody>
+                    <a:bodyPr/>
+                    <a:lstStyle/>
+                    <a:p>
+                      <a:pPr algn="ctr" latinLnBrk="1"/>
+                      <a:r>
+                        <a:rPr lang="ko-KR" altLang="en-US" baseline="0" dirty="0" smtClean="0"/>
+                        <a:t>태양계 시스템</a:t>
+                      </a:r>
+                      <a:endParaRPr lang="ko-KR" altLang="en-US" dirty="0"/>
+                    </a:p>
+                  </a:txBody>
+                  <a:tcPr anchor="ctr">
+                    <a:lnL w="12700" cmpd="sng">
+                      <a:noFill/>
+                    </a:lnL>
+                    <a:lnR w="12700" cmpd="sng">
+                      <a:noFill/>
+                    </a:lnR>
+                    <a:lnT w="38100" cmpd="sng">
+                      <a:noFill/>
+                    </a:lnT>
+                    <a:lnB w="12700" cmpd="sng">
+                      <a:noFill/>
+                    </a:lnB>
+                    <a:lnTlToBr w="12700" cmpd="sng">
+                      <a:noFill/>
+                      <a:prstDash val="solid"/>
+                    </a:lnTlToBr>
+                    <a:lnBlToTr w="12700" cmpd="sng">
+                      <a:noFill/>
+                      <a:prstDash val="solid"/>
+                    </a:lnBlToTr>
+                    <a:solidFill>
+                      <a:schemeClr val="bg2">
+                        <a:lumMod val="50000"/>
+                      </a:schemeClr>
+                    </a:solidFill>
+                  </a:tcPr>
+                </a:tc>
+                <a:tc>
+                  <a:txBody>
+                    <a:bodyPr/>
+                    <a:lstStyle/>
+                    <a:p>
+                      <a:pPr latinLnBrk="1"/>
+                      <a:r>
+                        <a:rPr lang="ko-KR" altLang="en-US" sz="1600" dirty="0" smtClean="0"/>
+                        <a:t>하나의 구역은 한 점으로 표현된다</a:t>
+                      </a:r>
+                      <a:r>
+                        <a:rPr lang="en-US" altLang="ko-KR" sz="1600" dirty="0" smtClean="0"/>
+                        <a:t>. </a:t>
+                      </a:r>
+                      <a:r>
+                        <a:rPr lang="ko-KR" altLang="en-US" sz="1600" dirty="0" smtClean="0"/>
+                        <a:t>이 점은 </a:t>
+                      </a:r>
+                      <a:r>
+                        <a:rPr lang="en-US" altLang="ko-KR" sz="1600" dirty="0" smtClean="0"/>
+                        <a:t>Beacon</a:t>
+                      </a:r>
+                      <a:r>
+                        <a:rPr lang="en-US" altLang="ko-KR" sz="1600" baseline="0" dirty="0" smtClean="0"/>
+                        <a:t> </a:t>
+                      </a:r>
+                      <a:r>
+                        <a:rPr lang="ko-KR" altLang="en-US" sz="1600" baseline="0" dirty="0" smtClean="0"/>
+                        <a:t>으로 불린다</a:t>
+                      </a:r>
+                      <a:r>
+                        <a:rPr lang="en-US" altLang="ko-KR" sz="1600" baseline="0" dirty="0" smtClean="0"/>
+                        <a:t>. </a:t>
+                      </a:r>
+                      <a:r>
+                        <a:rPr lang="ko-KR" altLang="en-US" sz="1600" baseline="0" dirty="0" smtClean="0"/>
+                        <a:t>이 점이 모여 하나의 태양계를 나타낸다</a:t>
+                      </a:r>
+                      <a:r>
+                        <a:rPr lang="en-US" altLang="ko-KR" sz="1600" baseline="0" dirty="0" smtClean="0"/>
+                        <a:t>. </a:t>
+                      </a:r>
+                      <a:r>
+                        <a:rPr lang="ko-KR" altLang="en-US" sz="1600" baseline="0" dirty="0" smtClean="0"/>
+                        <a:t>한 태양계를 모두 탐험하면 다음 태양계로 이동할 수 있다</a:t>
+                      </a:r>
+                      <a:r>
+                        <a:rPr lang="en-US" altLang="ko-KR" sz="1600" baseline="0" dirty="0" smtClean="0"/>
+                        <a:t>. </a:t>
+                      </a:r>
+                      <a:r>
+                        <a:rPr lang="ko-KR" altLang="en-US" sz="1600" dirty="0" smtClean="0"/>
+                        <a:t>플레이어는 일종의</a:t>
+                      </a:r>
+                      <a:r>
+                        <a:rPr lang="en-US" altLang="ko-KR" sz="1600" baseline="0" dirty="0" smtClean="0"/>
+                        <a:t>‘</a:t>
+                      </a:r>
+                      <a:r>
+                        <a:rPr lang="ko-KR" altLang="en-US" sz="1600" baseline="0" dirty="0" smtClean="0"/>
+                        <a:t>안전구역</a:t>
+                      </a:r>
+                      <a:r>
+                        <a:rPr lang="en-US" altLang="ko-KR" sz="1600" baseline="0" dirty="0" smtClean="0"/>
+                        <a:t>’</a:t>
+                      </a:r>
+                      <a:r>
+                        <a:rPr lang="ko-KR" altLang="en-US" sz="1600" baseline="0" dirty="0" smtClean="0"/>
+                        <a:t>에서는 언제든지</a:t>
+                      </a:r>
+                      <a:r>
+                        <a:rPr lang="en-US" altLang="ko-KR" sz="1600" baseline="0" dirty="0" smtClean="0"/>
+                        <a:t>, </a:t>
+                      </a:r>
+                      <a:r>
+                        <a:rPr lang="ko-KR" altLang="en-US" sz="1600" baseline="0" dirty="0" smtClean="0"/>
+                        <a:t>적과 같은 위협이 있는</a:t>
+                      </a:r>
+                      <a:r>
+                        <a:rPr lang="en-US" altLang="ko-KR" sz="1600" baseline="0" dirty="0" smtClean="0"/>
+                        <a:t>‘</a:t>
+                      </a:r>
+                      <a:r>
+                        <a:rPr lang="ko-KR" altLang="en-US" sz="1600" baseline="0" dirty="0" smtClean="0"/>
+                        <a:t>위험구역</a:t>
+                      </a:r>
+                      <a:r>
+                        <a:rPr lang="en-US" altLang="ko-KR" sz="1600" baseline="0" dirty="0" smtClean="0"/>
+                        <a:t>’</a:t>
+                      </a:r>
+                      <a:r>
+                        <a:rPr lang="ko-KR" altLang="en-US" sz="1600" baseline="0" dirty="0" smtClean="0"/>
+                        <a:t>에서는 일정 시간의 엔진 설비 충전 이후에 공간 이동을 시도할 수 있다</a:t>
+                      </a:r>
+                      <a:r>
+                        <a:rPr lang="en-US" altLang="ko-KR" sz="1600" baseline="0" dirty="0" smtClean="0"/>
+                        <a:t>.</a:t>
+                      </a:r>
+                      <a:endParaRPr lang="ko-KR" altLang="en-US" sz="1600" dirty="0"/>
+                    </a:p>
+                  </a:txBody>
+                  <a:tcPr>
+                    <a:lnL w="12700" cmpd="sng">
+                      <a:noFill/>
+                    </a:lnL>
+                    <a:lnR w="12700" cmpd="sng">
+                      <a:noFill/>
+                    </a:lnR>
+                    <a:lnT w="38100" cmpd="sng">
+                      <a:noFill/>
+                    </a:lnT>
+                    <a:lnB w="12700" cmpd="sng">
+                      <a:noFill/>
+                    </a:lnB>
+                    <a:lnTlToBr w="12700" cmpd="sng">
+                      <a:noFill/>
+                      <a:prstDash val="solid"/>
+                    </a:lnTlToBr>
+                    <a:lnBlToTr w="12700" cmpd="sng">
+                      <a:noFill/>
+                      <a:prstDash val="solid"/>
+                    </a:lnBlToTr>
+                  </a:tcPr>
+                </a:tc>
+                <a:tc>
+                  <a:txBody>
+                    <a:bodyPr/>
+                    <a:lstStyle/>
+                    <a:p>
+                      <a:pPr latinLnBrk="1"/>
+                      <a:r>
+                        <a:rPr lang="ko-KR" altLang="en-US" sz="1600" dirty="0" smtClean="0"/>
+                        <a:t>공간 이동 시 연료 소모</a:t>
+                      </a:r>
+                      <a:r>
+                        <a:rPr lang="en-US" altLang="ko-KR" sz="1600" dirty="0" smtClean="0"/>
+                        <a:t>. </a:t>
+                      </a:r>
+                      <a:r>
+                        <a:rPr lang="ko-KR" altLang="en-US" sz="1600" dirty="0" smtClean="0"/>
+                        <a:t>한 태양계는 하나의 점</a:t>
+                      </a:r>
+                      <a:r>
+                        <a:rPr lang="en-US" altLang="ko-KR" sz="1600" dirty="0" smtClean="0"/>
+                        <a:t>-</a:t>
+                      </a:r>
+                      <a:r>
+                        <a:rPr lang="ko-KR" altLang="en-US" sz="1600" dirty="0" smtClean="0"/>
+                        <a:t>선 지도로 표현된다</a:t>
+                      </a:r>
+                      <a:r>
+                        <a:rPr lang="en-US" altLang="ko-KR" sz="1600" dirty="0" smtClean="0"/>
+                        <a:t>.</a:t>
+                      </a:r>
+                      <a:endParaRPr lang="ko-KR" altLang="en-US" sz="1600" dirty="0"/>
+                    </a:p>
+                  </a:txBody>
+                  <a:tcPr>
+                    <a:lnL w="12700" cmpd="sng">
+                      <a:noFill/>
+                    </a:lnL>
+                    <a:lnR w="12700" cmpd="sng">
+                      <a:noFill/>
+                    </a:lnR>
+                    <a:lnT w="38100" cmpd="sng">
+                      <a:noFill/>
+                    </a:lnT>
+                    <a:lnB w="12700" cmpd="sng">
+                      <a:noFill/>
+                    </a:lnB>
+                    <a:lnTlToBr w="12700" cmpd="sng">
+                      <a:noFill/>
+                      <a:prstDash val="solid"/>
+                    </a:lnTlToBr>
+                    <a:lnBlToTr w="12700" cmpd="sng">
+                      <a:noFill/>
+                      <a:prstDash val="solid"/>
+                    </a:lnBlToTr>
+                  </a:tcPr>
+                </a:tc>
+              </a:tr>
+              <a:tr h="782008">
+                <a:tc>
+                  <a:txBody>
+                    <a:bodyPr/>
+                    <a:lstStyle/>
+                    <a:p>
+                      <a:pPr algn="ctr" latinLnBrk="1"/>
+                      <a:r>
+                        <a:rPr lang="ko-KR" altLang="en-US" dirty="0" smtClean="0"/>
+                        <a:t>함선</a:t>
+                      </a:r>
+                      <a:r>
+                        <a:rPr lang="en-US" altLang="ko-KR" dirty="0" smtClean="0"/>
+                        <a:t>, </a:t>
+                      </a:r>
+                      <a:r>
+                        <a:rPr lang="ko-KR" altLang="en-US" dirty="0" smtClean="0"/>
+                        <a:t>선원</a:t>
+                      </a:r>
+                      <a:r>
+                        <a:rPr lang="en-US" altLang="ko-KR" dirty="0" smtClean="0"/>
+                        <a:t/>
+                      </a:r>
+                      <a:br>
+                        <a:rPr lang="en-US" altLang="ko-KR" dirty="0" smtClean="0"/>
+                      </a:br>
+                      <a:r>
+                        <a:rPr lang="ko-KR" altLang="en-US" dirty="0" smtClean="0"/>
+                        <a:t>시스템</a:t>
+                      </a:r>
+                      <a:endParaRPr lang="ko-KR" altLang="en-US" dirty="0"/>
+                    </a:p>
+                  </a:txBody>
+                  <a:tcPr anchor="ctr">
+                    <a:lnL w="12700" cmpd="sng">
+                      <a:noFill/>
+                    </a:lnL>
+                    <a:lnR w="12700" cmpd="sng">
+                      <a:noFill/>
+                    </a:lnR>
+                    <a:lnT w="12700" cmpd="sng">
+                      <a:noFill/>
+                    </a:lnT>
+                    <a:lnB w="12700" cmpd="sng">
+                      <a:noFill/>
+                    </a:lnB>
+                    <a:lnTlToBr w="12700" cmpd="sng">
+                      <a:noFill/>
+                      <a:prstDash val="solid"/>
+                    </a:lnTlToBr>
+                    <a:lnBlToTr w="12700" cmpd="sng">
+                      <a:noFill/>
+                      <a:prstDash val="solid"/>
+                    </a:lnBlToTr>
+                    <a:solidFill>
+                      <a:schemeClr val="bg2">
+                        <a:lumMod val="50000"/>
+                      </a:schemeClr>
+                    </a:solidFill>
+                  </a:tcPr>
+                </a:tc>
+                <a:tc>
+                  <a:txBody>
+                    <a:bodyPr/>
+                    <a:lstStyle/>
+                    <a:p>
+                      <a:pPr latinLnBrk="1"/>
+                      <a:r>
+                        <a:rPr lang="ko-KR" altLang="en-US" sz="1600" dirty="0" smtClean="0"/>
+                        <a:t>사용자 정의 함선</a:t>
+                      </a:r>
+                      <a:r>
+                        <a:rPr lang="en-US" altLang="ko-KR" sz="1600" dirty="0" smtClean="0"/>
+                        <a:t>.</a:t>
+                      </a:r>
+                      <a:r>
+                        <a:rPr lang="en-US" altLang="ko-KR" sz="1600" baseline="0" dirty="0" smtClean="0"/>
+                        <a:t> </a:t>
+                      </a:r>
+                      <a:r>
+                        <a:rPr lang="ko-KR" altLang="en-US" sz="1600" baseline="0" dirty="0" smtClean="0"/>
+                        <a:t>함선에는 체력</a:t>
+                      </a:r>
+                      <a:r>
+                        <a:rPr lang="en-US" altLang="ko-KR" sz="1600" baseline="0" dirty="0" smtClean="0"/>
+                        <a:t>, </a:t>
+                      </a:r>
+                      <a:r>
+                        <a:rPr lang="ko-KR" altLang="en-US" sz="1600" baseline="0" dirty="0" smtClean="0"/>
+                        <a:t>보호막</a:t>
+                      </a:r>
+                      <a:r>
+                        <a:rPr lang="en-US" altLang="ko-KR" sz="1600" baseline="0" dirty="0" smtClean="0"/>
+                        <a:t>, </a:t>
+                      </a:r>
+                      <a:r>
+                        <a:rPr lang="ko-KR" altLang="en-US" sz="1600" baseline="0" dirty="0" smtClean="0"/>
+                        <a:t>연료</a:t>
+                      </a:r>
+                      <a:r>
+                        <a:rPr lang="en-US" altLang="ko-KR" sz="1600" baseline="0" dirty="0" smtClean="0"/>
+                        <a:t>, </a:t>
+                      </a:r>
+                      <a:r>
+                        <a:rPr lang="ko-KR" altLang="en-US" sz="1600" baseline="0" dirty="0" smtClean="0"/>
+                        <a:t>가용 에너지가 있다</a:t>
+                      </a:r>
+                      <a:r>
+                        <a:rPr lang="en-US" altLang="ko-KR" sz="1600" baseline="0" dirty="0" smtClean="0"/>
+                        <a:t>.</a:t>
+                      </a:r>
+                      <a:r>
+                        <a:rPr lang="en-US" altLang="ko-KR" sz="1600" dirty="0" smtClean="0"/>
+                        <a:t> </a:t>
+                      </a:r>
+                      <a:r>
+                        <a:rPr lang="ko-KR" altLang="en-US" sz="1600" dirty="0" smtClean="0"/>
+                        <a:t>무기와 장비</a:t>
+                      </a:r>
+                      <a:r>
+                        <a:rPr lang="ko-KR" altLang="en-US" sz="1600" baseline="0" dirty="0" smtClean="0"/>
+                        <a:t> 등 설비를 장착할 수 있다</a:t>
+                      </a:r>
+                      <a:r>
+                        <a:rPr lang="en-US" altLang="ko-KR" sz="1600" baseline="0" dirty="0" smtClean="0"/>
+                        <a:t>. </a:t>
+                      </a:r>
+                      <a:r>
+                        <a:rPr lang="ko-KR" altLang="en-US" sz="1600" baseline="0" dirty="0" smtClean="0"/>
+                        <a:t>각 설비는 사용 에너지가 있다</a:t>
+                      </a:r>
+                      <a:r>
+                        <a:rPr lang="en-US" altLang="ko-KR" sz="1600" baseline="0" dirty="0" smtClean="0"/>
+                        <a:t>.</a:t>
+                      </a:r>
+                      <a:r>
+                        <a:rPr lang="ko-KR" altLang="en-US" sz="1600" baseline="0" dirty="0" smtClean="0"/>
+                        <a:t> 함선의 설비는 물론이고 함선도 사고 팔 수 있다</a:t>
+                      </a:r>
+                      <a:r>
+                        <a:rPr lang="en-US" altLang="ko-KR" sz="1600" baseline="0" dirty="0" smtClean="0"/>
+                        <a:t>. </a:t>
+                      </a:r>
+                      <a:r>
+                        <a:rPr lang="ko-KR" altLang="en-US" sz="1600" baseline="0" dirty="0" smtClean="0"/>
+                        <a:t>연료</a:t>
+                      </a:r>
+                      <a:r>
+                        <a:rPr lang="en-US" altLang="ko-KR" sz="1600" baseline="0" dirty="0" smtClean="0"/>
+                        <a:t>, </a:t>
+                      </a:r>
+                      <a:r>
+                        <a:rPr lang="ko-KR" altLang="en-US" sz="1600" baseline="0" dirty="0" smtClean="0"/>
+                        <a:t>자원</a:t>
+                      </a:r>
+                      <a:r>
+                        <a:rPr lang="en-US" altLang="ko-KR" sz="1600" baseline="0" dirty="0" smtClean="0"/>
+                        <a:t>, </a:t>
+                      </a:r>
+                      <a:r>
+                        <a:rPr lang="ko-KR" altLang="en-US" sz="1600" baseline="0" dirty="0" smtClean="0"/>
+                        <a:t>선원 역시 사고 팔 수 있다</a:t>
+                      </a:r>
+                      <a:r>
+                        <a:rPr lang="en-US" altLang="ko-KR" sz="1600" baseline="0" dirty="0" smtClean="0"/>
+                        <a:t>. </a:t>
+                      </a:r>
+                      <a:r>
+                        <a:rPr lang="ko-KR" altLang="en-US" sz="1600" baseline="0" dirty="0" smtClean="0"/>
+                        <a:t>선원은 체력</a:t>
+                      </a:r>
+                      <a:r>
+                        <a:rPr lang="en-US" altLang="ko-KR" sz="1600" baseline="0" dirty="0" smtClean="0"/>
+                        <a:t>, </a:t>
+                      </a:r>
+                      <a:r>
+                        <a:rPr lang="ko-KR" altLang="en-US" sz="1600" baseline="0" dirty="0" smtClean="0"/>
+                        <a:t>숙련도 </a:t>
+                      </a:r>
+                      <a:r>
+                        <a:rPr lang="en-US" altLang="ko-KR" sz="1600" baseline="0" dirty="0" smtClean="0"/>
+                        <a:t>(</a:t>
+                      </a:r>
+                      <a:r>
+                        <a:rPr lang="ko-KR" altLang="en-US" sz="1600" baseline="0" dirty="0" smtClean="0"/>
+                        <a:t>전투</a:t>
+                      </a:r>
+                      <a:r>
+                        <a:rPr lang="en-US" altLang="ko-KR" sz="1600" baseline="0" dirty="0" smtClean="0"/>
+                        <a:t>, </a:t>
+                      </a:r>
+                      <a:r>
+                        <a:rPr lang="ko-KR" altLang="en-US" sz="1600" baseline="0" dirty="0" smtClean="0"/>
+                        <a:t>수리</a:t>
+                      </a:r>
+                      <a:r>
+                        <a:rPr lang="en-US" altLang="ko-KR" sz="1600" baseline="0" dirty="0" smtClean="0"/>
+                        <a:t>, </a:t>
+                      </a:r>
+                      <a:r>
+                        <a:rPr lang="ko-KR" altLang="en-US" sz="1600" baseline="0" dirty="0" smtClean="0"/>
+                        <a:t>설비 관리 능력 등</a:t>
+                      </a:r>
+                      <a:r>
+                        <a:rPr lang="en-US" altLang="ko-KR" sz="1600" baseline="0" dirty="0" smtClean="0"/>
+                        <a:t>) </a:t>
+                      </a:r>
+                      <a:r>
+                        <a:rPr lang="ko-KR" altLang="en-US" sz="1600" baseline="0" dirty="0" smtClean="0"/>
+                        <a:t>을 갖고 있다</a:t>
+                      </a:r>
+                      <a:r>
+                        <a:rPr lang="en-US" altLang="ko-KR" sz="1600" baseline="0" dirty="0" smtClean="0"/>
+                        <a:t>. </a:t>
+                      </a:r>
+                      <a:r>
+                        <a:rPr lang="ko-KR" altLang="en-US" sz="1600" baseline="0" dirty="0" smtClean="0"/>
+                        <a:t>선원은 설비를 관제하고</a:t>
+                      </a:r>
+                      <a:r>
+                        <a:rPr lang="en-US" altLang="ko-KR" sz="1600" baseline="0" dirty="0" smtClean="0"/>
+                        <a:t> </a:t>
+                      </a:r>
+                      <a:r>
+                        <a:rPr lang="ko-KR" altLang="en-US" sz="1600" baseline="0" dirty="0" smtClean="0"/>
+                        <a:t>수리할 수 있다</a:t>
+                      </a:r>
+                      <a:r>
+                        <a:rPr lang="en-US" altLang="ko-KR" sz="1600" baseline="0" dirty="0" smtClean="0"/>
+                        <a:t>.</a:t>
+                      </a:r>
+                      <a:endParaRPr lang="en-US" altLang="ko-KR" sz="1600" baseline="0" dirty="0" smtClean="0"/>
+                    </a:p>
+                  </a:txBody>
+                  <a:tcPr>
+                    <a:lnL w="12700" cmpd="sng">
+                      <a:noFill/>
+                    </a:lnL>
+                    <a:lnR w="12700" cmpd="sng">
+                      <a:noFill/>
+                    </a:lnR>
+                    <a:lnT w="12700" cmpd="sng">
+                      <a:noFill/>
+                    </a:lnT>
+                    <a:lnB w="12700" cmpd="sng">
+                      <a:noFill/>
+                    </a:lnB>
+                    <a:lnTlToBr w="12700" cmpd="sng">
+                      <a:noFill/>
+                      <a:prstDash val="solid"/>
+                    </a:lnTlToBr>
+                    <a:lnBlToTr w="12700" cmpd="sng">
+                      <a:noFill/>
+                      <a:prstDash val="solid"/>
+                    </a:lnBlToTr>
+                  </a:tcPr>
+                </a:tc>
+                <a:tc>
+                  <a:txBody>
+                    <a:bodyPr/>
+                    <a:lstStyle/>
+                    <a:p>
+                      <a:pPr latinLnBrk="1"/>
+                      <a:r>
+                        <a:rPr lang="ko-KR" altLang="en-US" sz="1600" dirty="0" smtClean="0"/>
+                        <a:t>보호막은 설비 필요</a:t>
+                      </a:r>
+                      <a:r>
+                        <a:rPr lang="en-US" altLang="ko-KR" sz="1600" dirty="0" smtClean="0"/>
+                        <a:t>,</a:t>
+                      </a:r>
+                      <a:r>
+                        <a:rPr lang="ko-KR" altLang="en-US" sz="1600" baseline="0" dirty="0" smtClean="0"/>
+                        <a:t> 무역은 물물교환</a:t>
+                      </a:r>
+                      <a:r>
+                        <a:rPr lang="en-US" altLang="ko-KR" sz="1600" baseline="0" dirty="0" smtClean="0"/>
+                        <a:t>, </a:t>
+                      </a:r>
+                      <a:r>
+                        <a:rPr lang="ko-KR" altLang="en-US" sz="1600" baseline="0" dirty="0" smtClean="0"/>
+                        <a:t>화폐거래 가능</a:t>
+                      </a:r>
+                      <a:endParaRPr lang="en-US" altLang="ko-KR" sz="1600" dirty="0" smtClean="0"/>
+                    </a:p>
+                  </a:txBody>
+                  <a:tcPr>
+                    <a:lnL w="12700" cmpd="sng">
+                      <a:noFill/>
+                    </a:lnL>
+                    <a:lnR w="12700" cmpd="sng">
+                      <a:noFill/>
+                    </a:lnR>
+                    <a:lnT w="12700" cmpd="sng">
+                      <a:noFill/>
+                    </a:lnT>
+                    <a:lnB w="12700" cmpd="sng">
+                      <a:noFill/>
+                    </a:lnB>
+                    <a:lnTlToBr w="12700" cmpd="sng">
+                      <a:noFill/>
+                      <a:prstDash val="solid"/>
+                    </a:lnTlToBr>
+                    <a:lnBlToTr w="12700" cmpd="sng">
+                      <a:noFill/>
+                      <a:prstDash val="solid"/>
+                    </a:lnBlToTr>
+                  </a:tcPr>
+                </a:tc>
+              </a:tr>
+              <a:tr h="409575">
+                <a:tc>
+                  <a:txBody>
+                    <a:bodyPr/>
+                    <a:lstStyle/>
+                    <a:p>
+                      <a:pPr algn="ctr" latinLnBrk="1"/>
+                      <a:r>
+                        <a:rPr lang="ko-KR" altLang="en-US" dirty="0" smtClean="0"/>
+                        <a:t>도전과제</a:t>
+                      </a:r>
+                      <a:r>
+                        <a:rPr lang="en-US" altLang="ko-KR" dirty="0" smtClean="0"/>
+                        <a:t/>
+                      </a:r>
+                      <a:br>
+                        <a:rPr lang="en-US" altLang="ko-KR" dirty="0" smtClean="0"/>
+                      </a:br>
+                      <a:r>
+                        <a:rPr lang="ko-KR" altLang="en-US" dirty="0" smtClean="0"/>
+                        <a:t>퀘스트</a:t>
+                      </a:r>
+                      <a:endParaRPr lang="ko-KR" altLang="en-US" dirty="0"/>
+                    </a:p>
+                  </a:txBody>
+                  <a:tcPr anchor="ctr">
+                    <a:lnL w="12700" cmpd="sng">
+                      <a:noFill/>
+                    </a:lnL>
+                    <a:lnR w="12700" cmpd="sng">
+                      <a:noFill/>
+                    </a:lnR>
+                    <a:lnT w="12700" cmpd="sng">
+                      <a:noFill/>
+                    </a:lnT>
+                    <a:lnB w="12700" cmpd="sng">
+                      <a:noFill/>
+                    </a:lnB>
+                    <a:lnTlToBr w="12700" cmpd="sng">
+                      <a:noFill/>
+                      <a:prstDash val="solid"/>
+                    </a:lnTlToBr>
+                    <a:lnBlToTr w="12700" cmpd="sng">
+                      <a:noFill/>
+                      <a:prstDash val="solid"/>
+                    </a:lnBlToTr>
+                    <a:solidFill>
+                      <a:schemeClr val="bg2">
+                        <a:lumMod val="50000"/>
+                      </a:schemeClr>
+                    </a:solidFill>
+                  </a:tcPr>
+                </a:tc>
+                <a:tc>
+                  <a:txBody>
+                    <a:bodyPr/>
+                    <a:lstStyle/>
+                    <a:p>
+                      <a:pPr latinLnBrk="1"/>
+                      <a:r>
+                        <a:rPr lang="ko-KR" altLang="en-US" sz="1600" dirty="0" smtClean="0"/>
+                        <a:t>게임의 목표 설정</a:t>
+                      </a:r>
+                      <a:r>
+                        <a:rPr lang="en-US" altLang="ko-KR" sz="1600" dirty="0" smtClean="0"/>
+                        <a:t>. </a:t>
+                      </a:r>
+                      <a:r>
+                        <a:rPr lang="ko-KR" altLang="en-US" sz="1600" dirty="0" smtClean="0"/>
+                        <a:t>완료 시 보상 지급</a:t>
+                      </a:r>
+                      <a:r>
+                        <a:rPr lang="en-US" altLang="ko-KR" sz="1600" dirty="0" smtClean="0"/>
+                        <a:t>.</a:t>
+                      </a:r>
+                      <a:r>
+                        <a:rPr lang="en-US" altLang="ko-KR" sz="1600" baseline="0" dirty="0" smtClean="0"/>
+                        <a:t> </a:t>
+                      </a:r>
+                      <a:r>
+                        <a:rPr lang="ko-KR" altLang="en-US" sz="1600" dirty="0" smtClean="0"/>
+                        <a:t>도전 과제에는 단순 수치 달성 뿐만 아니라 수집</a:t>
+                      </a:r>
+                      <a:r>
+                        <a:rPr lang="en-US" altLang="ko-KR" sz="1600" dirty="0" smtClean="0"/>
+                        <a:t>, </a:t>
+                      </a:r>
+                      <a:r>
+                        <a:rPr lang="ko-KR" altLang="en-US" sz="1600" dirty="0" smtClean="0"/>
+                        <a:t>상황 조성 같은 종류도 존재한다</a:t>
+                      </a:r>
+                      <a:r>
+                        <a:rPr lang="en-US" altLang="ko-KR" sz="1600" dirty="0" smtClean="0"/>
+                        <a:t>.</a:t>
+                      </a:r>
+                      <a:endParaRPr lang="ko-KR" altLang="en-US" sz="1600" dirty="0"/>
+                    </a:p>
+                  </a:txBody>
+                  <a:tcPr>
+                    <a:lnL w="12700" cmpd="sng">
+                      <a:noFill/>
+                    </a:lnL>
+                    <a:lnR w="12700" cmpd="sng">
+                      <a:noFill/>
+                    </a:lnR>
+                    <a:lnT w="12700" cmpd="sng">
+                      <a:noFill/>
+                    </a:lnT>
+                    <a:lnB w="12700" cmpd="sng">
+                      <a:noFill/>
+                    </a:lnB>
+                    <a:lnTlToBr w="12700" cmpd="sng">
+                      <a:noFill/>
+                      <a:prstDash val="solid"/>
+                    </a:lnTlToBr>
+                    <a:lnBlToTr w="12700" cmpd="sng">
+                      <a:noFill/>
+                      <a:prstDash val="solid"/>
+                    </a:lnBlToTr>
+                  </a:tcPr>
+                </a:tc>
+                <a:tc>
+                  <a:txBody>
+                    <a:bodyPr/>
+                    <a:lstStyle/>
+                    <a:p>
+                      <a:pPr latinLnBrk="1"/>
+                      <a:r>
+                        <a:rPr lang="ko-KR" altLang="en-US" sz="1600" dirty="0" smtClean="0"/>
+                        <a:t>완료 시 팝업</a:t>
+                      </a:r>
+                      <a:endParaRPr lang="ko-KR" altLang="en-US" sz="1600" dirty="0"/>
+                    </a:p>
+                  </a:txBody>
+                  <a:tcPr>
+                    <a:lnL w="12700" cmpd="sng">
+                      <a:noFill/>
+                    </a:lnL>
+                    <a:lnR w="12700" cmpd="sng">
+                      <a:noFill/>
+                    </a:lnR>
+                    <a:lnT w="12700" cmpd="sng">
+                      <a:noFill/>
+                    </a:lnT>
+                    <a:lnB w="12700" cmpd="sng">
+                      <a:noFill/>
+                    </a:lnB>
+                    <a:lnTlToBr w="12700" cmpd="sng">
+                      <a:noFill/>
+                      <a:prstDash val="solid"/>
+                    </a:lnTlToBr>
+                    <a:lnBlToTr w="12700" cmpd="sng">
+                      <a:noFill/>
+                      <a:prstDash val="solid"/>
+                    </a:lnBlToTr>
+                  </a:tcPr>
+                </a:tc>
+              </a:tr>
+              <a:tr h="804864">
+                <a:tc>
+                  <a:txBody>
+                    <a:bodyPr/>
+                    <a:lstStyle/>
+                    <a:p>
+                      <a:pPr algn="ctr" latinLnBrk="1"/>
+                      <a:r>
+                        <a:rPr lang="ko-KR" altLang="en-US" dirty="0" smtClean="0"/>
+                        <a:t>전투</a:t>
+                      </a:r>
+                      <a:endParaRPr lang="ko-KR" altLang="en-US" dirty="0"/>
+                    </a:p>
+                  </a:txBody>
+                  <a:tcPr anchor="ctr">
+                    <a:lnL w="12700" cmpd="sng">
+                      <a:noFill/>
+                    </a:lnL>
+                    <a:lnR w="12700" cmpd="sng">
+                      <a:noFill/>
+                    </a:lnR>
+                    <a:lnT w="12700" cmpd="sng">
+                      <a:noFill/>
+                    </a:lnT>
+                    <a:lnB w="12700" cmpd="sng">
+                      <a:noFill/>
+                    </a:lnB>
+                    <a:lnTlToBr w="12700" cmpd="sng">
+                      <a:noFill/>
+                      <a:prstDash val="solid"/>
+                    </a:lnTlToBr>
+                    <a:lnBlToTr w="12700" cmpd="sng">
+                      <a:noFill/>
+                      <a:prstDash val="solid"/>
+                    </a:lnBlToTr>
+                    <a:solidFill>
+                      <a:schemeClr val="bg2">
+                        <a:lumMod val="50000"/>
+                      </a:schemeClr>
+                    </a:solidFill>
+                  </a:tcPr>
+                </a:tc>
+                <a:tc>
+                  <a:txBody>
+                    <a:bodyPr/>
+                    <a:lstStyle/>
+                    <a:p>
+                      <a:pPr latinLnBrk="1"/>
+                      <a:r>
+                        <a:rPr lang="ko-KR" altLang="en-US" sz="1600" baseline="0" dirty="0" smtClean="0"/>
+                        <a:t>무기는 함선 설비의 일종이다</a:t>
+                      </a:r>
+                      <a:r>
+                        <a:rPr lang="en-US" altLang="ko-KR" sz="1600" baseline="0" dirty="0" smtClean="0"/>
+                        <a:t>. </a:t>
+                      </a:r>
+                      <a:r>
+                        <a:rPr lang="ko-KR" altLang="en-US" sz="1600" baseline="0" dirty="0" smtClean="0"/>
+                        <a:t>공격 기능을 제외하면 함선의 설비와 같은 취급이다</a:t>
+                      </a:r>
+                      <a:r>
+                        <a:rPr lang="en-US" altLang="ko-KR" sz="1600" baseline="0" dirty="0" smtClean="0"/>
+                        <a:t>. </a:t>
+                      </a:r>
+                      <a:r>
+                        <a:rPr lang="ko-KR" altLang="en-US" sz="1600" baseline="0" dirty="0" smtClean="0"/>
+                        <a:t>적선 내 순간이동 설비가 있어</a:t>
+                      </a:r>
+                      <a:r>
+                        <a:rPr lang="en-US" altLang="ko-KR" sz="1600" baseline="0" dirty="0" smtClean="0"/>
+                        <a:t> </a:t>
+                      </a:r>
+                      <a:r>
+                        <a:rPr lang="ko-KR" altLang="en-US" sz="1600" baseline="0" dirty="0" smtClean="0"/>
+                        <a:t>침입자와 싸우거나 역으로 침입할 수 있다</a:t>
+                      </a:r>
+                      <a:r>
+                        <a:rPr lang="en-US" altLang="ko-KR" sz="1600" baseline="0" dirty="0" smtClean="0"/>
+                        <a:t>. </a:t>
+                      </a:r>
+                      <a:r>
+                        <a:rPr lang="ko-KR" altLang="en-US" sz="1600" baseline="0" dirty="0" smtClean="0"/>
+                        <a:t>외계인 마다 약간 다른 무기를 들고 온다</a:t>
+                      </a:r>
+                      <a:r>
+                        <a:rPr lang="en-US" altLang="ko-KR" sz="1600" baseline="0" dirty="0" smtClean="0"/>
+                        <a:t>.</a:t>
+                      </a:r>
+                      <a:endParaRPr lang="ko-KR" altLang="en-US" sz="1600" dirty="0"/>
+                    </a:p>
+                  </a:txBody>
+                  <a:tcPr>
+                    <a:lnL w="12700" cmpd="sng">
+                      <a:noFill/>
+                    </a:lnL>
+                    <a:lnR w="12700" cmpd="sng">
+                      <a:noFill/>
+                    </a:lnR>
+                    <a:lnT w="12700" cmpd="sng">
+                      <a:noFill/>
+                    </a:lnT>
+                    <a:lnB w="12700" cmpd="sng">
+                      <a:noFill/>
+                    </a:lnB>
+                    <a:lnTlToBr w="12700" cmpd="sng">
+                      <a:noFill/>
+                      <a:prstDash val="solid"/>
+                    </a:lnTlToBr>
+                    <a:lnBlToTr w="12700" cmpd="sng">
+                      <a:noFill/>
+                      <a:prstDash val="solid"/>
+                    </a:lnBlToTr>
+                  </a:tcPr>
+                </a:tc>
+                <a:tc>
+                  <a:txBody>
+                    <a:bodyPr/>
+                    <a:lstStyle/>
+                    <a:p>
+                      <a:pPr latinLnBrk="1"/>
+                      <a:r>
+                        <a:rPr lang="ko-KR" altLang="en-US" sz="1600" dirty="0" smtClean="0"/>
+                        <a:t>함선의 내구도가 </a:t>
+                      </a:r>
+                      <a:r>
+                        <a:rPr lang="en-US" altLang="ko-KR" sz="1600" dirty="0" smtClean="0"/>
+                        <a:t>0</a:t>
+                      </a:r>
+                      <a:r>
+                        <a:rPr lang="ko-KR" altLang="en-US" sz="1600" dirty="0" smtClean="0"/>
+                        <a:t>이 되면 파괴됨</a:t>
+                      </a:r>
+                      <a:r>
+                        <a:rPr lang="en-US" altLang="ko-KR" sz="1600" smtClean="0"/>
+                        <a:t>.</a:t>
+                      </a:r>
+                      <a:endParaRPr lang="ko-KR" altLang="en-US" sz="1600" dirty="0"/>
+                    </a:p>
+                  </a:txBody>
+                  <a:tcPr>
+                    <a:lnL w="12700" cmpd="sng">
+                      <a:noFill/>
+                    </a:lnL>
+                    <a:lnR w="12700" cmpd="sng">
+                      <a:noFill/>
+                    </a:lnR>
+                    <a:lnT w="12700" cmpd="sng">
+                      <a:noFill/>
+                    </a:lnT>
+                    <a:lnB w="12700" cmpd="sng">
+                      <a:noFill/>
+                    </a:lnB>
+                    <a:lnTlToBr w="12700" cmpd="sng">
+                      <a:noFill/>
+                      <a:prstDash val="solid"/>
+                    </a:lnTlToBr>
+                    <a:lnBlToTr w="12700" cmpd="sng">
+                      <a:noFill/>
+                      <a:prstDash val="solid"/>
+                    </a:lnBlToTr>
+                  </a:tcPr>
+                </a:tc>
+              </a:tr>
+              <a:tr h="612456">
+                <a:tc>
+                  <a:txBody>
+                    <a:bodyPr/>
+                    <a:lstStyle/>
+                    <a:p>
+                      <a:pPr algn="ctr" latinLnBrk="1"/>
+                      <a:r>
+                        <a:rPr lang="en-US" altLang="ko-KR" dirty="0" smtClean="0"/>
+                        <a:t>NPC</a:t>
+                      </a:r>
+                      <a:r>
+                        <a:rPr lang="ko-KR" altLang="en-US" dirty="0" smtClean="0"/>
+                        <a:t> 상호작용</a:t>
+                      </a:r>
+                      <a:endParaRPr lang="ko-KR" altLang="en-US" dirty="0"/>
+                    </a:p>
+                  </a:txBody>
+                  <a:tcPr anchor="ctr">
+                    <a:lnL w="12700" cmpd="sng">
+                      <a:noFill/>
+                    </a:lnL>
+                    <a:lnR w="12700" cmpd="sng">
+                      <a:noFill/>
+                    </a:lnR>
+                    <a:lnT w="12700" cmpd="sng">
+                      <a:noFill/>
+                    </a:lnT>
+                    <a:lnB w="12700" cmpd="sng">
+                      <a:noFill/>
+                    </a:lnB>
+                    <a:lnTlToBr w="12700" cmpd="sng">
+                      <a:noFill/>
+                      <a:prstDash val="solid"/>
+                    </a:lnTlToBr>
+                    <a:lnBlToTr w="12700" cmpd="sng">
+                      <a:noFill/>
+                      <a:prstDash val="solid"/>
+                    </a:lnBlToTr>
+                    <a:solidFill>
+                      <a:schemeClr val="bg2">
+                        <a:lumMod val="50000"/>
+                      </a:schemeClr>
+                    </a:solidFill>
+                  </a:tcPr>
+                </a:tc>
+                <a:tc>
+                  <a:txBody>
+                    <a:bodyPr/>
+                    <a:lstStyle/>
+                    <a:p>
+                      <a:pPr latinLnBrk="1"/>
+                      <a:r>
+                        <a:rPr lang="en-US" altLang="ko-KR" sz="1600" dirty="0" smtClean="0"/>
+                        <a:t>NPC </a:t>
+                      </a:r>
+                      <a:r>
+                        <a:rPr lang="ko-KR" altLang="en-US" sz="1600" dirty="0" smtClean="0"/>
+                        <a:t>와 </a:t>
+                      </a:r>
+                      <a:r>
+                        <a:rPr lang="en-US" altLang="ko-KR" sz="1600" dirty="0" smtClean="0"/>
+                        <a:t>NPC, </a:t>
+                      </a:r>
+                      <a:r>
+                        <a:rPr lang="ko-KR" altLang="en-US" sz="1600" dirty="0" smtClean="0"/>
+                        <a:t>플레이어와 </a:t>
+                      </a:r>
+                      <a:r>
+                        <a:rPr lang="en-US" altLang="ko-KR" sz="1600" dirty="0" smtClean="0"/>
+                        <a:t>NPC</a:t>
+                      </a:r>
+                      <a:r>
+                        <a:rPr lang="en-US" altLang="ko-KR" sz="1600" baseline="0" dirty="0" smtClean="0"/>
+                        <a:t> </a:t>
+                      </a:r>
+                      <a:r>
+                        <a:rPr lang="ko-KR" altLang="en-US" sz="1600" baseline="0" dirty="0" smtClean="0"/>
+                        <a:t>가 서로 상호작용한다</a:t>
+                      </a:r>
+                      <a:r>
+                        <a:rPr lang="en-US" altLang="ko-KR" sz="1600" baseline="0" dirty="0" smtClean="0"/>
+                        <a:t>. </a:t>
+                      </a:r>
+                      <a:r>
+                        <a:rPr lang="ko-KR" altLang="en-US" sz="1600" baseline="0" dirty="0" smtClean="0"/>
+                        <a:t>플레이어가 한번 공간 이동 할 때마다</a:t>
+                      </a:r>
+                      <a:r>
+                        <a:rPr lang="en-US" altLang="ko-KR" sz="1600" baseline="0" dirty="0" smtClean="0"/>
+                        <a:t>, </a:t>
+                      </a:r>
+                      <a:r>
+                        <a:rPr lang="ko-KR" altLang="en-US" sz="1600" baseline="0" dirty="0" smtClean="0"/>
+                        <a:t>그리고 퀘스트와 이벤트 완료 이후에 세계관에 영향을 준다</a:t>
+                      </a:r>
+                      <a:r>
+                        <a:rPr lang="en-US" altLang="ko-KR" sz="1600" baseline="0" dirty="0" smtClean="0"/>
+                        <a:t>.</a:t>
+                      </a:r>
+                      <a:endParaRPr lang="ko-KR" altLang="en-US" sz="1600" dirty="0"/>
+                    </a:p>
+                  </a:txBody>
+                  <a:tcPr>
+                    <a:lnL w="12700" cmpd="sng">
+                      <a:noFill/>
+                    </a:lnL>
+                    <a:lnR w="12700" cmpd="sng">
+                      <a:noFill/>
+                    </a:lnR>
+                    <a:lnT w="12700" cmpd="sng">
+                      <a:noFill/>
+                    </a:lnT>
+                    <a:lnB w="12700" cmpd="sng">
+                      <a:noFill/>
+                    </a:lnB>
+                    <a:lnTlToBr w="12700" cmpd="sng">
+                      <a:noFill/>
+                      <a:prstDash val="solid"/>
+                    </a:lnTlToBr>
+                    <a:lnBlToTr w="12700" cmpd="sng">
+                      <a:noFill/>
+                      <a:prstDash val="solid"/>
+                    </a:lnBlToTr>
+                  </a:tcPr>
+                </a:tc>
+                <a:tc>
+                  <a:txBody>
+                    <a:bodyPr/>
+                    <a:lstStyle/>
+                    <a:p>
+                      <a:pPr latinLnBrk="1"/>
+                      <a:r>
+                        <a:rPr lang="ko-KR" altLang="en-US" sz="1600" dirty="0" smtClean="0"/>
+                        <a:t>이벤트 후 변동하는 숨겨진 수치 존재</a:t>
+                      </a:r>
+                      <a:endParaRPr lang="ko-KR" altLang="en-US" sz="1600" dirty="0"/>
+                    </a:p>
+                  </a:txBody>
+                  <a:tcPr>
+                    <a:lnL w="12700" cmpd="sng">
+                      <a:noFill/>
+                    </a:lnL>
+                    <a:lnR w="12700" cmpd="sng">
+                      <a:noFill/>
+                    </a:lnR>
+                    <a:lnT w="12700" cmpd="sng">
+                      <a:noFill/>
+                    </a:lnT>
+                    <a:lnB w="12700" cmpd="sng">
+                      <a:noFill/>
+                    </a:lnB>
+                    <a:lnTlToBr w="12700" cmpd="sng">
+                      <a:noFill/>
+                      <a:prstDash val="solid"/>
+                    </a:lnTlToBr>
+                    <a:lnBlToTr w="12700" cmpd="sng">
+                      <a:noFill/>
+                      <a:prstDash val="solid"/>
+                    </a:lnBlToTr>
+                  </a:tcPr>
+                </a:tc>
+              </a:tr>
+            </a:tbl>
+          </a:graphicData>
+        </a:graphic>
+      </p:graphicFrame>
     </p:spTree>
     <p:extLst>
       <p:ext uri="{BB962C8B-B14F-4D97-AF65-F5344CB8AC3E}">
@@ -28449,7 +30784,7 @@
 </p:sld>
 </file>
 
-<file path=ppt/slides/slide18.xml><?xml version="1.0" encoding="utf-8"?>
+<file path=ppt/slides/slide19.xml><?xml version="1.0" encoding="utf-8"?>
 <p:sld xmlns:a="http://schemas.openxmlformats.org/drawingml/2006/main" xmlns:r="http://schemas.openxmlformats.org/officeDocument/2006/relationships" xmlns:p="http://schemas.openxmlformats.org/presentationml/2006/main">
   <p:cSld>
     <p:spTree>
@@ -28902,7 +31237,1114 @@
 </p:sld>
 </file>
 
-<file path=ppt/slides/slide19.xml><?xml version="1.0" encoding="utf-8"?>
+<file path=ppt/slides/slide2.xml><?xml version="1.0" encoding="utf-8"?>
+<p:sld xmlns:a="http://schemas.openxmlformats.org/drawingml/2006/main" xmlns:r="http://schemas.openxmlformats.org/officeDocument/2006/relationships" xmlns:p="http://schemas.openxmlformats.org/presentationml/2006/main">
+  <p:cSld>
+    <p:spTree>
+      <p:nvGrpSpPr>
+        <p:cNvPr id="1" name=""/>
+        <p:cNvGrpSpPr/>
+        <p:nvPr/>
+      </p:nvGrpSpPr>
+      <p:grpSpPr>
+        <a:xfrm>
+          <a:off x="0" y="0"/>
+          <a:ext cx="0" cy="0"/>
+          <a:chOff x="0" y="0"/>
+          <a:chExt cx="0" cy="0"/>
+        </a:xfrm>
+      </p:grpSpPr>
+      <p:sp>
+        <p:nvSpPr>
+          <p:cNvPr id="4" name="TextBox 3"/>
+          <p:cNvSpPr txBox="1"/>
+          <p:nvPr/>
+        </p:nvSpPr>
+        <p:spPr>
+          <a:xfrm>
+            <a:off x="1381918" y="2255520"/>
+            <a:ext cx="1181734" cy="1015663"/>
+          </a:xfrm>
+          <a:prstGeom prst="rect">
+            <a:avLst/>
+          </a:prstGeom>
+          <a:noFill/>
+        </p:spPr>
+        <p:txBody>
+          <a:bodyPr wrap="none" rtlCol="0" anchor="ctr">
+            <a:spAutoFit/>
+          </a:bodyPr>
+          <a:lstStyle/>
+          <a:p>
+            <a:pPr algn="ctr"/>
+            <a:r>
+              <a:rPr lang="en-US" altLang="ko-KR" sz="6000" dirty="0" smtClean="0">
+                <a:solidFill>
+                  <a:schemeClr val="bg1"/>
+                </a:solidFill>
+                <a:effectLst>
+                  <a:outerShdw blurRad="38100" dist="38100" dir="2700000" algn="tl">
+                    <a:srgbClr val="000000">
+                      <a:alpha val="43137"/>
+                    </a:srgbClr>
+                  </a:outerShdw>
+                </a:effectLst>
+                <a:latin typeface="Continuum Light" panose="00000400000000000000" pitchFamily="2" charset="0"/>
+                <a:ea typeface="-윤고딕310" panose="02030504000101010101" pitchFamily="18" charset="-127"/>
+              </a:rPr>
+              <a:t>01</a:t>
+            </a:r>
+            <a:endParaRPr lang="ko-KR" altLang="en-US" sz="6000" dirty="0">
+              <a:solidFill>
+                <a:schemeClr val="bg1"/>
+              </a:solidFill>
+              <a:effectLst>
+                <a:outerShdw blurRad="38100" dist="38100" dir="2700000" algn="tl">
+                  <a:srgbClr val="000000">
+                    <a:alpha val="43137"/>
+                  </a:srgbClr>
+                </a:outerShdw>
+              </a:effectLst>
+              <a:latin typeface="Continuum Light" panose="00000400000000000000" pitchFamily="2" charset="0"/>
+              <a:ea typeface="-윤고딕310" panose="02030504000101010101" pitchFamily="18" charset="-127"/>
+            </a:endParaRPr>
+          </a:p>
+        </p:txBody>
+      </p:sp>
+      <p:sp>
+        <p:nvSpPr>
+          <p:cNvPr id="5" name="TextBox 4"/>
+          <p:cNvSpPr txBox="1"/>
+          <p:nvPr/>
+        </p:nvSpPr>
+        <p:spPr>
+          <a:xfrm>
+            <a:off x="1473289" y="3167390"/>
+            <a:ext cx="998992" cy="523220"/>
+          </a:xfrm>
+          <a:prstGeom prst="rect">
+            <a:avLst/>
+          </a:prstGeom>
+          <a:noFill/>
+        </p:spPr>
+        <p:txBody>
+          <a:bodyPr wrap="none" rtlCol="0" anchor="ctr">
+            <a:spAutoFit/>
+          </a:bodyPr>
+          <a:lstStyle/>
+          <a:p>
+            <a:pPr algn="ctr"/>
+            <a:r>
+              <a:rPr lang="ko-KR" altLang="en-US" sz="2800" spc="600" dirty="0" smtClean="0">
+                <a:solidFill>
+                  <a:schemeClr val="bg1"/>
+                </a:solidFill>
+                <a:effectLst>
+                  <a:outerShdw blurRad="38100" dist="38100" dir="2700000" algn="tl">
+                    <a:srgbClr val="000000">
+                      <a:alpha val="43137"/>
+                    </a:srgbClr>
+                  </a:outerShdw>
+                </a:effectLst>
+                <a:latin typeface="-윤고딕320" panose="02030504000101010101" pitchFamily="18" charset="-127"/>
+                <a:ea typeface="-윤고딕320" panose="02030504000101010101" pitchFamily="18" charset="-127"/>
+              </a:rPr>
+              <a:t>기획</a:t>
+            </a:r>
+            <a:endParaRPr lang="ko-KR" altLang="en-US" sz="2800" spc="600" dirty="0">
+              <a:solidFill>
+                <a:schemeClr val="bg1"/>
+              </a:solidFill>
+              <a:effectLst>
+                <a:outerShdw blurRad="38100" dist="38100" dir="2700000" algn="tl">
+                  <a:srgbClr val="000000">
+                    <a:alpha val="43137"/>
+                  </a:srgbClr>
+                </a:outerShdw>
+              </a:effectLst>
+              <a:latin typeface="-윤고딕320" panose="02030504000101010101" pitchFamily="18" charset="-127"/>
+              <a:ea typeface="-윤고딕320" panose="02030504000101010101" pitchFamily="18" charset="-127"/>
+            </a:endParaRPr>
+          </a:p>
+        </p:txBody>
+      </p:sp>
+      <p:sp>
+        <p:nvSpPr>
+          <p:cNvPr id="6" name="TextBox 5"/>
+          <p:cNvSpPr txBox="1"/>
+          <p:nvPr/>
+        </p:nvSpPr>
+        <p:spPr>
+          <a:xfrm>
+            <a:off x="5596504" y="3167390"/>
+            <a:ext cx="998992" cy="523220"/>
+          </a:xfrm>
+          <a:prstGeom prst="rect">
+            <a:avLst/>
+          </a:prstGeom>
+          <a:noFill/>
+        </p:spPr>
+        <p:txBody>
+          <a:bodyPr wrap="none" rtlCol="0" anchor="ctr">
+            <a:spAutoFit/>
+          </a:bodyPr>
+          <a:lstStyle/>
+          <a:p>
+            <a:pPr algn="ctr"/>
+            <a:r>
+              <a:rPr lang="ko-KR" altLang="en-US" sz="2800" spc="600" dirty="0" smtClean="0">
+                <a:solidFill>
+                  <a:schemeClr val="bg1"/>
+                </a:solidFill>
+                <a:effectLst>
+                  <a:outerShdw blurRad="38100" dist="38100" dir="2700000" algn="tl">
+                    <a:srgbClr val="000000">
+                      <a:alpha val="43137"/>
+                    </a:srgbClr>
+                  </a:outerShdw>
+                </a:effectLst>
+                <a:latin typeface="-윤고딕320" panose="02030504000101010101" pitchFamily="18" charset="-127"/>
+                <a:ea typeface="-윤고딕320" panose="02030504000101010101" pitchFamily="18" charset="-127"/>
+              </a:rPr>
+              <a:t>개발</a:t>
+            </a:r>
+            <a:endParaRPr lang="ko-KR" altLang="en-US" sz="2800" spc="600" dirty="0">
+              <a:solidFill>
+                <a:schemeClr val="bg1"/>
+              </a:solidFill>
+              <a:effectLst>
+                <a:outerShdw blurRad="38100" dist="38100" dir="2700000" algn="tl">
+                  <a:srgbClr val="000000">
+                    <a:alpha val="43137"/>
+                  </a:srgbClr>
+                </a:outerShdw>
+              </a:effectLst>
+              <a:latin typeface="-윤고딕320" panose="02030504000101010101" pitchFamily="18" charset="-127"/>
+              <a:ea typeface="-윤고딕320" panose="02030504000101010101" pitchFamily="18" charset="-127"/>
+            </a:endParaRPr>
+          </a:p>
+        </p:txBody>
+      </p:sp>
+      <p:sp>
+        <p:nvSpPr>
+          <p:cNvPr id="7" name="TextBox 6"/>
+          <p:cNvSpPr txBox="1"/>
+          <p:nvPr/>
+        </p:nvSpPr>
+        <p:spPr>
+          <a:xfrm>
+            <a:off x="9479191" y="3167390"/>
+            <a:ext cx="1406154" cy="523220"/>
+          </a:xfrm>
+          <a:prstGeom prst="rect">
+            <a:avLst/>
+          </a:prstGeom>
+          <a:noFill/>
+        </p:spPr>
+        <p:txBody>
+          <a:bodyPr wrap="none" rtlCol="0" anchor="ctr">
+            <a:spAutoFit/>
+          </a:bodyPr>
+          <a:lstStyle/>
+          <a:p>
+            <a:pPr algn="ctr"/>
+            <a:r>
+              <a:rPr lang="ko-KR" altLang="en-US" sz="2800" spc="600" dirty="0" smtClean="0">
+                <a:solidFill>
+                  <a:schemeClr val="bg1"/>
+                </a:solidFill>
+                <a:effectLst>
+                  <a:outerShdw blurRad="38100" dist="38100" dir="2700000" algn="tl">
+                    <a:srgbClr val="000000">
+                      <a:alpha val="43137"/>
+                    </a:srgbClr>
+                  </a:outerShdw>
+                </a:effectLst>
+                <a:latin typeface="-윤고딕320" panose="02030504000101010101" pitchFamily="18" charset="-127"/>
+                <a:ea typeface="-윤고딕320" panose="02030504000101010101" pitchFamily="18" charset="-127"/>
+              </a:rPr>
+              <a:t>마무리</a:t>
+            </a:r>
+            <a:endParaRPr lang="ko-KR" altLang="en-US" sz="2800" spc="600" dirty="0">
+              <a:solidFill>
+                <a:schemeClr val="bg1"/>
+              </a:solidFill>
+              <a:effectLst>
+                <a:outerShdw blurRad="38100" dist="38100" dir="2700000" algn="tl">
+                  <a:srgbClr val="000000">
+                    <a:alpha val="43137"/>
+                  </a:srgbClr>
+                </a:outerShdw>
+              </a:effectLst>
+              <a:latin typeface="-윤고딕320" panose="02030504000101010101" pitchFamily="18" charset="-127"/>
+              <a:ea typeface="-윤고딕320" panose="02030504000101010101" pitchFamily="18" charset="-127"/>
+            </a:endParaRPr>
+          </a:p>
+        </p:txBody>
+      </p:sp>
+      <p:sp>
+        <p:nvSpPr>
+          <p:cNvPr id="9" name="TextBox 8"/>
+          <p:cNvSpPr txBox="1"/>
+          <p:nvPr/>
+        </p:nvSpPr>
+        <p:spPr>
+          <a:xfrm>
+            <a:off x="5505133" y="2255520"/>
+            <a:ext cx="1181734" cy="1015663"/>
+          </a:xfrm>
+          <a:prstGeom prst="rect">
+            <a:avLst/>
+          </a:prstGeom>
+          <a:noFill/>
+        </p:spPr>
+        <p:txBody>
+          <a:bodyPr wrap="none" rtlCol="0" anchor="ctr">
+            <a:spAutoFit/>
+          </a:bodyPr>
+          <a:lstStyle/>
+          <a:p>
+            <a:pPr algn="ctr"/>
+            <a:r>
+              <a:rPr lang="en-US" altLang="ko-KR" sz="6000" dirty="0" smtClean="0">
+                <a:solidFill>
+                  <a:schemeClr val="bg1"/>
+                </a:solidFill>
+                <a:effectLst>
+                  <a:outerShdw blurRad="38100" dist="38100" dir="2700000" algn="tl">
+                    <a:srgbClr val="000000">
+                      <a:alpha val="43137"/>
+                    </a:srgbClr>
+                  </a:outerShdw>
+                </a:effectLst>
+                <a:latin typeface="Continuum Light" panose="00000400000000000000" pitchFamily="2" charset="0"/>
+                <a:ea typeface="-윤고딕310" panose="02030504000101010101" pitchFamily="18" charset="-127"/>
+              </a:rPr>
+              <a:t>02</a:t>
+            </a:r>
+            <a:endParaRPr lang="ko-KR" altLang="en-US" sz="6000" dirty="0">
+              <a:solidFill>
+                <a:schemeClr val="bg1"/>
+              </a:solidFill>
+              <a:effectLst>
+                <a:outerShdw blurRad="38100" dist="38100" dir="2700000" algn="tl">
+                  <a:srgbClr val="000000">
+                    <a:alpha val="43137"/>
+                  </a:srgbClr>
+                </a:outerShdw>
+              </a:effectLst>
+              <a:latin typeface="Continuum Light" panose="00000400000000000000" pitchFamily="2" charset="0"/>
+              <a:ea typeface="-윤고딕310" panose="02030504000101010101" pitchFamily="18" charset="-127"/>
+            </a:endParaRPr>
+          </a:p>
+        </p:txBody>
+      </p:sp>
+      <p:sp>
+        <p:nvSpPr>
+          <p:cNvPr id="10" name="TextBox 9"/>
+          <p:cNvSpPr txBox="1"/>
+          <p:nvPr/>
+        </p:nvSpPr>
+        <p:spPr>
+          <a:xfrm>
+            <a:off x="9591401" y="2255520"/>
+            <a:ext cx="1181734" cy="1015663"/>
+          </a:xfrm>
+          <a:prstGeom prst="rect">
+            <a:avLst/>
+          </a:prstGeom>
+          <a:noFill/>
+        </p:spPr>
+        <p:txBody>
+          <a:bodyPr wrap="none" rtlCol="0" anchor="ctr">
+            <a:spAutoFit/>
+          </a:bodyPr>
+          <a:lstStyle/>
+          <a:p>
+            <a:pPr algn="ctr"/>
+            <a:r>
+              <a:rPr lang="en-US" altLang="ko-KR" sz="6000" dirty="0" smtClean="0">
+                <a:solidFill>
+                  <a:schemeClr val="bg1"/>
+                </a:solidFill>
+                <a:effectLst>
+                  <a:outerShdw blurRad="38100" dist="38100" dir="2700000" algn="tl">
+                    <a:srgbClr val="000000">
+                      <a:alpha val="43137"/>
+                    </a:srgbClr>
+                  </a:outerShdw>
+                </a:effectLst>
+                <a:latin typeface="Continuum Light" panose="00000400000000000000" pitchFamily="2" charset="0"/>
+                <a:ea typeface="-윤고딕310" panose="02030504000101010101" pitchFamily="18" charset="-127"/>
+              </a:rPr>
+              <a:t>03</a:t>
+            </a:r>
+            <a:endParaRPr lang="ko-KR" altLang="en-US" sz="6000" dirty="0">
+              <a:solidFill>
+                <a:schemeClr val="bg1"/>
+              </a:solidFill>
+              <a:effectLst>
+                <a:outerShdw blurRad="38100" dist="38100" dir="2700000" algn="tl">
+                  <a:srgbClr val="000000">
+                    <a:alpha val="43137"/>
+                  </a:srgbClr>
+                </a:outerShdw>
+              </a:effectLst>
+              <a:latin typeface="Continuum Light" panose="00000400000000000000" pitchFamily="2" charset="0"/>
+              <a:ea typeface="-윤고딕310" panose="02030504000101010101" pitchFamily="18" charset="-127"/>
+            </a:endParaRPr>
+          </a:p>
+        </p:txBody>
+      </p:sp>
+      <p:cxnSp>
+        <p:nvCxnSpPr>
+          <p:cNvPr id="13" name="직선 연결선 12"/>
+          <p:cNvCxnSpPr/>
+          <p:nvPr/>
+        </p:nvCxnSpPr>
+        <p:spPr>
+          <a:xfrm>
+            <a:off x="1792785" y="2255520"/>
+            <a:ext cx="360000" cy="0"/>
+          </a:xfrm>
+          <a:prstGeom prst="line">
+            <a:avLst/>
+          </a:prstGeom>
+          <a:ln w="19050">
+            <a:solidFill>
+              <a:schemeClr val="bg1"/>
+            </a:solidFill>
+          </a:ln>
+        </p:spPr>
+        <p:style>
+          <a:lnRef idx="1">
+            <a:schemeClr val="accent1"/>
+          </a:lnRef>
+          <a:fillRef idx="0">
+            <a:schemeClr val="accent1"/>
+          </a:fillRef>
+          <a:effectRef idx="0">
+            <a:schemeClr val="accent1"/>
+          </a:effectRef>
+          <a:fontRef idx="minor">
+            <a:schemeClr val="tx1"/>
+          </a:fontRef>
+        </p:style>
+      </p:cxnSp>
+      <p:cxnSp>
+        <p:nvCxnSpPr>
+          <p:cNvPr id="14" name="직선 연결선 13"/>
+          <p:cNvCxnSpPr/>
+          <p:nvPr/>
+        </p:nvCxnSpPr>
+        <p:spPr>
+          <a:xfrm>
+            <a:off x="5916000" y="2255520"/>
+            <a:ext cx="360000" cy="0"/>
+          </a:xfrm>
+          <a:prstGeom prst="line">
+            <a:avLst/>
+          </a:prstGeom>
+          <a:ln w="19050">
+            <a:solidFill>
+              <a:schemeClr val="bg1"/>
+            </a:solidFill>
+          </a:ln>
+        </p:spPr>
+        <p:style>
+          <a:lnRef idx="1">
+            <a:schemeClr val="accent1"/>
+          </a:lnRef>
+          <a:fillRef idx="0">
+            <a:schemeClr val="accent1"/>
+          </a:fillRef>
+          <a:effectRef idx="0">
+            <a:schemeClr val="accent1"/>
+          </a:effectRef>
+          <a:fontRef idx="minor">
+            <a:schemeClr val="tx1"/>
+          </a:fontRef>
+        </p:style>
+      </p:cxnSp>
+      <p:cxnSp>
+        <p:nvCxnSpPr>
+          <p:cNvPr id="15" name="직선 연결선 14"/>
+          <p:cNvCxnSpPr/>
+          <p:nvPr/>
+        </p:nvCxnSpPr>
+        <p:spPr>
+          <a:xfrm>
+            <a:off x="10002268" y="2255520"/>
+            <a:ext cx="360000" cy="0"/>
+          </a:xfrm>
+          <a:prstGeom prst="line">
+            <a:avLst/>
+          </a:prstGeom>
+          <a:ln w="19050">
+            <a:solidFill>
+              <a:schemeClr val="bg1"/>
+            </a:solidFill>
+          </a:ln>
+        </p:spPr>
+        <p:style>
+          <a:lnRef idx="1">
+            <a:schemeClr val="accent1"/>
+          </a:lnRef>
+          <a:fillRef idx="0">
+            <a:schemeClr val="accent1"/>
+          </a:fillRef>
+          <a:effectRef idx="0">
+            <a:schemeClr val="accent1"/>
+          </a:effectRef>
+          <a:fontRef idx="minor">
+            <a:schemeClr val="tx1"/>
+          </a:fontRef>
+        </p:style>
+      </p:cxnSp>
+      <p:sp>
+        <p:nvSpPr>
+          <p:cNvPr id="17" name="TextBox 16"/>
+          <p:cNvSpPr txBox="1"/>
+          <p:nvPr/>
+        </p:nvSpPr>
+        <p:spPr>
+          <a:xfrm>
+            <a:off x="572399" y="3879398"/>
+            <a:ext cx="2800767" cy="1631216"/>
+          </a:xfrm>
+          <a:prstGeom prst="rect">
+            <a:avLst/>
+          </a:prstGeom>
+          <a:noFill/>
+        </p:spPr>
+        <p:txBody>
+          <a:bodyPr wrap="none" rtlCol="0" anchor="t">
+            <a:spAutoFit/>
+          </a:bodyPr>
+          <a:lstStyle/>
+          <a:p>
+            <a:pPr algn="ctr"/>
+            <a:r>
+              <a:rPr lang="ko-KR" altLang="en-US" sz="2000" dirty="0" smtClean="0">
+                <a:solidFill>
+                  <a:schemeClr val="bg1"/>
+                </a:solidFill>
+                <a:effectLst>
+                  <a:outerShdw blurRad="38100" dist="38100" dir="2700000" algn="tl">
+                    <a:srgbClr val="000000">
+                      <a:alpha val="43137"/>
+                    </a:srgbClr>
+                  </a:outerShdw>
+                </a:effectLst>
+                <a:latin typeface="-윤고딕310" panose="02030504000101010101" pitchFamily="18" charset="-127"/>
+                <a:ea typeface="-윤고딕310" panose="02030504000101010101" pitchFamily="18" charset="-127"/>
+              </a:rPr>
+              <a:t>게임 컨셉트</a:t>
+            </a:r>
+            <a:endParaRPr lang="en-US" altLang="ko-KR" sz="2000" dirty="0" smtClean="0">
+              <a:solidFill>
+                <a:schemeClr val="bg1"/>
+              </a:solidFill>
+              <a:effectLst>
+                <a:outerShdw blurRad="38100" dist="38100" dir="2700000" algn="tl">
+                  <a:srgbClr val="000000">
+                    <a:alpha val="43137"/>
+                  </a:srgbClr>
+                </a:outerShdw>
+              </a:effectLst>
+              <a:latin typeface="-윤고딕310" panose="02030504000101010101" pitchFamily="18" charset="-127"/>
+              <a:ea typeface="-윤고딕310" panose="02030504000101010101" pitchFamily="18" charset="-127"/>
+            </a:endParaRPr>
+          </a:p>
+          <a:p>
+            <a:pPr algn="ctr"/>
+            <a:r>
+              <a:rPr lang="ko-KR" altLang="en-US" sz="2000" dirty="0" smtClean="0">
+                <a:solidFill>
+                  <a:schemeClr val="bg1"/>
+                </a:solidFill>
+                <a:effectLst>
+                  <a:outerShdw blurRad="38100" dist="38100" dir="2700000" algn="tl">
+                    <a:srgbClr val="000000">
+                      <a:alpha val="43137"/>
+                    </a:srgbClr>
+                  </a:outerShdw>
+                </a:effectLst>
+                <a:latin typeface="-윤고딕310" panose="02030504000101010101" pitchFamily="18" charset="-127"/>
+                <a:ea typeface="-윤고딕310" panose="02030504000101010101" pitchFamily="18" charset="-127"/>
+              </a:rPr>
+              <a:t>게임 소개 </a:t>
+            </a:r>
+            <a:r>
+              <a:rPr lang="en-US" altLang="ko-KR" sz="2000" dirty="0" smtClean="0">
+                <a:solidFill>
+                  <a:schemeClr val="bg1"/>
+                </a:solidFill>
+                <a:effectLst>
+                  <a:outerShdw blurRad="38100" dist="38100" dir="2700000" algn="tl">
+                    <a:srgbClr val="000000">
+                      <a:alpha val="43137"/>
+                    </a:srgbClr>
+                  </a:outerShdw>
+                </a:effectLst>
+                <a:latin typeface="-윤고딕310" panose="02030504000101010101" pitchFamily="18" charset="-127"/>
+                <a:ea typeface="-윤고딕310" panose="02030504000101010101" pitchFamily="18" charset="-127"/>
+              </a:rPr>
+              <a:t>(</a:t>
+            </a:r>
+            <a:r>
+              <a:rPr lang="ko-KR" altLang="en-US" sz="2000" dirty="0">
+                <a:solidFill>
+                  <a:schemeClr val="bg1"/>
+                </a:solidFill>
+                <a:effectLst>
+                  <a:outerShdw blurRad="38100" dist="38100" dir="2700000" algn="tl">
+                    <a:srgbClr val="000000">
+                      <a:alpha val="43137"/>
+                    </a:srgbClr>
+                  </a:outerShdw>
+                </a:effectLst>
+                <a:latin typeface="-윤고딕310" panose="02030504000101010101" pitchFamily="18" charset="-127"/>
+                <a:ea typeface="-윤고딕310" panose="02030504000101010101" pitchFamily="18" charset="-127"/>
+              </a:rPr>
+              <a:t>세계관</a:t>
+            </a:r>
+            <a:r>
+              <a:rPr lang="en-US" altLang="ko-KR" sz="2000" dirty="0" smtClean="0">
+                <a:solidFill>
+                  <a:schemeClr val="bg1"/>
+                </a:solidFill>
+                <a:effectLst>
+                  <a:outerShdw blurRad="38100" dist="38100" dir="2700000" algn="tl">
+                    <a:srgbClr val="000000">
+                      <a:alpha val="43137"/>
+                    </a:srgbClr>
+                  </a:outerShdw>
+                </a:effectLst>
+                <a:latin typeface="-윤고딕310" panose="02030504000101010101" pitchFamily="18" charset="-127"/>
+                <a:ea typeface="-윤고딕310" panose="02030504000101010101" pitchFamily="18" charset="-127"/>
+              </a:rPr>
+              <a:t>)</a:t>
+            </a:r>
+          </a:p>
+          <a:p>
+            <a:pPr algn="ctr"/>
+            <a:r>
+              <a:rPr lang="ko-KR" altLang="en-US" sz="2000" dirty="0" smtClean="0">
+                <a:solidFill>
+                  <a:schemeClr val="bg1"/>
+                </a:solidFill>
+                <a:effectLst>
+                  <a:outerShdw blurRad="38100" dist="38100" dir="2700000" algn="tl">
+                    <a:srgbClr val="000000">
+                      <a:alpha val="43137"/>
+                    </a:srgbClr>
+                  </a:outerShdw>
+                </a:effectLst>
+                <a:latin typeface="-윤고딕310" panose="02030504000101010101" pitchFamily="18" charset="-127"/>
+                <a:ea typeface="-윤고딕310" panose="02030504000101010101" pitchFamily="18" charset="-127"/>
+              </a:rPr>
+              <a:t>게임 소개 </a:t>
+            </a:r>
+            <a:r>
+              <a:rPr lang="en-US" altLang="ko-KR" sz="2000" dirty="0" smtClean="0">
+                <a:solidFill>
+                  <a:schemeClr val="bg1"/>
+                </a:solidFill>
+                <a:effectLst>
+                  <a:outerShdw blurRad="38100" dist="38100" dir="2700000" algn="tl">
+                    <a:srgbClr val="000000">
+                      <a:alpha val="43137"/>
+                    </a:srgbClr>
+                  </a:outerShdw>
+                </a:effectLst>
+                <a:latin typeface="-윤고딕310" panose="02030504000101010101" pitchFamily="18" charset="-127"/>
+                <a:ea typeface="-윤고딕310" panose="02030504000101010101" pitchFamily="18" charset="-127"/>
+              </a:rPr>
+              <a:t>(</a:t>
+            </a:r>
+            <a:r>
+              <a:rPr lang="ko-KR" altLang="en-US" sz="2000" dirty="0" smtClean="0">
+                <a:solidFill>
+                  <a:schemeClr val="bg1"/>
+                </a:solidFill>
+                <a:effectLst>
+                  <a:outerShdw blurRad="38100" dist="38100" dir="2700000" algn="tl">
+                    <a:srgbClr val="000000">
+                      <a:alpha val="43137"/>
+                    </a:srgbClr>
+                  </a:outerShdw>
+                </a:effectLst>
+                <a:latin typeface="-윤고딕310" panose="02030504000101010101" pitchFamily="18" charset="-127"/>
+                <a:ea typeface="-윤고딕310" panose="02030504000101010101" pitchFamily="18" charset="-127"/>
+              </a:rPr>
+              <a:t>기본 시스템</a:t>
+            </a:r>
+            <a:r>
+              <a:rPr lang="en-US" altLang="ko-KR" sz="2000" dirty="0" smtClean="0">
+                <a:solidFill>
+                  <a:schemeClr val="bg1"/>
+                </a:solidFill>
+                <a:effectLst>
+                  <a:outerShdw blurRad="38100" dist="38100" dir="2700000" algn="tl">
+                    <a:srgbClr val="000000">
+                      <a:alpha val="43137"/>
+                    </a:srgbClr>
+                  </a:outerShdw>
+                </a:effectLst>
+                <a:latin typeface="-윤고딕310" panose="02030504000101010101" pitchFamily="18" charset="-127"/>
+                <a:ea typeface="-윤고딕310" panose="02030504000101010101" pitchFamily="18" charset="-127"/>
+              </a:rPr>
+              <a:t>)</a:t>
+            </a:r>
+          </a:p>
+          <a:p>
+            <a:pPr algn="ctr"/>
+            <a:r>
+              <a:rPr lang="ko-KR" altLang="en-US" sz="2000" dirty="0">
+                <a:solidFill>
+                  <a:schemeClr val="bg1"/>
+                </a:solidFill>
+                <a:effectLst>
+                  <a:outerShdw blurRad="38100" dist="38100" dir="2700000" algn="tl">
+                    <a:srgbClr val="000000">
+                      <a:alpha val="43137"/>
+                    </a:srgbClr>
+                  </a:outerShdw>
+                </a:effectLst>
+                <a:latin typeface="-윤고딕310" panose="02030504000101010101" pitchFamily="18" charset="-127"/>
+                <a:ea typeface="-윤고딕310" panose="02030504000101010101" pitchFamily="18" charset="-127"/>
+              </a:rPr>
+              <a:t>게임 </a:t>
+            </a:r>
+            <a:r>
+              <a:rPr lang="ko-KR" altLang="en-US" sz="2000" dirty="0" smtClean="0">
+                <a:solidFill>
+                  <a:schemeClr val="bg1"/>
+                </a:solidFill>
+                <a:effectLst>
+                  <a:outerShdw blurRad="38100" dist="38100" dir="2700000" algn="tl">
+                    <a:srgbClr val="000000">
+                      <a:alpha val="43137"/>
+                    </a:srgbClr>
+                  </a:outerShdw>
+                </a:effectLst>
+                <a:latin typeface="-윤고딕310" panose="02030504000101010101" pitchFamily="18" charset="-127"/>
+                <a:ea typeface="-윤고딕310" panose="02030504000101010101" pitchFamily="18" charset="-127"/>
+              </a:rPr>
+              <a:t>소개</a:t>
+            </a:r>
+            <a:r>
+              <a:rPr lang="ko-KR" altLang="en-US" sz="2000" dirty="0">
+                <a:solidFill>
+                  <a:schemeClr val="bg1"/>
+                </a:solidFill>
+                <a:effectLst>
+                  <a:outerShdw blurRad="38100" dist="38100" dir="2700000" algn="tl">
+                    <a:srgbClr val="000000">
+                      <a:alpha val="43137"/>
+                    </a:srgbClr>
+                  </a:outerShdw>
+                </a:effectLst>
+                <a:latin typeface="-윤고딕310" panose="02030504000101010101" pitchFamily="18" charset="-127"/>
+                <a:ea typeface="-윤고딕310" panose="02030504000101010101" pitchFamily="18" charset="-127"/>
+              </a:rPr>
+              <a:t> </a:t>
+            </a:r>
+            <a:r>
+              <a:rPr lang="en-US" altLang="ko-KR" sz="2000" dirty="0" smtClean="0">
+                <a:solidFill>
+                  <a:schemeClr val="bg1"/>
+                </a:solidFill>
+                <a:effectLst>
+                  <a:outerShdw blurRad="38100" dist="38100" dir="2700000" algn="tl">
+                    <a:srgbClr val="000000">
+                      <a:alpha val="43137"/>
+                    </a:srgbClr>
+                  </a:outerShdw>
+                </a:effectLst>
+                <a:latin typeface="-윤고딕310" panose="02030504000101010101" pitchFamily="18" charset="-127"/>
+                <a:ea typeface="-윤고딕310" panose="02030504000101010101" pitchFamily="18" charset="-127"/>
+              </a:rPr>
+              <a:t>(</a:t>
+            </a:r>
+            <a:r>
+              <a:rPr lang="ko-KR" altLang="en-US" sz="2000" dirty="0" smtClean="0">
+                <a:solidFill>
+                  <a:schemeClr val="bg1"/>
+                </a:solidFill>
+                <a:effectLst>
+                  <a:outerShdw blurRad="38100" dist="38100" dir="2700000" algn="tl">
+                    <a:srgbClr val="000000">
+                      <a:alpha val="43137"/>
+                    </a:srgbClr>
+                  </a:outerShdw>
+                </a:effectLst>
+                <a:latin typeface="-윤고딕310" panose="02030504000101010101" pitchFamily="18" charset="-127"/>
+                <a:ea typeface="-윤고딕310" panose="02030504000101010101" pitchFamily="18" charset="-127"/>
+              </a:rPr>
+              <a:t>진행 </a:t>
+            </a:r>
+            <a:r>
+              <a:rPr lang="ko-KR" altLang="en-US" sz="2000" dirty="0">
+                <a:solidFill>
+                  <a:schemeClr val="bg1"/>
+                </a:solidFill>
+                <a:effectLst>
+                  <a:outerShdw blurRad="38100" dist="38100" dir="2700000" algn="tl">
+                    <a:srgbClr val="000000">
+                      <a:alpha val="43137"/>
+                    </a:srgbClr>
+                  </a:outerShdw>
+                </a:effectLst>
+                <a:latin typeface="-윤고딕310" panose="02030504000101010101" pitchFamily="18" charset="-127"/>
+                <a:ea typeface="-윤고딕310" panose="02030504000101010101" pitchFamily="18" charset="-127"/>
+              </a:rPr>
+              <a:t>및 조작</a:t>
+            </a:r>
+            <a:r>
+              <a:rPr lang="en-US" altLang="ko-KR" sz="2000" dirty="0" smtClean="0">
+                <a:solidFill>
+                  <a:schemeClr val="bg1"/>
+                </a:solidFill>
+                <a:effectLst>
+                  <a:outerShdw blurRad="38100" dist="38100" dir="2700000" algn="tl">
+                    <a:srgbClr val="000000">
+                      <a:alpha val="43137"/>
+                    </a:srgbClr>
+                  </a:outerShdw>
+                </a:effectLst>
+                <a:latin typeface="-윤고딕310" panose="02030504000101010101" pitchFamily="18" charset="-127"/>
+                <a:ea typeface="-윤고딕310" panose="02030504000101010101" pitchFamily="18" charset="-127"/>
+              </a:rPr>
+              <a:t>)</a:t>
+            </a:r>
+          </a:p>
+          <a:p>
+            <a:pPr algn="ctr"/>
+            <a:r>
+              <a:rPr lang="ko-KR" altLang="en-US" sz="2000" dirty="0" smtClean="0">
+                <a:solidFill>
+                  <a:schemeClr val="bg1"/>
+                </a:solidFill>
+                <a:effectLst>
+                  <a:outerShdw blurRad="38100" dist="38100" dir="2700000" algn="tl">
+                    <a:srgbClr val="000000">
+                      <a:alpha val="43137"/>
+                    </a:srgbClr>
+                  </a:outerShdw>
+                </a:effectLst>
+                <a:latin typeface="-윤고딕310" panose="02030504000101010101" pitchFamily="18" charset="-127"/>
+                <a:ea typeface="-윤고딕310" panose="02030504000101010101" pitchFamily="18" charset="-127"/>
+              </a:rPr>
+              <a:t>게임 소개 </a:t>
+            </a:r>
+            <a:r>
+              <a:rPr lang="en-US" altLang="ko-KR" sz="2000" dirty="0" smtClean="0">
+                <a:solidFill>
+                  <a:schemeClr val="bg1"/>
+                </a:solidFill>
+                <a:effectLst>
+                  <a:outerShdw blurRad="38100" dist="38100" dir="2700000" algn="tl">
+                    <a:srgbClr val="000000">
+                      <a:alpha val="43137"/>
+                    </a:srgbClr>
+                  </a:outerShdw>
+                </a:effectLst>
+                <a:latin typeface="-윤고딕310" panose="02030504000101010101" pitchFamily="18" charset="-127"/>
+                <a:ea typeface="-윤고딕310" panose="02030504000101010101" pitchFamily="18" charset="-127"/>
+              </a:rPr>
+              <a:t>(</a:t>
+            </a:r>
+            <a:r>
+              <a:rPr lang="ko-KR" altLang="en-US" sz="2000" dirty="0" smtClean="0">
+                <a:solidFill>
+                  <a:schemeClr val="bg1"/>
+                </a:solidFill>
+                <a:effectLst>
+                  <a:outerShdw blurRad="38100" dist="38100" dir="2700000" algn="tl">
+                    <a:srgbClr val="000000">
+                      <a:alpha val="43137"/>
+                    </a:srgbClr>
+                  </a:outerShdw>
+                </a:effectLst>
+                <a:latin typeface="-윤고딕310" panose="02030504000101010101" pitchFamily="18" charset="-127"/>
+                <a:ea typeface="-윤고딕310" panose="02030504000101010101" pitchFamily="18" charset="-127"/>
+              </a:rPr>
+              <a:t>전투</a:t>
+            </a:r>
+            <a:r>
+              <a:rPr lang="en-US" altLang="ko-KR" sz="2000" dirty="0" smtClean="0">
+                <a:solidFill>
+                  <a:schemeClr val="bg1"/>
+                </a:solidFill>
+                <a:effectLst>
+                  <a:outerShdw blurRad="38100" dist="38100" dir="2700000" algn="tl">
+                    <a:srgbClr val="000000">
+                      <a:alpha val="43137"/>
+                    </a:srgbClr>
+                  </a:outerShdw>
+                </a:effectLst>
+                <a:latin typeface="-윤고딕310" panose="02030504000101010101" pitchFamily="18" charset="-127"/>
+                <a:ea typeface="-윤고딕310" panose="02030504000101010101" pitchFamily="18" charset="-127"/>
+              </a:rPr>
+              <a:t>)</a:t>
+            </a:r>
+            <a:endParaRPr lang="en-US" altLang="ko-KR" sz="2000" dirty="0">
+              <a:solidFill>
+                <a:schemeClr val="bg1"/>
+              </a:solidFill>
+              <a:effectLst>
+                <a:outerShdw blurRad="38100" dist="38100" dir="2700000" algn="tl">
+                  <a:srgbClr val="000000">
+                    <a:alpha val="43137"/>
+                  </a:srgbClr>
+                </a:outerShdw>
+              </a:effectLst>
+              <a:latin typeface="-윤고딕310" panose="02030504000101010101" pitchFamily="18" charset="-127"/>
+              <a:ea typeface="-윤고딕310" panose="02030504000101010101" pitchFamily="18" charset="-127"/>
+            </a:endParaRPr>
+          </a:p>
+        </p:txBody>
+      </p:sp>
+      <p:sp>
+        <p:nvSpPr>
+          <p:cNvPr id="18" name="TextBox 17"/>
+          <p:cNvSpPr txBox="1"/>
+          <p:nvPr/>
+        </p:nvSpPr>
+        <p:spPr>
+          <a:xfrm>
+            <a:off x="5487499" y="3868131"/>
+            <a:ext cx="1217000" cy="400110"/>
+          </a:xfrm>
+          <a:prstGeom prst="rect">
+            <a:avLst/>
+          </a:prstGeom>
+          <a:noFill/>
+        </p:spPr>
+        <p:txBody>
+          <a:bodyPr wrap="none" rtlCol="0" anchor="t">
+            <a:spAutoFit/>
+          </a:bodyPr>
+          <a:lstStyle/>
+          <a:p>
+            <a:pPr algn="ctr"/>
+            <a:r>
+              <a:rPr lang="ko-KR" altLang="en-US" sz="2000" dirty="0" smtClean="0">
+                <a:solidFill>
+                  <a:schemeClr val="bg1"/>
+                </a:solidFill>
+                <a:effectLst>
+                  <a:outerShdw blurRad="38100" dist="38100" dir="2700000" algn="tl">
+                    <a:srgbClr val="000000">
+                      <a:alpha val="43137"/>
+                    </a:srgbClr>
+                  </a:outerShdw>
+                </a:effectLst>
+                <a:latin typeface="-윤고딕310" panose="02030504000101010101" pitchFamily="18" charset="-127"/>
+                <a:ea typeface="-윤고딕310" panose="02030504000101010101" pitchFamily="18" charset="-127"/>
+              </a:rPr>
+              <a:t>개발 요소</a:t>
+            </a:r>
+            <a:endParaRPr lang="en-US" altLang="ko-KR" sz="2000" dirty="0" smtClean="0">
+              <a:solidFill>
+                <a:schemeClr val="bg1"/>
+              </a:solidFill>
+              <a:effectLst>
+                <a:outerShdw blurRad="38100" dist="38100" dir="2700000" algn="tl">
+                  <a:srgbClr val="000000">
+                    <a:alpha val="43137"/>
+                  </a:srgbClr>
+                </a:outerShdw>
+              </a:effectLst>
+              <a:latin typeface="-윤고딕310" panose="02030504000101010101" pitchFamily="18" charset="-127"/>
+              <a:ea typeface="-윤고딕310" panose="02030504000101010101" pitchFamily="18" charset="-127"/>
+            </a:endParaRPr>
+          </a:p>
+        </p:txBody>
+      </p:sp>
+      <p:sp>
+        <p:nvSpPr>
+          <p:cNvPr id="19" name="TextBox 18"/>
+          <p:cNvSpPr txBox="1"/>
+          <p:nvPr/>
+        </p:nvSpPr>
+        <p:spPr>
+          <a:xfrm>
+            <a:off x="9175424" y="3879395"/>
+            <a:ext cx="2013693" cy="1015663"/>
+          </a:xfrm>
+          <a:prstGeom prst="rect">
+            <a:avLst/>
+          </a:prstGeom>
+          <a:noFill/>
+        </p:spPr>
+        <p:txBody>
+          <a:bodyPr wrap="none" rtlCol="0" anchor="t">
+            <a:spAutoFit/>
+          </a:bodyPr>
+          <a:lstStyle/>
+          <a:p>
+            <a:pPr algn="ctr"/>
+            <a:r>
+              <a:rPr lang="ko-KR" altLang="en-US" sz="2000" dirty="0" smtClean="0">
+                <a:solidFill>
+                  <a:schemeClr val="bg1"/>
+                </a:solidFill>
+                <a:effectLst>
+                  <a:outerShdw blurRad="38100" dist="38100" dir="2700000" algn="tl">
+                    <a:srgbClr val="000000">
+                      <a:alpha val="43137"/>
+                    </a:srgbClr>
+                  </a:outerShdw>
+                </a:effectLst>
+                <a:latin typeface="-윤고딕310" panose="02030504000101010101" pitchFamily="18" charset="-127"/>
+                <a:ea typeface="-윤고딕310" panose="02030504000101010101" pitchFamily="18" charset="-127"/>
+              </a:rPr>
+              <a:t>기말 기획서 내용</a:t>
+            </a:r>
+            <a:endParaRPr lang="en-US" altLang="ko-KR" sz="2000" dirty="0" smtClean="0">
+              <a:solidFill>
+                <a:schemeClr val="bg1"/>
+              </a:solidFill>
+              <a:effectLst>
+                <a:outerShdw blurRad="38100" dist="38100" dir="2700000" algn="tl">
+                  <a:srgbClr val="000000">
+                    <a:alpha val="43137"/>
+                  </a:srgbClr>
+                </a:outerShdw>
+              </a:effectLst>
+              <a:latin typeface="-윤고딕310" panose="02030504000101010101" pitchFamily="18" charset="-127"/>
+              <a:ea typeface="-윤고딕310" panose="02030504000101010101" pitchFamily="18" charset="-127"/>
+            </a:endParaRPr>
+          </a:p>
+          <a:p>
+            <a:pPr algn="ctr"/>
+            <a:r>
+              <a:rPr lang="ko-KR" altLang="en-US" sz="2000" dirty="0" smtClean="0">
+                <a:solidFill>
+                  <a:schemeClr val="bg1"/>
+                </a:solidFill>
+                <a:effectLst>
+                  <a:outerShdw blurRad="38100" dist="38100" dir="2700000" algn="tl">
+                    <a:srgbClr val="000000">
+                      <a:alpha val="43137"/>
+                    </a:srgbClr>
+                  </a:outerShdw>
+                </a:effectLst>
+                <a:latin typeface="-윤고딕310" panose="02030504000101010101" pitchFamily="18" charset="-127"/>
+                <a:ea typeface="-윤고딕310" panose="02030504000101010101" pitchFamily="18" charset="-127"/>
+              </a:rPr>
+              <a:t>코멘트와 후기</a:t>
+            </a:r>
+            <a:endParaRPr lang="en-US" altLang="ko-KR" sz="2000" dirty="0" smtClean="0">
+              <a:solidFill>
+                <a:schemeClr val="bg1"/>
+              </a:solidFill>
+              <a:effectLst>
+                <a:outerShdw blurRad="38100" dist="38100" dir="2700000" algn="tl">
+                  <a:srgbClr val="000000">
+                    <a:alpha val="43137"/>
+                  </a:srgbClr>
+                </a:outerShdw>
+              </a:effectLst>
+              <a:latin typeface="-윤고딕310" panose="02030504000101010101" pitchFamily="18" charset="-127"/>
+              <a:ea typeface="-윤고딕310" panose="02030504000101010101" pitchFamily="18" charset="-127"/>
+            </a:endParaRPr>
+          </a:p>
+          <a:p>
+            <a:pPr algn="ctr"/>
+            <a:r>
+              <a:rPr lang="ko-KR" altLang="en-US" sz="2000" dirty="0" smtClean="0">
+                <a:solidFill>
+                  <a:schemeClr val="bg1"/>
+                </a:solidFill>
+                <a:effectLst>
+                  <a:outerShdw blurRad="38100" dist="38100" dir="2700000" algn="tl">
+                    <a:srgbClr val="000000">
+                      <a:alpha val="43137"/>
+                    </a:srgbClr>
+                  </a:outerShdw>
+                </a:effectLst>
+                <a:latin typeface="-윤고딕310" panose="02030504000101010101" pitchFamily="18" charset="-127"/>
+                <a:ea typeface="-윤고딕310" panose="02030504000101010101" pitchFamily="18" charset="-127"/>
+              </a:rPr>
+              <a:t>자료 출처</a:t>
+            </a:r>
+            <a:endParaRPr lang="ko-KR" altLang="en-US" sz="2000" dirty="0">
+              <a:solidFill>
+                <a:schemeClr val="bg1"/>
+              </a:solidFill>
+              <a:effectLst>
+                <a:outerShdw blurRad="38100" dist="38100" dir="2700000" algn="tl">
+                  <a:srgbClr val="000000">
+                    <a:alpha val="43137"/>
+                  </a:srgbClr>
+                </a:outerShdw>
+              </a:effectLst>
+              <a:latin typeface="-윤고딕310" panose="02030504000101010101" pitchFamily="18" charset="-127"/>
+              <a:ea typeface="-윤고딕310" panose="02030504000101010101" pitchFamily="18" charset="-127"/>
+            </a:endParaRPr>
+          </a:p>
+        </p:txBody>
+      </p:sp>
+      <p:cxnSp>
+        <p:nvCxnSpPr>
+          <p:cNvPr id="21" name="직선 연결선 20"/>
+          <p:cNvCxnSpPr/>
+          <p:nvPr/>
+        </p:nvCxnSpPr>
+        <p:spPr>
+          <a:xfrm>
+            <a:off x="262467" y="3718560"/>
+            <a:ext cx="11430000" cy="0"/>
+          </a:xfrm>
+          <a:prstGeom prst="line">
+            <a:avLst/>
+          </a:prstGeom>
+          <a:ln w="9525">
+            <a:solidFill>
+              <a:schemeClr val="bg1"/>
+            </a:solidFill>
+          </a:ln>
+        </p:spPr>
+        <p:style>
+          <a:lnRef idx="1">
+            <a:schemeClr val="accent1"/>
+          </a:lnRef>
+          <a:fillRef idx="0">
+            <a:schemeClr val="accent1"/>
+          </a:fillRef>
+          <a:effectRef idx="0">
+            <a:schemeClr val="accent1"/>
+          </a:effectRef>
+          <a:fontRef idx="minor">
+            <a:schemeClr val="tx1"/>
+          </a:fontRef>
+        </p:style>
+      </p:cxnSp>
+    </p:spTree>
+    <p:extLst>
+      <p:ext uri="{BB962C8B-B14F-4D97-AF65-F5344CB8AC3E}">
+        <p14:creationId xmlns:p14="http://schemas.microsoft.com/office/powerpoint/2010/main" val="421804534"/>
+      </p:ext>
+    </p:extLst>
+  </p:cSld>
+  <p:clrMapOvr>
+    <a:masterClrMapping/>
+  </p:clrMapOvr>
+  <p:timing>
+    <p:tnLst>
+      <p:par>
+        <p:cTn id="1" dur="indefinite" restart="never" nodeType="tmRoot"/>
+      </p:par>
+    </p:tnLst>
+  </p:timing>
+</p:sld>
+</file>
+
+<file path=ppt/slides/slide20.xml><?xml version="1.0" encoding="utf-8"?>
 <p:sld xmlns:a="http://schemas.openxmlformats.org/drawingml/2006/main" xmlns:r="http://schemas.openxmlformats.org/officeDocument/2006/relationships" xmlns:p="http://schemas.openxmlformats.org/presentationml/2006/main">
   <p:cSld>
     <p:spTree>
@@ -30195,1114 +33637,7 @@
 </p:sld>
 </file>
 
-<file path=ppt/slides/slide2.xml><?xml version="1.0" encoding="utf-8"?>
-<p:sld xmlns:a="http://schemas.openxmlformats.org/drawingml/2006/main" xmlns:r="http://schemas.openxmlformats.org/officeDocument/2006/relationships" xmlns:p="http://schemas.openxmlformats.org/presentationml/2006/main">
-  <p:cSld>
-    <p:spTree>
-      <p:nvGrpSpPr>
-        <p:cNvPr id="1" name=""/>
-        <p:cNvGrpSpPr/>
-        <p:nvPr/>
-      </p:nvGrpSpPr>
-      <p:grpSpPr>
-        <a:xfrm>
-          <a:off x="0" y="0"/>
-          <a:ext cx="0" cy="0"/>
-          <a:chOff x="0" y="0"/>
-          <a:chExt cx="0" cy="0"/>
-        </a:xfrm>
-      </p:grpSpPr>
-      <p:sp>
-        <p:nvSpPr>
-          <p:cNvPr id="4" name="TextBox 3"/>
-          <p:cNvSpPr txBox="1"/>
-          <p:nvPr/>
-        </p:nvSpPr>
-        <p:spPr>
-          <a:xfrm>
-            <a:off x="1381918" y="2255520"/>
-            <a:ext cx="1181734" cy="1015663"/>
-          </a:xfrm>
-          <a:prstGeom prst="rect">
-            <a:avLst/>
-          </a:prstGeom>
-          <a:noFill/>
-        </p:spPr>
-        <p:txBody>
-          <a:bodyPr wrap="none" rtlCol="0" anchor="ctr">
-            <a:spAutoFit/>
-          </a:bodyPr>
-          <a:lstStyle/>
-          <a:p>
-            <a:pPr algn="ctr"/>
-            <a:r>
-              <a:rPr lang="en-US" altLang="ko-KR" sz="6000" dirty="0" smtClean="0">
-                <a:solidFill>
-                  <a:schemeClr val="bg1"/>
-                </a:solidFill>
-                <a:effectLst>
-                  <a:outerShdw blurRad="38100" dist="38100" dir="2700000" algn="tl">
-                    <a:srgbClr val="000000">
-                      <a:alpha val="43137"/>
-                    </a:srgbClr>
-                  </a:outerShdw>
-                </a:effectLst>
-                <a:latin typeface="Continuum Light" panose="00000400000000000000" pitchFamily="2" charset="0"/>
-                <a:ea typeface="-윤고딕310" panose="02030504000101010101" pitchFamily="18" charset="-127"/>
-              </a:rPr>
-              <a:t>01</a:t>
-            </a:r>
-            <a:endParaRPr lang="ko-KR" altLang="en-US" sz="6000" dirty="0">
-              <a:solidFill>
-                <a:schemeClr val="bg1"/>
-              </a:solidFill>
-              <a:effectLst>
-                <a:outerShdw blurRad="38100" dist="38100" dir="2700000" algn="tl">
-                  <a:srgbClr val="000000">
-                    <a:alpha val="43137"/>
-                  </a:srgbClr>
-                </a:outerShdw>
-              </a:effectLst>
-              <a:latin typeface="Continuum Light" panose="00000400000000000000" pitchFamily="2" charset="0"/>
-              <a:ea typeface="-윤고딕310" panose="02030504000101010101" pitchFamily="18" charset="-127"/>
-            </a:endParaRPr>
-          </a:p>
-        </p:txBody>
-      </p:sp>
-      <p:sp>
-        <p:nvSpPr>
-          <p:cNvPr id="5" name="TextBox 4"/>
-          <p:cNvSpPr txBox="1"/>
-          <p:nvPr/>
-        </p:nvSpPr>
-        <p:spPr>
-          <a:xfrm>
-            <a:off x="1473289" y="3167390"/>
-            <a:ext cx="998992" cy="523220"/>
-          </a:xfrm>
-          <a:prstGeom prst="rect">
-            <a:avLst/>
-          </a:prstGeom>
-          <a:noFill/>
-        </p:spPr>
-        <p:txBody>
-          <a:bodyPr wrap="none" rtlCol="0" anchor="ctr">
-            <a:spAutoFit/>
-          </a:bodyPr>
-          <a:lstStyle/>
-          <a:p>
-            <a:pPr algn="ctr"/>
-            <a:r>
-              <a:rPr lang="ko-KR" altLang="en-US" sz="2800" spc="600" dirty="0" smtClean="0">
-                <a:solidFill>
-                  <a:schemeClr val="bg1"/>
-                </a:solidFill>
-                <a:effectLst>
-                  <a:outerShdw blurRad="38100" dist="38100" dir="2700000" algn="tl">
-                    <a:srgbClr val="000000">
-                      <a:alpha val="43137"/>
-                    </a:srgbClr>
-                  </a:outerShdw>
-                </a:effectLst>
-                <a:latin typeface="-윤고딕320" panose="02030504000101010101" pitchFamily="18" charset="-127"/>
-                <a:ea typeface="-윤고딕320" panose="02030504000101010101" pitchFamily="18" charset="-127"/>
-              </a:rPr>
-              <a:t>기획</a:t>
-            </a:r>
-            <a:endParaRPr lang="ko-KR" altLang="en-US" sz="2800" spc="600" dirty="0">
-              <a:solidFill>
-                <a:schemeClr val="bg1"/>
-              </a:solidFill>
-              <a:effectLst>
-                <a:outerShdw blurRad="38100" dist="38100" dir="2700000" algn="tl">
-                  <a:srgbClr val="000000">
-                    <a:alpha val="43137"/>
-                  </a:srgbClr>
-                </a:outerShdw>
-              </a:effectLst>
-              <a:latin typeface="-윤고딕320" panose="02030504000101010101" pitchFamily="18" charset="-127"/>
-              <a:ea typeface="-윤고딕320" panose="02030504000101010101" pitchFamily="18" charset="-127"/>
-            </a:endParaRPr>
-          </a:p>
-        </p:txBody>
-      </p:sp>
-      <p:sp>
-        <p:nvSpPr>
-          <p:cNvPr id="6" name="TextBox 5"/>
-          <p:cNvSpPr txBox="1"/>
-          <p:nvPr/>
-        </p:nvSpPr>
-        <p:spPr>
-          <a:xfrm>
-            <a:off x="5596504" y="3167390"/>
-            <a:ext cx="998992" cy="523220"/>
-          </a:xfrm>
-          <a:prstGeom prst="rect">
-            <a:avLst/>
-          </a:prstGeom>
-          <a:noFill/>
-        </p:spPr>
-        <p:txBody>
-          <a:bodyPr wrap="none" rtlCol="0" anchor="ctr">
-            <a:spAutoFit/>
-          </a:bodyPr>
-          <a:lstStyle/>
-          <a:p>
-            <a:pPr algn="ctr"/>
-            <a:r>
-              <a:rPr lang="ko-KR" altLang="en-US" sz="2800" spc="600" dirty="0" smtClean="0">
-                <a:solidFill>
-                  <a:schemeClr val="bg1"/>
-                </a:solidFill>
-                <a:effectLst>
-                  <a:outerShdw blurRad="38100" dist="38100" dir="2700000" algn="tl">
-                    <a:srgbClr val="000000">
-                      <a:alpha val="43137"/>
-                    </a:srgbClr>
-                  </a:outerShdw>
-                </a:effectLst>
-                <a:latin typeface="-윤고딕320" panose="02030504000101010101" pitchFamily="18" charset="-127"/>
-                <a:ea typeface="-윤고딕320" panose="02030504000101010101" pitchFamily="18" charset="-127"/>
-              </a:rPr>
-              <a:t>개발</a:t>
-            </a:r>
-            <a:endParaRPr lang="ko-KR" altLang="en-US" sz="2800" spc="600" dirty="0">
-              <a:solidFill>
-                <a:schemeClr val="bg1"/>
-              </a:solidFill>
-              <a:effectLst>
-                <a:outerShdw blurRad="38100" dist="38100" dir="2700000" algn="tl">
-                  <a:srgbClr val="000000">
-                    <a:alpha val="43137"/>
-                  </a:srgbClr>
-                </a:outerShdw>
-              </a:effectLst>
-              <a:latin typeface="-윤고딕320" panose="02030504000101010101" pitchFamily="18" charset="-127"/>
-              <a:ea typeface="-윤고딕320" panose="02030504000101010101" pitchFamily="18" charset="-127"/>
-            </a:endParaRPr>
-          </a:p>
-        </p:txBody>
-      </p:sp>
-      <p:sp>
-        <p:nvSpPr>
-          <p:cNvPr id="7" name="TextBox 6"/>
-          <p:cNvSpPr txBox="1"/>
-          <p:nvPr/>
-        </p:nvSpPr>
-        <p:spPr>
-          <a:xfrm>
-            <a:off x="9479191" y="3167390"/>
-            <a:ext cx="1406154" cy="523220"/>
-          </a:xfrm>
-          <a:prstGeom prst="rect">
-            <a:avLst/>
-          </a:prstGeom>
-          <a:noFill/>
-        </p:spPr>
-        <p:txBody>
-          <a:bodyPr wrap="none" rtlCol="0" anchor="ctr">
-            <a:spAutoFit/>
-          </a:bodyPr>
-          <a:lstStyle/>
-          <a:p>
-            <a:pPr algn="ctr"/>
-            <a:r>
-              <a:rPr lang="ko-KR" altLang="en-US" sz="2800" spc="600" dirty="0" smtClean="0">
-                <a:solidFill>
-                  <a:schemeClr val="bg1"/>
-                </a:solidFill>
-                <a:effectLst>
-                  <a:outerShdw blurRad="38100" dist="38100" dir="2700000" algn="tl">
-                    <a:srgbClr val="000000">
-                      <a:alpha val="43137"/>
-                    </a:srgbClr>
-                  </a:outerShdw>
-                </a:effectLst>
-                <a:latin typeface="-윤고딕320" panose="02030504000101010101" pitchFamily="18" charset="-127"/>
-                <a:ea typeface="-윤고딕320" panose="02030504000101010101" pitchFamily="18" charset="-127"/>
-              </a:rPr>
-              <a:t>마무리</a:t>
-            </a:r>
-            <a:endParaRPr lang="ko-KR" altLang="en-US" sz="2800" spc="600" dirty="0">
-              <a:solidFill>
-                <a:schemeClr val="bg1"/>
-              </a:solidFill>
-              <a:effectLst>
-                <a:outerShdw blurRad="38100" dist="38100" dir="2700000" algn="tl">
-                  <a:srgbClr val="000000">
-                    <a:alpha val="43137"/>
-                  </a:srgbClr>
-                </a:outerShdw>
-              </a:effectLst>
-              <a:latin typeface="-윤고딕320" panose="02030504000101010101" pitchFamily="18" charset="-127"/>
-              <a:ea typeface="-윤고딕320" panose="02030504000101010101" pitchFamily="18" charset="-127"/>
-            </a:endParaRPr>
-          </a:p>
-        </p:txBody>
-      </p:sp>
-      <p:sp>
-        <p:nvSpPr>
-          <p:cNvPr id="9" name="TextBox 8"/>
-          <p:cNvSpPr txBox="1"/>
-          <p:nvPr/>
-        </p:nvSpPr>
-        <p:spPr>
-          <a:xfrm>
-            <a:off x="5505133" y="2255520"/>
-            <a:ext cx="1181734" cy="1015663"/>
-          </a:xfrm>
-          <a:prstGeom prst="rect">
-            <a:avLst/>
-          </a:prstGeom>
-          <a:noFill/>
-        </p:spPr>
-        <p:txBody>
-          <a:bodyPr wrap="none" rtlCol="0" anchor="ctr">
-            <a:spAutoFit/>
-          </a:bodyPr>
-          <a:lstStyle/>
-          <a:p>
-            <a:pPr algn="ctr"/>
-            <a:r>
-              <a:rPr lang="en-US" altLang="ko-KR" sz="6000" dirty="0" smtClean="0">
-                <a:solidFill>
-                  <a:schemeClr val="bg1"/>
-                </a:solidFill>
-                <a:effectLst>
-                  <a:outerShdw blurRad="38100" dist="38100" dir="2700000" algn="tl">
-                    <a:srgbClr val="000000">
-                      <a:alpha val="43137"/>
-                    </a:srgbClr>
-                  </a:outerShdw>
-                </a:effectLst>
-                <a:latin typeface="Continuum Light" panose="00000400000000000000" pitchFamily="2" charset="0"/>
-                <a:ea typeface="-윤고딕310" panose="02030504000101010101" pitchFamily="18" charset="-127"/>
-              </a:rPr>
-              <a:t>02</a:t>
-            </a:r>
-            <a:endParaRPr lang="ko-KR" altLang="en-US" sz="6000" dirty="0">
-              <a:solidFill>
-                <a:schemeClr val="bg1"/>
-              </a:solidFill>
-              <a:effectLst>
-                <a:outerShdw blurRad="38100" dist="38100" dir="2700000" algn="tl">
-                  <a:srgbClr val="000000">
-                    <a:alpha val="43137"/>
-                  </a:srgbClr>
-                </a:outerShdw>
-              </a:effectLst>
-              <a:latin typeface="Continuum Light" panose="00000400000000000000" pitchFamily="2" charset="0"/>
-              <a:ea typeface="-윤고딕310" panose="02030504000101010101" pitchFamily="18" charset="-127"/>
-            </a:endParaRPr>
-          </a:p>
-        </p:txBody>
-      </p:sp>
-      <p:sp>
-        <p:nvSpPr>
-          <p:cNvPr id="10" name="TextBox 9"/>
-          <p:cNvSpPr txBox="1"/>
-          <p:nvPr/>
-        </p:nvSpPr>
-        <p:spPr>
-          <a:xfrm>
-            <a:off x="9591401" y="2255520"/>
-            <a:ext cx="1181734" cy="1015663"/>
-          </a:xfrm>
-          <a:prstGeom prst="rect">
-            <a:avLst/>
-          </a:prstGeom>
-          <a:noFill/>
-        </p:spPr>
-        <p:txBody>
-          <a:bodyPr wrap="none" rtlCol="0" anchor="ctr">
-            <a:spAutoFit/>
-          </a:bodyPr>
-          <a:lstStyle/>
-          <a:p>
-            <a:pPr algn="ctr"/>
-            <a:r>
-              <a:rPr lang="en-US" altLang="ko-KR" sz="6000" dirty="0" smtClean="0">
-                <a:solidFill>
-                  <a:schemeClr val="bg1"/>
-                </a:solidFill>
-                <a:effectLst>
-                  <a:outerShdw blurRad="38100" dist="38100" dir="2700000" algn="tl">
-                    <a:srgbClr val="000000">
-                      <a:alpha val="43137"/>
-                    </a:srgbClr>
-                  </a:outerShdw>
-                </a:effectLst>
-                <a:latin typeface="Continuum Light" panose="00000400000000000000" pitchFamily="2" charset="0"/>
-                <a:ea typeface="-윤고딕310" panose="02030504000101010101" pitchFamily="18" charset="-127"/>
-              </a:rPr>
-              <a:t>03</a:t>
-            </a:r>
-            <a:endParaRPr lang="ko-KR" altLang="en-US" sz="6000" dirty="0">
-              <a:solidFill>
-                <a:schemeClr val="bg1"/>
-              </a:solidFill>
-              <a:effectLst>
-                <a:outerShdw blurRad="38100" dist="38100" dir="2700000" algn="tl">
-                  <a:srgbClr val="000000">
-                    <a:alpha val="43137"/>
-                  </a:srgbClr>
-                </a:outerShdw>
-              </a:effectLst>
-              <a:latin typeface="Continuum Light" panose="00000400000000000000" pitchFamily="2" charset="0"/>
-              <a:ea typeface="-윤고딕310" panose="02030504000101010101" pitchFamily="18" charset="-127"/>
-            </a:endParaRPr>
-          </a:p>
-        </p:txBody>
-      </p:sp>
-      <p:cxnSp>
-        <p:nvCxnSpPr>
-          <p:cNvPr id="13" name="직선 연결선 12"/>
-          <p:cNvCxnSpPr/>
-          <p:nvPr/>
-        </p:nvCxnSpPr>
-        <p:spPr>
-          <a:xfrm>
-            <a:off x="1792785" y="2255520"/>
-            <a:ext cx="360000" cy="0"/>
-          </a:xfrm>
-          <a:prstGeom prst="line">
-            <a:avLst/>
-          </a:prstGeom>
-          <a:ln w="19050">
-            <a:solidFill>
-              <a:schemeClr val="bg1"/>
-            </a:solidFill>
-          </a:ln>
-        </p:spPr>
-        <p:style>
-          <a:lnRef idx="1">
-            <a:schemeClr val="accent1"/>
-          </a:lnRef>
-          <a:fillRef idx="0">
-            <a:schemeClr val="accent1"/>
-          </a:fillRef>
-          <a:effectRef idx="0">
-            <a:schemeClr val="accent1"/>
-          </a:effectRef>
-          <a:fontRef idx="minor">
-            <a:schemeClr val="tx1"/>
-          </a:fontRef>
-        </p:style>
-      </p:cxnSp>
-      <p:cxnSp>
-        <p:nvCxnSpPr>
-          <p:cNvPr id="14" name="직선 연결선 13"/>
-          <p:cNvCxnSpPr/>
-          <p:nvPr/>
-        </p:nvCxnSpPr>
-        <p:spPr>
-          <a:xfrm>
-            <a:off x="5916000" y="2255520"/>
-            <a:ext cx="360000" cy="0"/>
-          </a:xfrm>
-          <a:prstGeom prst="line">
-            <a:avLst/>
-          </a:prstGeom>
-          <a:ln w="19050">
-            <a:solidFill>
-              <a:schemeClr val="bg1"/>
-            </a:solidFill>
-          </a:ln>
-        </p:spPr>
-        <p:style>
-          <a:lnRef idx="1">
-            <a:schemeClr val="accent1"/>
-          </a:lnRef>
-          <a:fillRef idx="0">
-            <a:schemeClr val="accent1"/>
-          </a:fillRef>
-          <a:effectRef idx="0">
-            <a:schemeClr val="accent1"/>
-          </a:effectRef>
-          <a:fontRef idx="minor">
-            <a:schemeClr val="tx1"/>
-          </a:fontRef>
-        </p:style>
-      </p:cxnSp>
-      <p:cxnSp>
-        <p:nvCxnSpPr>
-          <p:cNvPr id="15" name="직선 연결선 14"/>
-          <p:cNvCxnSpPr/>
-          <p:nvPr/>
-        </p:nvCxnSpPr>
-        <p:spPr>
-          <a:xfrm>
-            <a:off x="10002268" y="2255520"/>
-            <a:ext cx="360000" cy="0"/>
-          </a:xfrm>
-          <a:prstGeom prst="line">
-            <a:avLst/>
-          </a:prstGeom>
-          <a:ln w="19050">
-            <a:solidFill>
-              <a:schemeClr val="bg1"/>
-            </a:solidFill>
-          </a:ln>
-        </p:spPr>
-        <p:style>
-          <a:lnRef idx="1">
-            <a:schemeClr val="accent1"/>
-          </a:lnRef>
-          <a:fillRef idx="0">
-            <a:schemeClr val="accent1"/>
-          </a:fillRef>
-          <a:effectRef idx="0">
-            <a:schemeClr val="accent1"/>
-          </a:effectRef>
-          <a:fontRef idx="minor">
-            <a:schemeClr val="tx1"/>
-          </a:fontRef>
-        </p:style>
-      </p:cxnSp>
-      <p:sp>
-        <p:nvSpPr>
-          <p:cNvPr id="17" name="TextBox 16"/>
-          <p:cNvSpPr txBox="1"/>
-          <p:nvPr/>
-        </p:nvSpPr>
-        <p:spPr>
-          <a:xfrm>
-            <a:off x="572399" y="3879398"/>
-            <a:ext cx="2800767" cy="1631216"/>
-          </a:xfrm>
-          <a:prstGeom prst="rect">
-            <a:avLst/>
-          </a:prstGeom>
-          <a:noFill/>
-        </p:spPr>
-        <p:txBody>
-          <a:bodyPr wrap="none" rtlCol="0" anchor="t">
-            <a:spAutoFit/>
-          </a:bodyPr>
-          <a:lstStyle/>
-          <a:p>
-            <a:pPr algn="ctr"/>
-            <a:r>
-              <a:rPr lang="ko-KR" altLang="en-US" sz="2000" dirty="0" smtClean="0">
-                <a:solidFill>
-                  <a:schemeClr val="bg1"/>
-                </a:solidFill>
-                <a:effectLst>
-                  <a:outerShdw blurRad="38100" dist="38100" dir="2700000" algn="tl">
-                    <a:srgbClr val="000000">
-                      <a:alpha val="43137"/>
-                    </a:srgbClr>
-                  </a:outerShdw>
-                </a:effectLst>
-                <a:latin typeface="-윤고딕310" panose="02030504000101010101" pitchFamily="18" charset="-127"/>
-                <a:ea typeface="-윤고딕310" panose="02030504000101010101" pitchFamily="18" charset="-127"/>
-              </a:rPr>
-              <a:t>게임 컨셉트</a:t>
-            </a:r>
-            <a:endParaRPr lang="en-US" altLang="ko-KR" sz="2000" dirty="0" smtClean="0">
-              <a:solidFill>
-                <a:schemeClr val="bg1"/>
-              </a:solidFill>
-              <a:effectLst>
-                <a:outerShdw blurRad="38100" dist="38100" dir="2700000" algn="tl">
-                  <a:srgbClr val="000000">
-                    <a:alpha val="43137"/>
-                  </a:srgbClr>
-                </a:outerShdw>
-              </a:effectLst>
-              <a:latin typeface="-윤고딕310" panose="02030504000101010101" pitchFamily="18" charset="-127"/>
-              <a:ea typeface="-윤고딕310" panose="02030504000101010101" pitchFamily="18" charset="-127"/>
-            </a:endParaRPr>
-          </a:p>
-          <a:p>
-            <a:pPr algn="ctr"/>
-            <a:r>
-              <a:rPr lang="ko-KR" altLang="en-US" sz="2000" dirty="0" smtClean="0">
-                <a:solidFill>
-                  <a:schemeClr val="bg1"/>
-                </a:solidFill>
-                <a:effectLst>
-                  <a:outerShdw blurRad="38100" dist="38100" dir="2700000" algn="tl">
-                    <a:srgbClr val="000000">
-                      <a:alpha val="43137"/>
-                    </a:srgbClr>
-                  </a:outerShdw>
-                </a:effectLst>
-                <a:latin typeface="-윤고딕310" panose="02030504000101010101" pitchFamily="18" charset="-127"/>
-                <a:ea typeface="-윤고딕310" panose="02030504000101010101" pitchFamily="18" charset="-127"/>
-              </a:rPr>
-              <a:t>게임 소개 </a:t>
-            </a:r>
-            <a:r>
-              <a:rPr lang="en-US" altLang="ko-KR" sz="2000" dirty="0" smtClean="0">
-                <a:solidFill>
-                  <a:schemeClr val="bg1"/>
-                </a:solidFill>
-                <a:effectLst>
-                  <a:outerShdw blurRad="38100" dist="38100" dir="2700000" algn="tl">
-                    <a:srgbClr val="000000">
-                      <a:alpha val="43137"/>
-                    </a:srgbClr>
-                  </a:outerShdw>
-                </a:effectLst>
-                <a:latin typeface="-윤고딕310" panose="02030504000101010101" pitchFamily="18" charset="-127"/>
-                <a:ea typeface="-윤고딕310" panose="02030504000101010101" pitchFamily="18" charset="-127"/>
-              </a:rPr>
-              <a:t>(</a:t>
-            </a:r>
-            <a:r>
-              <a:rPr lang="ko-KR" altLang="en-US" sz="2000" dirty="0">
-                <a:solidFill>
-                  <a:schemeClr val="bg1"/>
-                </a:solidFill>
-                <a:effectLst>
-                  <a:outerShdw blurRad="38100" dist="38100" dir="2700000" algn="tl">
-                    <a:srgbClr val="000000">
-                      <a:alpha val="43137"/>
-                    </a:srgbClr>
-                  </a:outerShdw>
-                </a:effectLst>
-                <a:latin typeface="-윤고딕310" panose="02030504000101010101" pitchFamily="18" charset="-127"/>
-                <a:ea typeface="-윤고딕310" panose="02030504000101010101" pitchFamily="18" charset="-127"/>
-              </a:rPr>
-              <a:t>세계관</a:t>
-            </a:r>
-            <a:r>
-              <a:rPr lang="en-US" altLang="ko-KR" sz="2000" dirty="0" smtClean="0">
-                <a:solidFill>
-                  <a:schemeClr val="bg1"/>
-                </a:solidFill>
-                <a:effectLst>
-                  <a:outerShdw blurRad="38100" dist="38100" dir="2700000" algn="tl">
-                    <a:srgbClr val="000000">
-                      <a:alpha val="43137"/>
-                    </a:srgbClr>
-                  </a:outerShdw>
-                </a:effectLst>
-                <a:latin typeface="-윤고딕310" panose="02030504000101010101" pitchFamily="18" charset="-127"/>
-                <a:ea typeface="-윤고딕310" panose="02030504000101010101" pitchFamily="18" charset="-127"/>
-              </a:rPr>
-              <a:t>)</a:t>
-            </a:r>
-          </a:p>
-          <a:p>
-            <a:pPr algn="ctr"/>
-            <a:r>
-              <a:rPr lang="ko-KR" altLang="en-US" sz="2000" dirty="0" smtClean="0">
-                <a:solidFill>
-                  <a:schemeClr val="bg1"/>
-                </a:solidFill>
-                <a:effectLst>
-                  <a:outerShdw blurRad="38100" dist="38100" dir="2700000" algn="tl">
-                    <a:srgbClr val="000000">
-                      <a:alpha val="43137"/>
-                    </a:srgbClr>
-                  </a:outerShdw>
-                </a:effectLst>
-                <a:latin typeface="-윤고딕310" panose="02030504000101010101" pitchFamily="18" charset="-127"/>
-                <a:ea typeface="-윤고딕310" panose="02030504000101010101" pitchFamily="18" charset="-127"/>
-              </a:rPr>
-              <a:t>게임 소개 </a:t>
-            </a:r>
-            <a:r>
-              <a:rPr lang="en-US" altLang="ko-KR" sz="2000" dirty="0" smtClean="0">
-                <a:solidFill>
-                  <a:schemeClr val="bg1"/>
-                </a:solidFill>
-                <a:effectLst>
-                  <a:outerShdw blurRad="38100" dist="38100" dir="2700000" algn="tl">
-                    <a:srgbClr val="000000">
-                      <a:alpha val="43137"/>
-                    </a:srgbClr>
-                  </a:outerShdw>
-                </a:effectLst>
-                <a:latin typeface="-윤고딕310" panose="02030504000101010101" pitchFamily="18" charset="-127"/>
-                <a:ea typeface="-윤고딕310" panose="02030504000101010101" pitchFamily="18" charset="-127"/>
-              </a:rPr>
-              <a:t>(</a:t>
-            </a:r>
-            <a:r>
-              <a:rPr lang="ko-KR" altLang="en-US" sz="2000" dirty="0" smtClean="0">
-                <a:solidFill>
-                  <a:schemeClr val="bg1"/>
-                </a:solidFill>
-                <a:effectLst>
-                  <a:outerShdw blurRad="38100" dist="38100" dir="2700000" algn="tl">
-                    <a:srgbClr val="000000">
-                      <a:alpha val="43137"/>
-                    </a:srgbClr>
-                  </a:outerShdw>
-                </a:effectLst>
-                <a:latin typeface="-윤고딕310" panose="02030504000101010101" pitchFamily="18" charset="-127"/>
-                <a:ea typeface="-윤고딕310" panose="02030504000101010101" pitchFamily="18" charset="-127"/>
-              </a:rPr>
-              <a:t>기본 시스템</a:t>
-            </a:r>
-            <a:r>
-              <a:rPr lang="en-US" altLang="ko-KR" sz="2000" dirty="0" smtClean="0">
-                <a:solidFill>
-                  <a:schemeClr val="bg1"/>
-                </a:solidFill>
-                <a:effectLst>
-                  <a:outerShdw blurRad="38100" dist="38100" dir="2700000" algn="tl">
-                    <a:srgbClr val="000000">
-                      <a:alpha val="43137"/>
-                    </a:srgbClr>
-                  </a:outerShdw>
-                </a:effectLst>
-                <a:latin typeface="-윤고딕310" panose="02030504000101010101" pitchFamily="18" charset="-127"/>
-                <a:ea typeface="-윤고딕310" panose="02030504000101010101" pitchFamily="18" charset="-127"/>
-              </a:rPr>
-              <a:t>)</a:t>
-            </a:r>
-          </a:p>
-          <a:p>
-            <a:pPr algn="ctr"/>
-            <a:r>
-              <a:rPr lang="ko-KR" altLang="en-US" sz="2000" dirty="0">
-                <a:solidFill>
-                  <a:schemeClr val="bg1"/>
-                </a:solidFill>
-                <a:effectLst>
-                  <a:outerShdw blurRad="38100" dist="38100" dir="2700000" algn="tl">
-                    <a:srgbClr val="000000">
-                      <a:alpha val="43137"/>
-                    </a:srgbClr>
-                  </a:outerShdw>
-                </a:effectLst>
-                <a:latin typeface="-윤고딕310" panose="02030504000101010101" pitchFamily="18" charset="-127"/>
-                <a:ea typeface="-윤고딕310" panose="02030504000101010101" pitchFamily="18" charset="-127"/>
-              </a:rPr>
-              <a:t>게임 </a:t>
-            </a:r>
-            <a:r>
-              <a:rPr lang="ko-KR" altLang="en-US" sz="2000" dirty="0" smtClean="0">
-                <a:solidFill>
-                  <a:schemeClr val="bg1"/>
-                </a:solidFill>
-                <a:effectLst>
-                  <a:outerShdw blurRad="38100" dist="38100" dir="2700000" algn="tl">
-                    <a:srgbClr val="000000">
-                      <a:alpha val="43137"/>
-                    </a:srgbClr>
-                  </a:outerShdw>
-                </a:effectLst>
-                <a:latin typeface="-윤고딕310" panose="02030504000101010101" pitchFamily="18" charset="-127"/>
-                <a:ea typeface="-윤고딕310" panose="02030504000101010101" pitchFamily="18" charset="-127"/>
-              </a:rPr>
-              <a:t>소개</a:t>
-            </a:r>
-            <a:r>
-              <a:rPr lang="ko-KR" altLang="en-US" sz="2000" dirty="0">
-                <a:solidFill>
-                  <a:schemeClr val="bg1"/>
-                </a:solidFill>
-                <a:effectLst>
-                  <a:outerShdw blurRad="38100" dist="38100" dir="2700000" algn="tl">
-                    <a:srgbClr val="000000">
-                      <a:alpha val="43137"/>
-                    </a:srgbClr>
-                  </a:outerShdw>
-                </a:effectLst>
-                <a:latin typeface="-윤고딕310" panose="02030504000101010101" pitchFamily="18" charset="-127"/>
-                <a:ea typeface="-윤고딕310" panose="02030504000101010101" pitchFamily="18" charset="-127"/>
-              </a:rPr>
-              <a:t> </a:t>
-            </a:r>
-            <a:r>
-              <a:rPr lang="en-US" altLang="ko-KR" sz="2000" dirty="0" smtClean="0">
-                <a:solidFill>
-                  <a:schemeClr val="bg1"/>
-                </a:solidFill>
-                <a:effectLst>
-                  <a:outerShdw blurRad="38100" dist="38100" dir="2700000" algn="tl">
-                    <a:srgbClr val="000000">
-                      <a:alpha val="43137"/>
-                    </a:srgbClr>
-                  </a:outerShdw>
-                </a:effectLst>
-                <a:latin typeface="-윤고딕310" panose="02030504000101010101" pitchFamily="18" charset="-127"/>
-                <a:ea typeface="-윤고딕310" panose="02030504000101010101" pitchFamily="18" charset="-127"/>
-              </a:rPr>
-              <a:t>(</a:t>
-            </a:r>
-            <a:r>
-              <a:rPr lang="ko-KR" altLang="en-US" sz="2000" dirty="0" smtClean="0">
-                <a:solidFill>
-                  <a:schemeClr val="bg1"/>
-                </a:solidFill>
-                <a:effectLst>
-                  <a:outerShdw blurRad="38100" dist="38100" dir="2700000" algn="tl">
-                    <a:srgbClr val="000000">
-                      <a:alpha val="43137"/>
-                    </a:srgbClr>
-                  </a:outerShdw>
-                </a:effectLst>
-                <a:latin typeface="-윤고딕310" panose="02030504000101010101" pitchFamily="18" charset="-127"/>
-                <a:ea typeface="-윤고딕310" panose="02030504000101010101" pitchFamily="18" charset="-127"/>
-              </a:rPr>
-              <a:t>진행 </a:t>
-            </a:r>
-            <a:r>
-              <a:rPr lang="ko-KR" altLang="en-US" sz="2000" dirty="0">
-                <a:solidFill>
-                  <a:schemeClr val="bg1"/>
-                </a:solidFill>
-                <a:effectLst>
-                  <a:outerShdw blurRad="38100" dist="38100" dir="2700000" algn="tl">
-                    <a:srgbClr val="000000">
-                      <a:alpha val="43137"/>
-                    </a:srgbClr>
-                  </a:outerShdw>
-                </a:effectLst>
-                <a:latin typeface="-윤고딕310" panose="02030504000101010101" pitchFamily="18" charset="-127"/>
-                <a:ea typeface="-윤고딕310" panose="02030504000101010101" pitchFamily="18" charset="-127"/>
-              </a:rPr>
-              <a:t>및 조작</a:t>
-            </a:r>
-            <a:r>
-              <a:rPr lang="en-US" altLang="ko-KR" sz="2000" dirty="0" smtClean="0">
-                <a:solidFill>
-                  <a:schemeClr val="bg1"/>
-                </a:solidFill>
-                <a:effectLst>
-                  <a:outerShdw blurRad="38100" dist="38100" dir="2700000" algn="tl">
-                    <a:srgbClr val="000000">
-                      <a:alpha val="43137"/>
-                    </a:srgbClr>
-                  </a:outerShdw>
-                </a:effectLst>
-                <a:latin typeface="-윤고딕310" panose="02030504000101010101" pitchFamily="18" charset="-127"/>
-                <a:ea typeface="-윤고딕310" panose="02030504000101010101" pitchFamily="18" charset="-127"/>
-              </a:rPr>
-              <a:t>)</a:t>
-            </a:r>
-          </a:p>
-          <a:p>
-            <a:pPr algn="ctr"/>
-            <a:r>
-              <a:rPr lang="ko-KR" altLang="en-US" sz="2000" dirty="0" smtClean="0">
-                <a:solidFill>
-                  <a:schemeClr val="bg1"/>
-                </a:solidFill>
-                <a:effectLst>
-                  <a:outerShdw blurRad="38100" dist="38100" dir="2700000" algn="tl">
-                    <a:srgbClr val="000000">
-                      <a:alpha val="43137"/>
-                    </a:srgbClr>
-                  </a:outerShdw>
-                </a:effectLst>
-                <a:latin typeface="-윤고딕310" panose="02030504000101010101" pitchFamily="18" charset="-127"/>
-                <a:ea typeface="-윤고딕310" panose="02030504000101010101" pitchFamily="18" charset="-127"/>
-              </a:rPr>
-              <a:t>게임 소개 </a:t>
-            </a:r>
-            <a:r>
-              <a:rPr lang="en-US" altLang="ko-KR" sz="2000" dirty="0" smtClean="0">
-                <a:solidFill>
-                  <a:schemeClr val="bg1"/>
-                </a:solidFill>
-                <a:effectLst>
-                  <a:outerShdw blurRad="38100" dist="38100" dir="2700000" algn="tl">
-                    <a:srgbClr val="000000">
-                      <a:alpha val="43137"/>
-                    </a:srgbClr>
-                  </a:outerShdw>
-                </a:effectLst>
-                <a:latin typeface="-윤고딕310" panose="02030504000101010101" pitchFamily="18" charset="-127"/>
-                <a:ea typeface="-윤고딕310" panose="02030504000101010101" pitchFamily="18" charset="-127"/>
-              </a:rPr>
-              <a:t>(</a:t>
-            </a:r>
-            <a:r>
-              <a:rPr lang="ko-KR" altLang="en-US" sz="2000" dirty="0" smtClean="0">
-                <a:solidFill>
-                  <a:schemeClr val="bg1"/>
-                </a:solidFill>
-                <a:effectLst>
-                  <a:outerShdw blurRad="38100" dist="38100" dir="2700000" algn="tl">
-                    <a:srgbClr val="000000">
-                      <a:alpha val="43137"/>
-                    </a:srgbClr>
-                  </a:outerShdw>
-                </a:effectLst>
-                <a:latin typeface="-윤고딕310" panose="02030504000101010101" pitchFamily="18" charset="-127"/>
-                <a:ea typeface="-윤고딕310" panose="02030504000101010101" pitchFamily="18" charset="-127"/>
-              </a:rPr>
-              <a:t>전투</a:t>
-            </a:r>
-            <a:r>
-              <a:rPr lang="en-US" altLang="ko-KR" sz="2000" dirty="0" smtClean="0">
-                <a:solidFill>
-                  <a:schemeClr val="bg1"/>
-                </a:solidFill>
-                <a:effectLst>
-                  <a:outerShdw blurRad="38100" dist="38100" dir="2700000" algn="tl">
-                    <a:srgbClr val="000000">
-                      <a:alpha val="43137"/>
-                    </a:srgbClr>
-                  </a:outerShdw>
-                </a:effectLst>
-                <a:latin typeface="-윤고딕310" panose="02030504000101010101" pitchFamily="18" charset="-127"/>
-                <a:ea typeface="-윤고딕310" panose="02030504000101010101" pitchFamily="18" charset="-127"/>
-              </a:rPr>
-              <a:t>)</a:t>
-            </a:r>
-            <a:endParaRPr lang="en-US" altLang="ko-KR" sz="2000" dirty="0">
-              <a:solidFill>
-                <a:schemeClr val="bg1"/>
-              </a:solidFill>
-              <a:effectLst>
-                <a:outerShdw blurRad="38100" dist="38100" dir="2700000" algn="tl">
-                  <a:srgbClr val="000000">
-                    <a:alpha val="43137"/>
-                  </a:srgbClr>
-                </a:outerShdw>
-              </a:effectLst>
-              <a:latin typeface="-윤고딕310" panose="02030504000101010101" pitchFamily="18" charset="-127"/>
-              <a:ea typeface="-윤고딕310" panose="02030504000101010101" pitchFamily="18" charset="-127"/>
-            </a:endParaRPr>
-          </a:p>
-        </p:txBody>
-      </p:sp>
-      <p:sp>
-        <p:nvSpPr>
-          <p:cNvPr id="18" name="TextBox 17"/>
-          <p:cNvSpPr txBox="1"/>
-          <p:nvPr/>
-        </p:nvSpPr>
-        <p:spPr>
-          <a:xfrm>
-            <a:off x="5487499" y="3868131"/>
-            <a:ext cx="1217000" cy="400110"/>
-          </a:xfrm>
-          <a:prstGeom prst="rect">
-            <a:avLst/>
-          </a:prstGeom>
-          <a:noFill/>
-        </p:spPr>
-        <p:txBody>
-          <a:bodyPr wrap="none" rtlCol="0" anchor="t">
-            <a:spAutoFit/>
-          </a:bodyPr>
-          <a:lstStyle/>
-          <a:p>
-            <a:pPr algn="ctr"/>
-            <a:r>
-              <a:rPr lang="ko-KR" altLang="en-US" sz="2000" dirty="0" smtClean="0">
-                <a:solidFill>
-                  <a:schemeClr val="bg1"/>
-                </a:solidFill>
-                <a:effectLst>
-                  <a:outerShdw blurRad="38100" dist="38100" dir="2700000" algn="tl">
-                    <a:srgbClr val="000000">
-                      <a:alpha val="43137"/>
-                    </a:srgbClr>
-                  </a:outerShdw>
-                </a:effectLst>
-                <a:latin typeface="-윤고딕310" panose="02030504000101010101" pitchFamily="18" charset="-127"/>
-                <a:ea typeface="-윤고딕310" panose="02030504000101010101" pitchFamily="18" charset="-127"/>
-              </a:rPr>
-              <a:t>개발 요소</a:t>
-            </a:r>
-            <a:endParaRPr lang="en-US" altLang="ko-KR" sz="2000" dirty="0" smtClean="0">
-              <a:solidFill>
-                <a:schemeClr val="bg1"/>
-              </a:solidFill>
-              <a:effectLst>
-                <a:outerShdw blurRad="38100" dist="38100" dir="2700000" algn="tl">
-                  <a:srgbClr val="000000">
-                    <a:alpha val="43137"/>
-                  </a:srgbClr>
-                </a:outerShdw>
-              </a:effectLst>
-              <a:latin typeface="-윤고딕310" panose="02030504000101010101" pitchFamily="18" charset="-127"/>
-              <a:ea typeface="-윤고딕310" panose="02030504000101010101" pitchFamily="18" charset="-127"/>
-            </a:endParaRPr>
-          </a:p>
-        </p:txBody>
-      </p:sp>
-      <p:sp>
-        <p:nvSpPr>
-          <p:cNvPr id="19" name="TextBox 18"/>
-          <p:cNvSpPr txBox="1"/>
-          <p:nvPr/>
-        </p:nvSpPr>
-        <p:spPr>
-          <a:xfrm>
-            <a:off x="9175424" y="3879395"/>
-            <a:ext cx="2013693" cy="1015663"/>
-          </a:xfrm>
-          <a:prstGeom prst="rect">
-            <a:avLst/>
-          </a:prstGeom>
-          <a:noFill/>
-        </p:spPr>
-        <p:txBody>
-          <a:bodyPr wrap="none" rtlCol="0" anchor="t">
-            <a:spAutoFit/>
-          </a:bodyPr>
-          <a:lstStyle/>
-          <a:p>
-            <a:pPr algn="ctr"/>
-            <a:r>
-              <a:rPr lang="ko-KR" altLang="en-US" sz="2000" dirty="0" smtClean="0">
-                <a:solidFill>
-                  <a:schemeClr val="bg1"/>
-                </a:solidFill>
-                <a:effectLst>
-                  <a:outerShdw blurRad="38100" dist="38100" dir="2700000" algn="tl">
-                    <a:srgbClr val="000000">
-                      <a:alpha val="43137"/>
-                    </a:srgbClr>
-                  </a:outerShdw>
-                </a:effectLst>
-                <a:latin typeface="-윤고딕310" panose="02030504000101010101" pitchFamily="18" charset="-127"/>
-                <a:ea typeface="-윤고딕310" panose="02030504000101010101" pitchFamily="18" charset="-127"/>
-              </a:rPr>
-              <a:t>기말 기획서 내용</a:t>
-            </a:r>
-            <a:endParaRPr lang="en-US" altLang="ko-KR" sz="2000" dirty="0" smtClean="0">
-              <a:solidFill>
-                <a:schemeClr val="bg1"/>
-              </a:solidFill>
-              <a:effectLst>
-                <a:outerShdw blurRad="38100" dist="38100" dir="2700000" algn="tl">
-                  <a:srgbClr val="000000">
-                    <a:alpha val="43137"/>
-                  </a:srgbClr>
-                </a:outerShdw>
-              </a:effectLst>
-              <a:latin typeface="-윤고딕310" panose="02030504000101010101" pitchFamily="18" charset="-127"/>
-              <a:ea typeface="-윤고딕310" panose="02030504000101010101" pitchFamily="18" charset="-127"/>
-            </a:endParaRPr>
-          </a:p>
-          <a:p>
-            <a:pPr algn="ctr"/>
-            <a:r>
-              <a:rPr lang="ko-KR" altLang="en-US" sz="2000" dirty="0" smtClean="0">
-                <a:solidFill>
-                  <a:schemeClr val="bg1"/>
-                </a:solidFill>
-                <a:effectLst>
-                  <a:outerShdw blurRad="38100" dist="38100" dir="2700000" algn="tl">
-                    <a:srgbClr val="000000">
-                      <a:alpha val="43137"/>
-                    </a:srgbClr>
-                  </a:outerShdw>
-                </a:effectLst>
-                <a:latin typeface="-윤고딕310" panose="02030504000101010101" pitchFamily="18" charset="-127"/>
-                <a:ea typeface="-윤고딕310" panose="02030504000101010101" pitchFamily="18" charset="-127"/>
-              </a:rPr>
-              <a:t>코멘트와 후기</a:t>
-            </a:r>
-            <a:endParaRPr lang="en-US" altLang="ko-KR" sz="2000" dirty="0" smtClean="0">
-              <a:solidFill>
-                <a:schemeClr val="bg1"/>
-              </a:solidFill>
-              <a:effectLst>
-                <a:outerShdw blurRad="38100" dist="38100" dir="2700000" algn="tl">
-                  <a:srgbClr val="000000">
-                    <a:alpha val="43137"/>
-                  </a:srgbClr>
-                </a:outerShdw>
-              </a:effectLst>
-              <a:latin typeface="-윤고딕310" panose="02030504000101010101" pitchFamily="18" charset="-127"/>
-              <a:ea typeface="-윤고딕310" panose="02030504000101010101" pitchFamily="18" charset="-127"/>
-            </a:endParaRPr>
-          </a:p>
-          <a:p>
-            <a:pPr algn="ctr"/>
-            <a:r>
-              <a:rPr lang="ko-KR" altLang="en-US" sz="2000" dirty="0" smtClean="0">
-                <a:solidFill>
-                  <a:schemeClr val="bg1"/>
-                </a:solidFill>
-                <a:effectLst>
-                  <a:outerShdw blurRad="38100" dist="38100" dir="2700000" algn="tl">
-                    <a:srgbClr val="000000">
-                      <a:alpha val="43137"/>
-                    </a:srgbClr>
-                  </a:outerShdw>
-                </a:effectLst>
-                <a:latin typeface="-윤고딕310" panose="02030504000101010101" pitchFamily="18" charset="-127"/>
-                <a:ea typeface="-윤고딕310" panose="02030504000101010101" pitchFamily="18" charset="-127"/>
-              </a:rPr>
-              <a:t>자료 출처</a:t>
-            </a:r>
-            <a:endParaRPr lang="ko-KR" altLang="en-US" sz="2000" dirty="0">
-              <a:solidFill>
-                <a:schemeClr val="bg1"/>
-              </a:solidFill>
-              <a:effectLst>
-                <a:outerShdw blurRad="38100" dist="38100" dir="2700000" algn="tl">
-                  <a:srgbClr val="000000">
-                    <a:alpha val="43137"/>
-                  </a:srgbClr>
-                </a:outerShdw>
-              </a:effectLst>
-              <a:latin typeface="-윤고딕310" panose="02030504000101010101" pitchFamily="18" charset="-127"/>
-              <a:ea typeface="-윤고딕310" panose="02030504000101010101" pitchFamily="18" charset="-127"/>
-            </a:endParaRPr>
-          </a:p>
-        </p:txBody>
-      </p:sp>
-      <p:cxnSp>
-        <p:nvCxnSpPr>
-          <p:cNvPr id="21" name="직선 연결선 20"/>
-          <p:cNvCxnSpPr/>
-          <p:nvPr/>
-        </p:nvCxnSpPr>
-        <p:spPr>
-          <a:xfrm>
-            <a:off x="262467" y="3718560"/>
-            <a:ext cx="11430000" cy="0"/>
-          </a:xfrm>
-          <a:prstGeom prst="line">
-            <a:avLst/>
-          </a:prstGeom>
-          <a:ln w="9525">
-            <a:solidFill>
-              <a:schemeClr val="bg1"/>
-            </a:solidFill>
-          </a:ln>
-        </p:spPr>
-        <p:style>
-          <a:lnRef idx="1">
-            <a:schemeClr val="accent1"/>
-          </a:lnRef>
-          <a:fillRef idx="0">
-            <a:schemeClr val="accent1"/>
-          </a:fillRef>
-          <a:effectRef idx="0">
-            <a:schemeClr val="accent1"/>
-          </a:effectRef>
-          <a:fontRef idx="minor">
-            <a:schemeClr val="tx1"/>
-          </a:fontRef>
-        </p:style>
-      </p:cxnSp>
-    </p:spTree>
-    <p:extLst>
-      <p:ext uri="{BB962C8B-B14F-4D97-AF65-F5344CB8AC3E}">
-        <p14:creationId xmlns:p14="http://schemas.microsoft.com/office/powerpoint/2010/main" val="421804534"/>
-      </p:ext>
-    </p:extLst>
-  </p:cSld>
-  <p:clrMapOvr>
-    <a:masterClrMapping/>
-  </p:clrMapOvr>
-  <p:timing>
-    <p:tnLst>
-      <p:par>
-        <p:cTn id="1" dur="indefinite" restart="never" nodeType="tmRoot"/>
-      </p:par>
-    </p:tnLst>
-  </p:timing>
-</p:sld>
-</file>
-
-<file path=ppt/slides/slide20.xml><?xml version="1.0" encoding="utf-8"?>
+<file path=ppt/slides/slide21.xml><?xml version="1.0" encoding="utf-8"?>
 <p:sld xmlns:a="http://schemas.openxmlformats.org/drawingml/2006/main" xmlns:r="http://schemas.openxmlformats.org/officeDocument/2006/relationships" xmlns:p="http://schemas.openxmlformats.org/presentationml/2006/main">
   <p:cSld>
     <p:spTree>
@@ -32256,7 +34591,7 @@
           <p:nvPr>
             <p:extLst>
               <p:ext uri="{D42A27DB-BD31-4B8C-83A1-F6EECF244321}">
-                <p14:modId xmlns:p14="http://schemas.microsoft.com/office/powerpoint/2010/main" val="443208578"/>
+                <p14:modId xmlns:p14="http://schemas.microsoft.com/office/powerpoint/2010/main" val="4278747263"/>
               </p:ext>
             </p:extLst>
           </p:nvPr>
@@ -32272,8 +34607,8 @@
                 <a:tableStyleId>{073A0DAA-6AF3-43AB-8588-CEC1D06C72B9}</a:tableStyleId>
               </a:tblPr>
               <a:tblGrid>
-                <a:gridCol w="3419475"/>
-                <a:gridCol w="7791451"/>
+                <a:gridCol w="1933575"/>
+                <a:gridCol w="9277351"/>
               </a:tblGrid>
               <a:tr h="835819">
                 <a:tc>
@@ -33107,7 +35442,7 @@
 </p:sld>
 </file>
 
-<file path=ppt/slides/slide21.xml><?xml version="1.0" encoding="utf-8"?>
+<file path=ppt/slides/slide22.xml><?xml version="1.0" encoding="utf-8"?>
 <p:sld xmlns:a="http://schemas.openxmlformats.org/drawingml/2006/main" xmlns:r="http://schemas.openxmlformats.org/officeDocument/2006/relationships" xmlns:p="http://schemas.openxmlformats.org/presentationml/2006/main">
   <p:cSld>
     <p:spTree>
@@ -33672,7 +36007,7 @@
 </p:sld>
 </file>
 
-<file path=ppt/slides/slide22.xml><?xml version="1.0" encoding="utf-8"?>
+<file path=ppt/slides/slide23.xml><?xml version="1.0" encoding="utf-8"?>
 <p:sld xmlns:a="http://schemas.openxmlformats.org/drawingml/2006/main" xmlns:r="http://schemas.openxmlformats.org/officeDocument/2006/relationships" xmlns:p="http://schemas.openxmlformats.org/presentationml/2006/main">
   <p:cSld>
     <p:spTree>
@@ -34818,7 +37153,7 @@
 </p:sld>
 </file>
 
-<file path=ppt/slides/slide23.xml><?xml version="1.0" encoding="utf-8"?>
+<file path=ppt/slides/slide24.xml><?xml version="1.0" encoding="utf-8"?>
 <p:sld xmlns:a="http://schemas.openxmlformats.org/drawingml/2006/main" xmlns:r="http://schemas.openxmlformats.org/officeDocument/2006/relationships" xmlns:p="http://schemas.openxmlformats.org/presentationml/2006/main">
   <p:cSld>
     <p:spTree>
@@ -44396,7 +46731,7 @@
   <a:extraClrSchemeLst/>
   <a:extLst>
     <a:ext uri="{05A4C25C-085E-4340-85A3-A5531E510DB2}">
-      <thm15:themeFamily xmlns="" xmlns:thm15="http://schemas.microsoft.com/office/thememl/2012/main" name="Office Theme" id="{62F939B6-93AF-4DB8-9C6B-D6C7DFDC589F}" vid="{4A3C46E8-61CC-4603-A589-7422A47A8E4A}"/>
+      <thm15:themeFamily xmlns:thm15="http://schemas.microsoft.com/office/thememl/2012/main" xmlns="" name="Office Theme" id="{62F939B6-93AF-4DB8-9C6B-D6C7DFDC589F}" vid="{4A3C46E8-61CC-4603-A589-7422A47A8E4A}"/>
     </a:ext>
   </a:extLst>
 </a:theme>
@@ -44657,7 +46992,7 @@
   <a:extraClrSchemeLst/>
   <a:extLst>
     <a:ext uri="{05A4C25C-085E-4340-85A3-A5531E510DB2}">
-      <thm15:themeFamily xmlns="" xmlns:thm15="http://schemas.microsoft.com/office/thememl/2012/main" name="Office Theme" id="{62F939B6-93AF-4DB8-9C6B-D6C7DFDC589F}" vid="{4A3C46E8-61CC-4603-A589-7422A47A8E4A}"/>
+      <thm15:themeFamily xmlns:thm15="http://schemas.microsoft.com/office/thememl/2012/main" xmlns="" name="Office Theme" id="{62F939B6-93AF-4DB8-9C6B-D6C7DFDC589F}" vid="{4A3C46E8-61CC-4603-A589-7422A47A8E4A}"/>
     </a:ext>
   </a:extLst>
 </a:theme>
@@ -44858,7 +47193,7 @@
   <a:extraClrSchemeLst/>
   <a:extLst>
     <a:ext uri="{05A4C25C-085E-4340-85A3-A5531E510DB2}">
-      <thm15:themeFamily xmlns="" xmlns:thm15="http://schemas.microsoft.com/office/thememl/2012/main" name="Office Theme" id="{62F939B6-93AF-4DB8-9C6B-D6C7DFDC589F}" vid="{4A3C46E8-61CC-4603-A589-7422A47A8E4A}"/>
+      <thm15:themeFamily xmlns:thm15="http://schemas.microsoft.com/office/thememl/2012/main" xmlns="" name="Office Theme" id="{62F939B6-93AF-4DB8-9C6B-D6C7DFDC589F}" vid="{4A3C46E8-61CC-4603-A589-7422A47A8E4A}"/>
     </a:ext>
   </a:extLst>
 </a:theme>
@@ -45059,7 +47394,7 @@
   <a:extraClrSchemeLst/>
   <a:extLst>
     <a:ext uri="{05A4C25C-085E-4340-85A3-A5531E510DB2}">
-      <thm15:themeFamily xmlns="" xmlns:thm15="http://schemas.microsoft.com/office/thememl/2012/main" name="Office Theme" id="{62F939B6-93AF-4DB8-9C6B-D6C7DFDC589F}" vid="{4A3C46E8-61CC-4603-A589-7422A47A8E4A}"/>
+      <thm15:themeFamily xmlns:thm15="http://schemas.microsoft.com/office/thememl/2012/main" xmlns="" name="Office Theme" id="{62F939B6-93AF-4DB8-9C6B-D6C7DFDC589F}" vid="{4A3C46E8-61CC-4603-A589-7422A47A8E4A}"/>
     </a:ext>
   </a:extLst>
 </a:theme>
@@ -45320,7 +47655,7 @@
   <a:extraClrSchemeLst/>
   <a:extLst>
     <a:ext uri="{05A4C25C-085E-4340-85A3-A5531E510DB2}">
-      <thm15:themeFamily xmlns="" xmlns:thm15="http://schemas.microsoft.com/office/thememl/2012/main" name="Office Theme" id="{62F939B6-93AF-4DB8-9C6B-D6C7DFDC589F}" vid="{4A3C46E8-61CC-4603-A589-7422A47A8E4A}"/>
+      <thm15:themeFamily xmlns:thm15="http://schemas.microsoft.com/office/thememl/2012/main" xmlns="" name="Office Theme" id="{62F939B6-93AF-4DB8-9C6B-D6C7DFDC589F}" vid="{4A3C46E8-61CC-4603-A589-7422A47A8E4A}"/>
     </a:ext>
   </a:extLst>
 </a:theme>

</xml_diff>